<commit_message>
Added image to ReadMe
</commit_message>
<xml_diff>
--- a/ECS_Digital_Template.pptx
+++ b/ECS_Digital_Template.pptx
@@ -5,10 +5,10 @@
     <p:sldMasterId id="2147483648" r:id="rId4"/>
   </p:sldMasterIdLst>
   <p:notesMasterIdLst>
-    <p:notesMasterId r:id="rId16"/>
+    <p:notesMasterId r:id="rId14"/>
   </p:notesMasterIdLst>
   <p:handoutMasterIdLst>
-    <p:handoutMasterId r:id="rId17"/>
+    <p:handoutMasterId r:id="rId15"/>
   </p:handoutMasterIdLst>
   <p:sldIdLst>
     <p:sldId id="257" r:id="rId5"/>
@@ -19,9 +19,7 @@
     <p:sldId id="295" r:id="rId10"/>
     <p:sldId id="296" r:id="rId11"/>
     <p:sldId id="293" r:id="rId12"/>
-    <p:sldId id="262" r:id="rId13"/>
-    <p:sldId id="290" r:id="rId14"/>
-    <p:sldId id="267" r:id="rId15"/>
+    <p:sldId id="267" r:id="rId13"/>
   </p:sldIdLst>
   <p:sldSz cx="9144000" cy="6858000" type="screen4x3"/>
   <p:notesSz cx="6858000" cy="9144000"/>
@@ -229,7 +227,7 @@
           <a:p>
             <a:fld id="{99005F40-3085-A94C-86F1-8086CB7D3208}" type="datetimeFigureOut">
               <a:rPr lang="en-US" smtClean="0"/>
-              <a:t>9/19/18</a:t>
+              <a:t>9/24/18</a:t>
             </a:fld>
             <a:endParaRPr lang="en-US"/>
           </a:p>
@@ -394,7 +392,7 @@
           <a:p>
             <a:fld id="{8F794CCD-B965-4F1A-9017-84B1EA84E2E2}" type="datetimeFigureOut">
               <a:rPr lang="en-GB" smtClean="0"/>
-              <a:t>19/09/2018</a:t>
+              <a:t>24/09/2018</a:t>
             </a:fld>
             <a:endParaRPr lang="en-GB" dirty="0"/>
           </a:p>
@@ -660,174 +658,6 @@
     </a:lvl9pPr>
   </p:notesStyle>
 </p:notesMaster>
-</file>
-
-<file path=ppt/notesSlides/notesSlide1.xml><?xml version="1.0" encoding="utf-8"?>
-<p:notes xmlns:a="http://schemas.openxmlformats.org/drawingml/2006/main" xmlns:r="http://schemas.openxmlformats.org/officeDocument/2006/relationships" xmlns:p="http://schemas.openxmlformats.org/presentationml/2006/main">
-  <p:cSld>
-    <p:spTree>
-      <p:nvGrpSpPr>
-        <p:cNvPr id="1" name=""/>
-        <p:cNvGrpSpPr/>
-        <p:nvPr/>
-      </p:nvGrpSpPr>
-      <p:grpSpPr>
-        <a:xfrm>
-          <a:off x="0" y="0"/>
-          <a:ext cx="0" cy="0"/>
-          <a:chOff x="0" y="0"/>
-          <a:chExt cx="0" cy="0"/>
-        </a:xfrm>
-      </p:grpSpPr>
-      <p:sp>
-        <p:nvSpPr>
-          <p:cNvPr id="2" name="Slide Image Placeholder 1"/>
-          <p:cNvSpPr>
-            <a:spLocks noGrp="1" noRot="1" noChangeAspect="1"/>
-          </p:cNvSpPr>
-          <p:nvPr>
-            <p:ph type="sldImg"/>
-          </p:nvPr>
-        </p:nvSpPr>
-        <p:spPr/>
-      </p:sp>
-      <p:sp>
-        <p:nvSpPr>
-          <p:cNvPr id="3" name="Notes Placeholder 2"/>
-          <p:cNvSpPr>
-            <a:spLocks noGrp="1"/>
-          </p:cNvSpPr>
-          <p:nvPr>
-            <p:ph type="body" idx="1"/>
-          </p:nvPr>
-        </p:nvSpPr>
-        <p:spPr/>
-        <p:txBody>
-          <a:bodyPr/>
-          <a:lstStyle/>
-          <a:p>
-            <a:endParaRPr lang="en-GB" dirty="0"/>
-          </a:p>
-        </p:txBody>
-      </p:sp>
-      <p:sp>
-        <p:nvSpPr>
-          <p:cNvPr id="4" name="Slide Number Placeholder 3"/>
-          <p:cNvSpPr>
-            <a:spLocks noGrp="1"/>
-          </p:cNvSpPr>
-          <p:nvPr>
-            <p:ph type="sldNum" sz="quarter" idx="10"/>
-          </p:nvPr>
-        </p:nvSpPr>
-        <p:spPr/>
-        <p:txBody>
-          <a:bodyPr/>
-          <a:lstStyle/>
-          <a:p>
-            <a:fld id="{CDD457C7-BA3B-7245-8621-924F5D888310}" type="slidenum">
-              <a:rPr lang="en-US" smtClean="0"/>
-              <a:t>9</a:t>
-            </a:fld>
-            <a:endParaRPr lang="en-US"/>
-          </a:p>
-        </p:txBody>
-      </p:sp>
-    </p:spTree>
-    <p:extLst>
-      <p:ext uri="{BB962C8B-B14F-4D97-AF65-F5344CB8AC3E}">
-        <p14:creationId xmlns:p14="http://schemas.microsoft.com/office/powerpoint/2010/main" val="3639241126"/>
-      </p:ext>
-    </p:extLst>
-  </p:cSld>
-  <p:clrMapOvr>
-    <a:masterClrMapping/>
-  </p:clrMapOvr>
-</p:notes>
-</file>
-
-<file path=ppt/notesSlides/notesSlide2.xml><?xml version="1.0" encoding="utf-8"?>
-<p:notes xmlns:a="http://schemas.openxmlformats.org/drawingml/2006/main" xmlns:r="http://schemas.openxmlformats.org/officeDocument/2006/relationships" xmlns:p="http://schemas.openxmlformats.org/presentationml/2006/main">
-  <p:cSld>
-    <p:spTree>
-      <p:nvGrpSpPr>
-        <p:cNvPr id="1" name=""/>
-        <p:cNvGrpSpPr/>
-        <p:nvPr/>
-      </p:nvGrpSpPr>
-      <p:grpSpPr>
-        <a:xfrm>
-          <a:off x="0" y="0"/>
-          <a:ext cx="0" cy="0"/>
-          <a:chOff x="0" y="0"/>
-          <a:chExt cx="0" cy="0"/>
-        </a:xfrm>
-      </p:grpSpPr>
-      <p:sp>
-        <p:nvSpPr>
-          <p:cNvPr id="2" name="Slide Image Placeholder 1"/>
-          <p:cNvSpPr>
-            <a:spLocks noGrp="1" noRot="1" noChangeAspect="1"/>
-          </p:cNvSpPr>
-          <p:nvPr>
-            <p:ph type="sldImg"/>
-          </p:nvPr>
-        </p:nvSpPr>
-        <p:spPr/>
-      </p:sp>
-      <p:sp>
-        <p:nvSpPr>
-          <p:cNvPr id="3" name="Notes Placeholder 2"/>
-          <p:cNvSpPr>
-            <a:spLocks noGrp="1"/>
-          </p:cNvSpPr>
-          <p:nvPr>
-            <p:ph type="body" idx="1"/>
-          </p:nvPr>
-        </p:nvSpPr>
-        <p:spPr/>
-        <p:txBody>
-          <a:bodyPr/>
-          <a:lstStyle/>
-          <a:p>
-            <a:endParaRPr lang="en-US" baseline="0" dirty="0"/>
-          </a:p>
-        </p:txBody>
-      </p:sp>
-      <p:sp>
-        <p:nvSpPr>
-          <p:cNvPr id="4" name="Slide Number Placeholder 3"/>
-          <p:cNvSpPr>
-            <a:spLocks noGrp="1"/>
-          </p:cNvSpPr>
-          <p:nvPr>
-            <p:ph type="sldNum" sz="quarter" idx="10"/>
-          </p:nvPr>
-        </p:nvSpPr>
-        <p:spPr/>
-        <p:txBody>
-          <a:bodyPr/>
-          <a:lstStyle/>
-          <a:p>
-            <a:fld id="{7A507E9C-E9CF-45CC-A225-331D2025989C}" type="slidenum">
-              <a:rPr lang="en-GB" smtClean="0"/>
-              <a:t>10</a:t>
-            </a:fld>
-            <a:endParaRPr lang="en-GB" dirty="0"/>
-          </a:p>
-        </p:txBody>
-      </p:sp>
-    </p:spTree>
-    <p:extLst>
-      <p:ext uri="{BB962C8B-B14F-4D97-AF65-F5344CB8AC3E}">
-        <p14:creationId xmlns:p14="http://schemas.microsoft.com/office/powerpoint/2010/main" val="365956143"/>
-      </p:ext>
-    </p:extLst>
-  </p:cSld>
-  <p:clrMapOvr>
-    <a:masterClrMapping/>
-  </p:clrMapOvr>
-</p:notes>
 </file>
 
 <file path=ppt/slideLayouts/slideLayout1.xml><?xml version="1.0" encoding="utf-8"?>
@@ -1592,123 +1422,6 @@
 </p:sldLayout>
 </file>
 
-<file path=ppt/slideLayouts/slideLayout11.xml><?xml version="1.0" encoding="utf-8"?>
-<p:sldLayout xmlns:a="http://schemas.openxmlformats.org/drawingml/2006/main" xmlns:r="http://schemas.openxmlformats.org/officeDocument/2006/relationships" xmlns:p="http://schemas.openxmlformats.org/presentationml/2006/main" type="titleOnly">
-  <p:cSld name="1_Title Only">
-    <p:spTree>
-      <p:nvGrpSpPr>
-        <p:cNvPr id="1" name=""/>
-        <p:cNvGrpSpPr/>
-        <p:nvPr/>
-      </p:nvGrpSpPr>
-      <p:grpSpPr>
-        <a:xfrm>
-          <a:off x="0" y="0"/>
-          <a:ext cx="0" cy="0"/>
-          <a:chOff x="0" y="0"/>
-          <a:chExt cx="0" cy="0"/>
-        </a:xfrm>
-      </p:grpSpPr>
-      <p:sp>
-        <p:nvSpPr>
-          <p:cNvPr id="2" name="Title 1"/>
-          <p:cNvSpPr>
-            <a:spLocks noGrp="1"/>
-          </p:cNvSpPr>
-          <p:nvPr>
-            <p:ph type="title"/>
-          </p:nvPr>
-        </p:nvSpPr>
-        <p:spPr/>
-        <p:txBody>
-          <a:bodyPr/>
-          <a:lstStyle/>
-          <a:p>
-            <a:r>
-              <a:rPr lang="en-US"/>
-              <a:t>Click to edit Master title style</a:t>
-            </a:r>
-          </a:p>
-        </p:txBody>
-      </p:sp>
-      <p:sp>
-        <p:nvSpPr>
-          <p:cNvPr id="3" name="Date Placeholder 2"/>
-          <p:cNvSpPr>
-            <a:spLocks noGrp="1"/>
-          </p:cNvSpPr>
-          <p:nvPr>
-            <p:ph type="dt" sz="half" idx="10"/>
-          </p:nvPr>
-        </p:nvSpPr>
-        <p:spPr/>
-        <p:txBody>
-          <a:bodyPr/>
-          <a:lstStyle/>
-          <a:p>
-            <a:fld id="{3BF0C868-F190-204C-8D03-2302DBC5E9C5}" type="datetimeFigureOut">
-              <a:rPr lang="en-US" smtClean="0"/>
-              <a:t>9/19/18</a:t>
-            </a:fld>
-            <a:endParaRPr lang="en-US"/>
-          </a:p>
-        </p:txBody>
-      </p:sp>
-      <p:sp>
-        <p:nvSpPr>
-          <p:cNvPr id="4" name="Footer Placeholder 3"/>
-          <p:cNvSpPr>
-            <a:spLocks noGrp="1"/>
-          </p:cNvSpPr>
-          <p:nvPr>
-            <p:ph type="ftr" sz="quarter" idx="11"/>
-          </p:nvPr>
-        </p:nvSpPr>
-        <p:spPr/>
-        <p:txBody>
-          <a:bodyPr/>
-          <a:lstStyle/>
-          <a:p>
-            <a:endParaRPr lang="en-US"/>
-          </a:p>
-        </p:txBody>
-      </p:sp>
-      <p:sp>
-        <p:nvSpPr>
-          <p:cNvPr id="5" name="Slide Number Placeholder 4"/>
-          <p:cNvSpPr>
-            <a:spLocks noGrp="1"/>
-          </p:cNvSpPr>
-          <p:nvPr>
-            <p:ph type="sldNum" sz="quarter" idx="12"/>
-          </p:nvPr>
-        </p:nvSpPr>
-        <p:spPr/>
-        <p:txBody>
-          <a:bodyPr/>
-          <a:lstStyle/>
-          <a:p>
-            <a:fld id="{ADD5F54B-1CCB-2746-B305-759E5581A41B}" type="slidenum">
-              <a:rPr lang="en-US" smtClean="0"/>
-              <a:t>‹#›</a:t>
-            </a:fld>
-            <a:endParaRPr lang="en-US"/>
-          </a:p>
-        </p:txBody>
-      </p:sp>
-    </p:spTree>
-    <p:extLst>
-      <p:ext uri="{BB962C8B-B14F-4D97-AF65-F5344CB8AC3E}">
-        <p14:creationId xmlns:p14="http://schemas.microsoft.com/office/powerpoint/2010/main" val="1498921094"/>
-      </p:ext>
-    </p:extLst>
-  </p:cSld>
-  <p:clrMapOvr>
-    <a:masterClrMapping/>
-  </p:clrMapOvr>
-</p:sldLayout>
-</file>
-
 <file path=ppt/slideLayouts/slideLayout2.xml><?xml version="1.0" encoding="utf-8"?>
 <p:sldLayout xmlns:a="http://schemas.openxmlformats.org/drawingml/2006/main" xmlns:r="http://schemas.openxmlformats.org/officeDocument/2006/relationships" xmlns:p="http://schemas.openxmlformats.org/presentationml/2006/main" preserve="1" userDrawn="1">
   <p:cSld name="Title and Content">
@@ -3218,7 +2931,7 @@
           <p:nvPr userDrawn="1"/>
         </p:nvPicPr>
         <p:blipFill>
-          <a:blip r:embed="rId13" cstate="print"/>
+          <a:blip r:embed="rId12" cstate="print"/>
           <a:srcRect b="81500"/>
           <a:stretch>
             <a:fillRect/>
@@ -3497,7 +3210,7 @@
           <p:nvPr userDrawn="1"/>
         </p:nvPicPr>
         <p:blipFill>
-          <a:blip r:embed="rId14">
+          <a:blip r:embed="rId13">
             <a:extLst>
               <a:ext uri="{28A0092B-C50C-407E-A947-70E740481C1C}">
                 <a14:useLocalDpi xmlns:a14="http://schemas.microsoft.com/office/drawing/2010/main" val="0"/>
@@ -3537,7 +3250,6 @@
     <p:sldLayoutId id="2147483656" r:id="rId8"/>
     <p:sldLayoutId id="2147483657" r:id="rId9"/>
     <p:sldLayoutId id="2147483658" r:id="rId10"/>
-    <p:sldLayoutId id="2147483659" r:id="rId11"/>
   </p:sldLayoutIdLst>
   <p:hf sldNum="0" hdr="0" dt="0"/>
   <p:txStyles>
@@ -3908,425 +3620,6 @@
 </p:sld>
 </file>
 
-<file path=ppt/slides/slide10.xml><?xml version="1.0" encoding="utf-8"?>
-<p:sld xmlns:a="http://schemas.openxmlformats.org/drawingml/2006/main" xmlns:r="http://schemas.openxmlformats.org/officeDocument/2006/relationships" xmlns:p="http://schemas.openxmlformats.org/presentationml/2006/main">
-  <p:cSld>
-    <p:spTree>
-      <p:nvGrpSpPr>
-        <p:cNvPr id="1" name=""/>
-        <p:cNvGrpSpPr/>
-        <p:nvPr/>
-      </p:nvGrpSpPr>
-      <p:grpSpPr>
-        <a:xfrm>
-          <a:off x="0" y="0"/>
-          <a:ext cx="0" cy="0"/>
-          <a:chOff x="0" y="0"/>
-          <a:chExt cx="0" cy="0"/>
-        </a:xfrm>
-      </p:grpSpPr>
-      <p:sp>
-        <p:nvSpPr>
-          <p:cNvPr id="4" name="TextBox 3"/>
-          <p:cNvSpPr txBox="1"/>
-          <p:nvPr/>
-        </p:nvSpPr>
-        <p:spPr>
-          <a:xfrm>
-            <a:off x="611560" y="692696"/>
-            <a:ext cx="7920880" cy="523220"/>
-          </a:xfrm>
-          <a:prstGeom prst="rect">
-            <a:avLst/>
-          </a:prstGeom>
-          <a:noFill/>
-        </p:spPr>
-        <p:txBody>
-          <a:bodyPr wrap="square" rtlCol="0">
-            <a:spAutoFit/>
-          </a:bodyPr>
-          <a:lstStyle/>
-          <a:p>
-            <a:r>
-              <a:rPr lang="en-GB" sz="2800" dirty="0">
-                <a:solidFill>
-                  <a:srgbClr val="0070B7"/>
-                </a:solidFill>
-                <a:latin typeface="Arial" panose="020B0604020202020204" pitchFamily="34" charset="0"/>
-                <a:cs typeface="Arial" panose="020B0604020202020204" pitchFamily="34" charset="0"/>
-              </a:rPr>
-              <a:t>Tables</a:t>
-            </a:r>
-          </a:p>
-        </p:txBody>
-      </p:sp>
-      <p:sp>
-        <p:nvSpPr>
-          <p:cNvPr id="5" name="Content Placeholder 4"/>
-          <p:cNvSpPr>
-            <a:spLocks noGrp="1"/>
-          </p:cNvSpPr>
-          <p:nvPr>
-            <p:ph idx="1"/>
-          </p:nvPr>
-        </p:nvSpPr>
-        <p:spPr/>
-        <p:txBody>
-          <a:bodyPr/>
-          <a:lstStyle/>
-          <a:p>
-            <a:pPr marL="0" indent="0">
-              <a:buNone/>
-            </a:pPr>
-            <a:r>
-              <a:rPr lang="en-US" b="1" dirty="0"/>
-              <a:t>Some Text</a:t>
-            </a:r>
-          </a:p>
-        </p:txBody>
-      </p:sp>
-      <p:graphicFrame>
-        <p:nvGraphicFramePr>
-          <p:cNvPr id="6" name="Table 5"/>
-          <p:cNvGraphicFramePr>
-            <a:graphicFrameLocks noGrp="1"/>
-          </p:cNvGraphicFramePr>
-          <p:nvPr>
-            <p:extLst>
-              <p:ext uri="{D42A27DB-BD31-4B8C-83A1-F6EECF244321}">
-                <p14:modId xmlns:p14="http://schemas.microsoft.com/office/powerpoint/2010/main" val="2006098077"/>
-              </p:ext>
-            </p:extLst>
-          </p:nvPr>
-        </p:nvGraphicFramePr>
-        <p:xfrm>
-          <a:off x="620210" y="2060848"/>
-          <a:ext cx="7912230" cy="3728192"/>
-        </p:xfrm>
-        <a:graphic>
-          <a:graphicData uri="http://schemas.openxmlformats.org/drawingml/2006/table">
-            <a:tbl>
-              <a:tblPr firstRow="1" bandRow="1">
-                <a:tableStyleId>{5C22544A-7EE6-4342-B048-85BDC9FD1C3A}</a:tableStyleId>
-              </a:tblPr>
-              <a:tblGrid>
-                <a:gridCol w="2511630">
-                  <a:extLst>
-                    <a:ext uri="{9D8B030D-6E8A-4147-A177-3AD203B41FA5}">
-                      <a16:colId xmlns:a16="http://schemas.microsoft.com/office/drawing/2014/main" val="20000"/>
-                    </a:ext>
-                  </a:extLst>
-                </a:gridCol>
-                <a:gridCol w="5400600">
-                  <a:extLst>
-                    <a:ext uri="{9D8B030D-6E8A-4147-A177-3AD203B41FA5}">
-                      <a16:colId xmlns:a16="http://schemas.microsoft.com/office/drawing/2014/main" val="20001"/>
-                    </a:ext>
-                  </a:extLst>
-                </a:gridCol>
-              </a:tblGrid>
-              <a:tr h="434495">
-                <a:tc>
-                  <a:txBody>
-                    <a:bodyPr/>
-                    <a:lstStyle/>
-                    <a:p>
-                      <a:r>
-                        <a:rPr lang="en-US" sz="1600" dirty="0"/>
-                        <a:t>Name</a:t>
-                      </a:r>
-                    </a:p>
-                  </a:txBody>
-                  <a:tcPr/>
-                </a:tc>
-                <a:tc>
-                  <a:txBody>
-                    <a:bodyPr/>
-                    <a:lstStyle/>
-                    <a:p>
-                      <a:r>
-                        <a:rPr lang="en-US" sz="1600" dirty="0"/>
-                        <a:t>Name</a:t>
-                      </a:r>
-                    </a:p>
-                  </a:txBody>
-                  <a:tcPr/>
-                </a:tc>
-                <a:extLst>
-                  <a:ext uri="{0D108BD9-81ED-4DB2-BD59-A6C34878D82A}">
-                    <a16:rowId xmlns:a16="http://schemas.microsoft.com/office/drawing/2014/main" val="10000"/>
-                  </a:ext>
-                </a:extLst>
-              </a:tr>
-              <a:tr h="1097899">
-                <a:tc>
-                  <a:txBody>
-                    <a:bodyPr/>
-                    <a:lstStyle/>
-                    <a:p>
-                      <a:endParaRPr lang="en-US" sz="1600" dirty="0"/>
-                    </a:p>
-                  </a:txBody>
-                  <a:tcPr/>
-                </a:tc>
-                <a:tc>
-                  <a:txBody>
-                    <a:bodyPr/>
-                    <a:lstStyle/>
-                    <a:p>
-                      <a:pPr marL="285750" marR="0" indent="-285750" algn="l" defTabSz="914400" rtl="0" eaLnBrk="1" fontAlgn="auto" latinLnBrk="0" hangingPunct="1">
-                        <a:lnSpc>
-                          <a:spcPct val="100000"/>
-                        </a:lnSpc>
-                        <a:spcBef>
-                          <a:spcPts val="0"/>
-                        </a:spcBef>
-                        <a:spcAft>
-                          <a:spcPts val="0"/>
-                        </a:spcAft>
-                        <a:buClrTx/>
-                        <a:buSzTx/>
-                        <a:buFont typeface="Arial" charset="0"/>
-                        <a:buChar char="•"/>
-                        <a:tabLst/>
-                        <a:defRPr/>
-                      </a:pPr>
-                      <a:endParaRPr lang="en-US" sz="1600" dirty="0"/>
-                    </a:p>
-                  </a:txBody>
-                  <a:tcPr/>
-                </a:tc>
-                <a:extLst>
-                  <a:ext uri="{0D108BD9-81ED-4DB2-BD59-A6C34878D82A}">
-                    <a16:rowId xmlns:a16="http://schemas.microsoft.com/office/drawing/2014/main" val="10001"/>
-                  </a:ext>
-                </a:extLst>
-              </a:tr>
-              <a:tr h="1097899">
-                <a:tc>
-                  <a:txBody>
-                    <a:bodyPr/>
-                    <a:lstStyle/>
-                    <a:p>
-                      <a:endParaRPr lang="en-US" sz="1600" dirty="0"/>
-                    </a:p>
-                  </a:txBody>
-                  <a:tcPr/>
-                </a:tc>
-                <a:tc>
-                  <a:txBody>
-                    <a:bodyPr/>
-                    <a:lstStyle/>
-                    <a:p>
-                      <a:pPr marL="285750" indent="-285750">
-                        <a:buFont typeface="Arial" charset="0"/>
-                        <a:buChar char="•"/>
-                      </a:pPr>
-                      <a:endParaRPr lang="en-US" sz="1600" baseline="0" dirty="0"/>
-                    </a:p>
-                  </a:txBody>
-                  <a:tcPr/>
-                </a:tc>
-                <a:extLst>
-                  <a:ext uri="{0D108BD9-81ED-4DB2-BD59-A6C34878D82A}">
-                    <a16:rowId xmlns:a16="http://schemas.microsoft.com/office/drawing/2014/main" val="10002"/>
-                  </a:ext>
-                </a:extLst>
-              </a:tr>
-              <a:tr h="1097899">
-                <a:tc>
-                  <a:txBody>
-                    <a:bodyPr/>
-                    <a:lstStyle/>
-                    <a:p>
-                      <a:endParaRPr lang="en-US" sz="1600" dirty="0"/>
-                    </a:p>
-                  </a:txBody>
-                  <a:tcPr/>
-                </a:tc>
-                <a:tc>
-                  <a:txBody>
-                    <a:bodyPr/>
-                    <a:lstStyle/>
-                    <a:p>
-                      <a:pPr marL="285750" indent="-285750">
-                        <a:buFont typeface="Arial" charset="0"/>
-                        <a:buChar char="•"/>
-                      </a:pPr>
-                      <a:endParaRPr lang="en-US" sz="1600" baseline="0" dirty="0"/>
-                    </a:p>
-                  </a:txBody>
-                  <a:tcPr/>
-                </a:tc>
-                <a:extLst>
-                  <a:ext uri="{0D108BD9-81ED-4DB2-BD59-A6C34878D82A}">
-                    <a16:rowId xmlns:a16="http://schemas.microsoft.com/office/drawing/2014/main" val="10003"/>
-                  </a:ext>
-                </a:extLst>
-              </a:tr>
-            </a:tbl>
-          </a:graphicData>
-        </a:graphic>
-      </p:graphicFrame>
-      <p:sp>
-        <p:nvSpPr>
-          <p:cNvPr id="7" name="Footer Placeholder 2"/>
-          <p:cNvSpPr>
-            <a:spLocks noGrp="1"/>
-          </p:cNvSpPr>
-          <p:nvPr>
-            <p:ph type="ftr" sz="quarter" idx="3"/>
-          </p:nvPr>
-        </p:nvSpPr>
-        <p:spPr>
-          <a:xfrm>
-            <a:off x="3124200" y="6356351"/>
-            <a:ext cx="2895600" cy="365125"/>
-          </a:xfrm>
-        </p:spPr>
-        <p:txBody>
-          <a:bodyPr/>
-          <a:lstStyle/>
-          <a:p>
-            <a:r>
-              <a:rPr lang="en-GB" dirty="0"/>
-              <a:t>Commercial In Confidence - ECS 2017  </a:t>
-            </a:r>
-          </a:p>
-        </p:txBody>
-      </p:sp>
-    </p:spTree>
-    <p:extLst>
-      <p:ext uri="{BB962C8B-B14F-4D97-AF65-F5344CB8AC3E}">
-        <p14:creationId xmlns:p14="http://schemas.microsoft.com/office/powerpoint/2010/main" val="296072206"/>
-      </p:ext>
-    </p:extLst>
-  </p:cSld>
-  <p:clrMapOvr>
-    <a:masterClrMapping/>
-  </p:clrMapOvr>
-</p:sld>
-</file>
-
-<file path=ppt/slides/slide11.xml><?xml version="1.0" encoding="utf-8"?>
-<p:sld xmlns:a="http://schemas.openxmlformats.org/drawingml/2006/main" xmlns:r="http://schemas.openxmlformats.org/officeDocument/2006/relationships" xmlns:p="http://schemas.openxmlformats.org/presentationml/2006/main">
-  <p:cSld>
-    <p:spTree>
-      <p:nvGrpSpPr>
-        <p:cNvPr id="1" name=""/>
-        <p:cNvGrpSpPr/>
-        <p:nvPr/>
-      </p:nvGrpSpPr>
-      <p:grpSpPr>
-        <a:xfrm>
-          <a:off x="0" y="0"/>
-          <a:ext cx="0" cy="0"/>
-          <a:chOff x="0" y="0"/>
-          <a:chExt cx="0" cy="0"/>
-        </a:xfrm>
-      </p:grpSpPr>
-      <p:sp>
-        <p:nvSpPr>
-          <p:cNvPr id="2" name="Footer Placeholder 1"/>
-          <p:cNvSpPr>
-            <a:spLocks noGrp="1"/>
-          </p:cNvSpPr>
-          <p:nvPr>
-            <p:ph type="ftr" sz="quarter" idx="11"/>
-          </p:nvPr>
-        </p:nvSpPr>
-        <p:spPr/>
-        <p:txBody>
-          <a:bodyPr/>
-          <a:lstStyle/>
-          <a:p>
-            <a:r>
-              <a:rPr lang="en-GB" dirty="0"/>
-              <a:t>Commercial In Confidence - ECS 2017  </a:t>
-            </a:r>
-          </a:p>
-        </p:txBody>
-      </p:sp>
-      <p:sp>
-        <p:nvSpPr>
-          <p:cNvPr id="3" name="Text Placeholder 2"/>
-          <p:cNvSpPr>
-            <a:spLocks noGrp="1"/>
-          </p:cNvSpPr>
-          <p:nvPr>
-            <p:ph type="body" idx="13"/>
-          </p:nvPr>
-        </p:nvSpPr>
-        <p:spPr/>
-        <p:txBody>
-          <a:bodyPr/>
-          <a:lstStyle/>
-          <a:p>
-            <a:r>
-              <a:rPr lang="en-GB" dirty="0"/>
-              <a:t>Thank You</a:t>
-            </a:r>
-          </a:p>
-        </p:txBody>
-      </p:sp>
-      <p:sp>
-        <p:nvSpPr>
-          <p:cNvPr id="4" name="Title 5"/>
-          <p:cNvSpPr txBox="1">
-            <a:spLocks/>
-          </p:cNvSpPr>
-          <p:nvPr/>
-        </p:nvSpPr>
-        <p:spPr>
-          <a:xfrm>
-            <a:off x="539552" y="5661248"/>
-            <a:ext cx="7772400" cy="345281"/>
-          </a:xfrm>
-          <a:prstGeom prst="rect">
-            <a:avLst/>
-          </a:prstGeom>
-        </p:spPr>
-        <p:txBody>
-          <a:bodyPr vert="horz" lIns="91440" tIns="45720" rIns="91440" bIns="45720" rtlCol="0" anchor="ctr">
-            <a:normAutofit fontScale="85000" lnSpcReduction="20000"/>
-          </a:bodyPr>
-          <a:lstStyle>
-            <a:lvl1pPr algn="l" defTabSz="914400" rtl="0" eaLnBrk="1" latinLnBrk="0" hangingPunct="1">
-              <a:spcBef>
-                <a:spcPct val="0"/>
-              </a:spcBef>
-              <a:buNone/>
-              <a:defRPr sz="4000" kern="1200">
-                <a:solidFill>
-                  <a:schemeClr val="bg1"/>
-                </a:solidFill>
-                <a:latin typeface="Arial" panose="020B0604020202020204" pitchFamily="34" charset="0"/>
-                <a:ea typeface="+mj-ea"/>
-                <a:cs typeface="Arial" panose="020B0604020202020204" pitchFamily="34" charset="0"/>
-              </a:defRPr>
-            </a:lvl1pPr>
-          </a:lstStyle>
-          <a:p>
-            <a:r>
-              <a:rPr lang="en-GB" sz="2400" dirty="0"/>
-              <a:t>Author - details</a:t>
-            </a:r>
-          </a:p>
-        </p:txBody>
-      </p:sp>
-    </p:spTree>
-    <p:extLst>
-      <p:ext uri="{BB962C8B-B14F-4D97-AF65-F5344CB8AC3E}">
-        <p14:creationId xmlns:p14="http://schemas.microsoft.com/office/powerpoint/2010/main" val="2079933839"/>
-      </p:ext>
-    </p:extLst>
-  </p:cSld>
-  <p:clrMapOvr>
-    <a:masterClrMapping/>
-  </p:clrMapOvr>
-</p:sld>
-</file>
-
 <file path=ppt/slides/slide2.xml><?xml version="1.0" encoding="utf-8"?>
 <p:sld xmlns:a="http://schemas.openxmlformats.org/drawingml/2006/main" xmlns:r="http://schemas.openxmlformats.org/officeDocument/2006/relationships" xmlns:p="http://schemas.openxmlformats.org/presentationml/2006/main">
   <p:cSld>
@@ -5269,13 +4562,92 @@
           <a:lstStyle/>
           <a:p>
             <a:r>
+              <a:rPr lang="en-US" sz="2300" dirty="0"/>
+              <a:t>As well as running tests on VMs, </a:t>
+            </a:r>
+            <a:r>
               <a:rPr lang="en-US" sz="2300" dirty="0" err="1"/>
               <a:t>Zalenium</a:t>
             </a:r>
             <a:r>
               <a:rPr lang="en-US" sz="2300" dirty="0"/>
-              <a:t>, by default, will only run one test per node.</a:t>
-            </a:r>
+              <a:t> also has support for the following providers:</a:t>
+            </a:r>
+          </a:p>
+          <a:p>
+            <a:pPr lvl="2"/>
+            <a:r>
+              <a:rPr lang="en-US" sz="2300" dirty="0"/>
+              <a:t>Sauce Labs</a:t>
+            </a:r>
+          </a:p>
+          <a:p>
+            <a:pPr lvl="2"/>
+            <a:r>
+              <a:rPr lang="en-US" sz="2300" dirty="0" err="1"/>
+              <a:t>TestingBot</a:t>
+            </a:r>
+            <a:endParaRPr lang="en-US" sz="2300" dirty="0"/>
+          </a:p>
+          <a:p>
+            <a:pPr lvl="2"/>
+            <a:r>
+              <a:rPr lang="en-US" sz="2300" dirty="0"/>
+              <a:t>Browser Stack</a:t>
+            </a:r>
+          </a:p>
+          <a:p>
+            <a:pPr marL="914400" lvl="2" indent="0">
+              <a:buNone/>
+            </a:pPr>
+            <a:endParaRPr lang="en-US" sz="2300" dirty="0"/>
+          </a:p>
+          <a:p>
+            <a:r>
+              <a:rPr lang="en-US" sz="2300" dirty="0"/>
+              <a:t>To access these, add the following to your startup command:</a:t>
+            </a:r>
+          </a:p>
+          <a:p>
+            <a:pPr marL="0" indent="0">
+              <a:buNone/>
+            </a:pPr>
+            <a:r>
+              <a:rPr lang="en-US" sz="2300" i="1" dirty="0"/>
+              <a:t>	</a:t>
+            </a:r>
+            <a:r>
+              <a:rPr lang="en-GB" i="1" dirty="0"/>
+              <a:t>export SAUCE_USERNAME=&lt;your Sauce Labs username&gt; export 	SAUCE_ACCESS_KEY=&lt;your Sauce Labs access key&gt; export 	SAUCE_LABS_URL=&lt;your Sauce Labs </a:t>
+            </a:r>
+            <a:r>
+              <a:rPr lang="en-GB" i="1" dirty="0" err="1"/>
+              <a:t>url:port</a:t>
+            </a:r>
+            <a:r>
+              <a:rPr lang="en-GB" i="1" dirty="0"/>
+              <a:t> number&gt; </a:t>
+            </a:r>
+            <a:r>
+              <a:rPr lang="en-US" sz="2300" i="1" dirty="0"/>
+              <a:t> </a:t>
+            </a:r>
+            <a:br>
+              <a:rPr lang="en-US" sz="2300" dirty="0"/>
+            </a:br>
+            <a:br>
+              <a:rPr lang="en-US" sz="2300" dirty="0"/>
+            </a:br>
+            <a:br>
+              <a:rPr lang="en-US" sz="2300" dirty="0"/>
+            </a:br>
+            <a:endParaRPr lang="en-US" sz="2300" dirty="0"/>
+          </a:p>
+          <a:p>
+            <a:pPr marL="914400" lvl="2" indent="0">
+              <a:buNone/>
+            </a:pPr>
+            <a:endParaRPr lang="en-US" sz="2300" dirty="0"/>
           </a:p>
         </p:txBody>
       </p:sp>
@@ -5331,7 +4703,7 @@
                 <a:latin typeface="Arial" panose="020B0604020202020204" pitchFamily="34" charset="0"/>
                 <a:cs typeface="Arial" panose="020B0604020202020204" pitchFamily="34" charset="0"/>
               </a:rPr>
-              <a:t>Points to Note</a:t>
+              <a:t>Running Tests on Cloud Proxy</a:t>
             </a:r>
           </a:p>
         </p:txBody>
@@ -5366,261 +4738,107 @@
           <a:chExt cx="0" cy="0"/>
         </a:xfrm>
       </p:grpSpPr>
-      <p:pic>
-        <p:nvPicPr>
-          <p:cNvPr id="9" name="Picture 8">
-            <a:extLst>
-              <a:ext uri="{FF2B5EF4-FFF2-40B4-BE49-F238E27FC236}">
-                <a16:creationId xmlns:a16="http://schemas.microsoft.com/office/drawing/2014/main" id="{F6EC2F0D-5F69-7E47-9753-E4C997F328A0}"/>
-              </a:ext>
-            </a:extLst>
-          </p:cNvPr>
-          <p:cNvPicPr>
-            <a:picLocks noChangeAspect="1"/>
-          </p:cNvPicPr>
+      <p:sp>
+        <p:nvSpPr>
+          <p:cNvPr id="2" name="Footer Placeholder 1"/>
+          <p:cNvSpPr>
+            <a:spLocks noGrp="1"/>
+          </p:cNvSpPr>
+          <p:nvPr>
+            <p:ph type="ftr" sz="quarter" idx="11"/>
+          </p:nvPr>
+        </p:nvSpPr>
+        <p:spPr/>
+        <p:txBody>
+          <a:bodyPr/>
+          <a:lstStyle/>
+          <a:p>
+            <a:r>
+              <a:rPr lang="en-GB" dirty="0"/>
+              <a:t>Commercial In Confidence - ECS 2017  </a:t>
+            </a:r>
+          </a:p>
+        </p:txBody>
+      </p:sp>
+      <p:sp>
+        <p:nvSpPr>
+          <p:cNvPr id="3" name="Text Placeholder 2"/>
+          <p:cNvSpPr>
+            <a:spLocks noGrp="1"/>
+          </p:cNvSpPr>
+          <p:nvPr>
+            <p:ph type="body" idx="13"/>
+          </p:nvPr>
+        </p:nvSpPr>
+        <p:spPr/>
+        <p:txBody>
+          <a:bodyPr/>
+          <a:lstStyle/>
+          <a:p>
+            <a:r>
+              <a:rPr lang="en-GB" dirty="0"/>
+              <a:t>Thank You</a:t>
+            </a:r>
+          </a:p>
+        </p:txBody>
+      </p:sp>
+      <p:sp>
+        <p:nvSpPr>
+          <p:cNvPr id="4" name="Title 5"/>
+          <p:cNvSpPr txBox="1">
+            <a:spLocks/>
+          </p:cNvSpPr>
           <p:nvPr/>
-        </p:nvPicPr>
-        <p:blipFill rotWithShape="1">
-          <a:blip r:embed="rId3" cstate="screen">
-            <a:extLst>
-              <a:ext uri="{BEBA8EAE-BF5A-486C-A8C5-ECC9F3942E4B}">
-                <a14:imgProps xmlns:a14="http://schemas.microsoft.com/office/drawing/2010/main">
-                  <a14:imgLayer r:embed="rId4">
-                    <a14:imgEffect>
-                      <a14:colorTemperature colorTemp="4700"/>
-                    </a14:imgEffect>
-                  </a14:imgLayer>
-                </a14:imgProps>
-              </a:ext>
-              <a:ext uri="{28A0092B-C50C-407E-A947-70E740481C1C}">
-                <a14:useLocalDpi xmlns:a14="http://schemas.microsoft.com/office/drawing/2010/main"/>
-              </a:ext>
-            </a:extLst>
-          </a:blip>
-          <a:srcRect/>
-          <a:stretch/>
-        </p:blipFill>
+        </p:nvSpPr>
         <p:spPr>
           <a:xfrm>
-            <a:off x="-1476672" y="-150440"/>
-            <a:ext cx="12419319" cy="7004620"/>
+            <a:off x="539552" y="5661248"/>
+            <a:ext cx="7772400" cy="345281"/>
           </a:xfrm>
           <a:prstGeom prst="rect">
             <a:avLst/>
           </a:prstGeom>
         </p:spPr>
-      </p:pic>
-      <p:sp>
-        <p:nvSpPr>
-          <p:cNvPr id="7" name="Rectangle 6"/>
-          <p:cNvSpPr/>
-          <p:nvPr/>
-        </p:nvSpPr>
-        <p:spPr>
-          <a:xfrm>
-            <a:off x="710296" y="5692661"/>
-            <a:ext cx="979755" cy="300082"/>
-          </a:xfrm>
-          <a:prstGeom prst="rect">
-            <a:avLst/>
-          </a:prstGeom>
-        </p:spPr>
-        <p:txBody>
-          <a:bodyPr wrap="none">
-            <a:spAutoFit/>
+        <p:txBody>
+          <a:bodyPr vert="horz" lIns="91440" tIns="45720" rIns="91440" bIns="45720" rtlCol="0" anchor="ctr">
+            <a:normAutofit fontScale="85000" lnSpcReduction="20000"/>
           </a:bodyPr>
-          <a:lstStyle/>
-          <a:p>
-            <a:r>
-              <a:rPr lang="en-GB" sz="1350" spc="75">
+          <a:lstStyle>
+            <a:lvl1pPr algn="l" defTabSz="914400" rtl="0" eaLnBrk="1" latinLnBrk="0" hangingPunct="1">
+              <a:spcBef>
+                <a:spcPct val="0"/>
+              </a:spcBef>
+              <a:buNone/>
+              <a:defRPr sz="4000" kern="1200">
                 <a:solidFill>
                   <a:schemeClr val="bg1"/>
                 </a:solidFill>
-                <a:latin typeface="Avenir Light" charset="0"/>
-                <a:ea typeface="Avenir Light" charset="0"/>
-                <a:cs typeface="Avenir Light" charset="0"/>
-              </a:rPr>
-              <a:t>ecs.co.uk</a:t>
-            </a:r>
-            <a:endParaRPr lang="en-GB" sz="1350" spc="75" dirty="0">
-              <a:solidFill>
-                <a:schemeClr val="bg1"/>
-              </a:solidFill>
-              <a:latin typeface="Avenir Light" charset="0"/>
-              <a:ea typeface="Avenir Light" charset="0"/>
-              <a:cs typeface="Avenir Light" charset="0"/>
-            </a:endParaRPr>
-          </a:p>
-        </p:txBody>
-      </p:sp>
-      <p:sp>
-        <p:nvSpPr>
-          <p:cNvPr id="8" name="Text Placeholder 4"/>
-          <p:cNvSpPr txBox="1">
-            <a:spLocks/>
-          </p:cNvSpPr>
-          <p:nvPr/>
-        </p:nvSpPr>
-        <p:spPr>
-          <a:xfrm>
-            <a:off x="710296" y="1268760"/>
-            <a:ext cx="7821384" cy="1123948"/>
-          </a:xfrm>
-          <a:prstGeom prst="rect">
-            <a:avLst/>
-          </a:prstGeom>
-        </p:spPr>
-        <p:txBody>
-          <a:bodyPr vert="horz" lIns="68580" tIns="34290" rIns="68580" bIns="34290" rtlCol="0" anchor="ctr">
-            <a:normAutofit/>
-          </a:bodyPr>
-          <a:lstStyle>
-            <a:defPPr>
-              <a:defRPr lang="en-US"/>
-            </a:defPPr>
-            <a:lvl1pPr marL="0" algn="ctr" defTabSz="914400" rtl="0" eaLnBrk="1" latinLnBrk="0" hangingPunct="1">
-              <a:defRPr sz="1200" kern="1200">
-                <a:solidFill>
-                  <a:schemeClr val="tx1">
-                    <a:tint val="75000"/>
-                  </a:schemeClr>
-                </a:solidFill>
-                <a:latin typeface="+mn-lt"/>
-                <a:ea typeface="+mn-ea"/>
-                <a:cs typeface="+mn-cs"/>
+                <a:latin typeface="Arial" panose="020B0604020202020204" pitchFamily="34" charset="0"/>
+                <a:ea typeface="+mj-ea"/>
+                <a:cs typeface="Arial" panose="020B0604020202020204" pitchFamily="34" charset="0"/>
               </a:defRPr>
             </a:lvl1pPr>
-            <a:lvl2pPr marL="457200" algn="l" defTabSz="914400" rtl="0" eaLnBrk="1" latinLnBrk="0" hangingPunct="1">
-              <a:defRPr sz="1800" kern="1200">
-                <a:solidFill>
-                  <a:schemeClr val="tx1"/>
-                </a:solidFill>
-                <a:latin typeface="+mn-lt"/>
-                <a:ea typeface="+mn-ea"/>
-                <a:cs typeface="+mn-cs"/>
-              </a:defRPr>
-            </a:lvl2pPr>
-            <a:lvl3pPr marL="914400" algn="l" defTabSz="914400" rtl="0" eaLnBrk="1" latinLnBrk="0" hangingPunct="1">
-              <a:defRPr sz="1800" kern="1200">
-                <a:solidFill>
-                  <a:schemeClr val="tx1"/>
-                </a:solidFill>
-                <a:latin typeface="+mn-lt"/>
-                <a:ea typeface="+mn-ea"/>
-                <a:cs typeface="+mn-cs"/>
-              </a:defRPr>
-            </a:lvl3pPr>
-            <a:lvl4pPr marL="1371600" algn="l" defTabSz="914400" rtl="0" eaLnBrk="1" latinLnBrk="0" hangingPunct="1">
-              <a:defRPr sz="1800" kern="1200">
-                <a:solidFill>
-                  <a:schemeClr val="tx1"/>
-                </a:solidFill>
-                <a:latin typeface="+mn-lt"/>
-                <a:ea typeface="+mn-ea"/>
-                <a:cs typeface="+mn-cs"/>
-              </a:defRPr>
-            </a:lvl4pPr>
-            <a:lvl5pPr marL="1828800" algn="l" defTabSz="914400" rtl="0" eaLnBrk="1" latinLnBrk="0" hangingPunct="1">
-              <a:defRPr sz="1800" kern="1200">
-                <a:solidFill>
-                  <a:schemeClr val="tx1"/>
-                </a:solidFill>
-                <a:latin typeface="+mn-lt"/>
-                <a:ea typeface="+mn-ea"/>
-                <a:cs typeface="+mn-cs"/>
-              </a:defRPr>
-            </a:lvl5pPr>
-            <a:lvl6pPr marL="2286000" algn="l" defTabSz="914400" rtl="0" eaLnBrk="1" latinLnBrk="0" hangingPunct="1">
-              <a:defRPr sz="1800" kern="1200">
-                <a:solidFill>
-                  <a:schemeClr val="tx1"/>
-                </a:solidFill>
-                <a:latin typeface="+mn-lt"/>
-                <a:ea typeface="+mn-ea"/>
-                <a:cs typeface="+mn-cs"/>
-              </a:defRPr>
-            </a:lvl6pPr>
-            <a:lvl7pPr marL="2743200" algn="l" defTabSz="914400" rtl="0" eaLnBrk="1" latinLnBrk="0" hangingPunct="1">
-              <a:defRPr sz="1800" kern="1200">
-                <a:solidFill>
-                  <a:schemeClr val="tx1"/>
-                </a:solidFill>
-                <a:latin typeface="+mn-lt"/>
-                <a:ea typeface="+mn-ea"/>
-                <a:cs typeface="+mn-cs"/>
-              </a:defRPr>
-            </a:lvl7pPr>
-            <a:lvl8pPr marL="3200400" algn="l" defTabSz="914400" rtl="0" eaLnBrk="1" latinLnBrk="0" hangingPunct="1">
-              <a:defRPr sz="1800" kern="1200">
-                <a:solidFill>
-                  <a:schemeClr val="tx1"/>
-                </a:solidFill>
-                <a:latin typeface="+mn-lt"/>
-                <a:ea typeface="+mn-ea"/>
-                <a:cs typeface="+mn-cs"/>
-              </a:defRPr>
-            </a:lvl8pPr>
-            <a:lvl9pPr marL="3657600" algn="l" defTabSz="914400" rtl="0" eaLnBrk="1" latinLnBrk="0" hangingPunct="1">
-              <a:defRPr sz="1800" kern="1200">
-                <a:solidFill>
-                  <a:schemeClr val="tx1"/>
-                </a:solidFill>
-                <a:latin typeface="+mn-lt"/>
-                <a:ea typeface="+mn-ea"/>
-                <a:cs typeface="+mn-cs"/>
-              </a:defRPr>
-            </a:lvl9pPr>
           </a:lstStyle>
           <a:p>
-            <a:pPr algn="l"/>
-            <a:r>
-              <a:rPr lang="en-GB" sz="2400" dirty="0">
-                <a:solidFill>
-                  <a:srgbClr val="0F5595"/>
-                </a:solidFill>
-                <a:latin typeface="Avenir Light" charset="0"/>
-                <a:ea typeface="Avenir Light" charset="0"/>
-                <a:cs typeface="Avenir Light" charset="0"/>
-              </a:rPr>
-              <a:t>Out scaling peak load </a:t>
-            </a:r>
-            <a:endParaRPr lang="en-US" sz="2400" dirty="0">
-              <a:solidFill>
-                <a:srgbClr val="0F5595"/>
-              </a:solidFill>
-              <a:latin typeface="Avenir Light" charset="0"/>
-              <a:ea typeface="Avenir Light" charset="0"/>
-              <a:cs typeface="Avenir Light" charset="0"/>
-            </a:endParaRPr>
-          </a:p>
-          <a:p>
-            <a:pPr algn="l"/>
-            <a:r>
-              <a:rPr lang="en-GB" sz="1600" dirty="0">
-                <a:solidFill>
-                  <a:srgbClr val="0F5595"/>
-                </a:solidFill>
-                <a:latin typeface="Avenir Light" charset="0"/>
-                <a:ea typeface="Avenir Light" charset="0"/>
-                <a:cs typeface="Avenir Light" charset="0"/>
-              </a:rPr>
-              <a:t>- a container story</a:t>
-            </a:r>
-            <a:endParaRPr lang="en-US" sz="1600" dirty="0">
-              <a:solidFill>
-                <a:srgbClr val="0F5595"/>
-              </a:solidFill>
-              <a:latin typeface="Avenir Light" charset="0"/>
-              <a:ea typeface="Avenir Light" charset="0"/>
-              <a:cs typeface="Avenir Light" charset="0"/>
-            </a:endParaRPr>
+            <a:r>
+              <a:rPr lang="en-GB" sz="2400" dirty="0"/>
+              <a:t>Ali Hill, Hammad </a:t>
+            </a:r>
+            <a:r>
+              <a:rPr lang="en-GB" sz="2400" dirty="0" err="1"/>
+              <a:t>Chandio</a:t>
+            </a:r>
+            <a:r>
+              <a:rPr lang="en-GB" sz="2400" dirty="0"/>
+              <a:t>, Farhan Shaikh</a:t>
+            </a:r>
           </a:p>
         </p:txBody>
       </p:sp>
     </p:spTree>
     <p:extLst>
       <p:ext uri="{BB962C8B-B14F-4D97-AF65-F5344CB8AC3E}">
-        <p14:creationId xmlns:p14="http://schemas.microsoft.com/office/powerpoint/2010/main" val="562437262"/>
+        <p14:creationId xmlns:p14="http://schemas.microsoft.com/office/powerpoint/2010/main" val="2079933839"/>
       </p:ext>
     </p:extLst>
   </p:cSld>
@@ -6462,6 +5680,12 @@
 </file>
 
 <file path=customXml/item1.xml><?xml version="1.0" encoding="utf-8"?>
+<p:properties xmlns:p="http://schemas.microsoft.com/office/2006/metadata/properties" xmlns:xsi="http://www.w3.org/2001/XMLSchema-instance" xmlns:pc="http://schemas.microsoft.com/office/infopath/2007/PartnerControls">
+  <documentManagement/>
+</p:properties>
+</file>
+
+<file path=customXml/item2.xml><?xml version="1.0" encoding="utf-8"?>
 <ct:contentTypeSchema xmlns:ct="http://schemas.microsoft.com/office/2006/metadata/contentType" xmlns:ma="http://schemas.microsoft.com/office/2006/metadata/properties/metaAttributes" ct:_="" ma:_="" ma:contentTypeName="Document" ma:contentTypeID="0x01010032568B525010F846862294E756626199" ma:contentTypeVersion="8" ma:contentTypeDescription="Create a new document." ma:contentTypeScope="" ma:versionID="8038f208134572231f45b2239c7ee116">
   <xsd:schema xmlns:xsd="http://www.w3.org/2001/XMLSchema" xmlns:xs="http://www.w3.org/2001/XMLSchema" xmlns:p="http://schemas.microsoft.com/office/2006/metadata/properties" xmlns:ns2="78610437-699c-4941-bf2e-0011b0af15d9" xmlns:ns3="c7ddc322-a81d-4d45-a8a3-b42cbb00bae7" targetNamespace="http://schemas.microsoft.com/office/2006/metadata/properties" ma:root="true" ma:fieldsID="3bc37508e70c0eb62c75259443266f33" ns2:_="" ns3:_="">
     <xsd:import namespace="78610437-699c-4941-bf2e-0011b0af15d9"/>
@@ -6652,12 +5876,6 @@
 </ct:contentTypeSchema>
 </file>
 
-<file path=customXml/item2.xml><?xml version="1.0" encoding="utf-8"?>
-<p:properties xmlns:p="http://schemas.microsoft.com/office/2006/metadata/properties" xmlns:xsi="http://www.w3.org/2001/XMLSchema-instance" xmlns:pc="http://schemas.microsoft.com/office/infopath/2007/PartnerControls">
-  <documentManagement/>
-</p:properties>
-</file>
-
 <file path=customXml/item3.xml><?xml version="1.0" encoding="utf-8"?>
 <?mso-contentType ?>
 <FormTemplates xmlns="http://schemas.microsoft.com/sharepoint/v3/contenttype/forms">
@@ -6668,6 +5886,23 @@
 </file>
 
 <file path=customXml/itemProps1.xml><?xml version="1.0" encoding="utf-8"?>
+<ds:datastoreItem xmlns:ds="http://schemas.openxmlformats.org/officeDocument/2006/customXml" ds:itemID="{5B5A310F-8172-420C-8B07-5B368A43E2DC}">
+  <ds:schemaRefs>
+    <ds:schemaRef ds:uri="http://www.w3.org/XML/1998/namespace"/>
+    <ds:schemaRef ds:uri="http://schemas.microsoft.com/office/2006/documentManagement/types"/>
+    <ds:schemaRef ds:uri="http://purl.org/dc/elements/1.1/"/>
+    <ds:schemaRef ds:uri="http://purl.org/dc/terms/"/>
+    <ds:schemaRef ds:uri="http://schemas.microsoft.com/office/2006/metadata/properties"/>
+    <ds:schemaRef ds:uri="http://schemas.openxmlformats.org/package/2006/metadata/core-properties"/>
+    <ds:schemaRef ds:uri="c7ddc322-a81d-4d45-a8a3-b42cbb00bae7"/>
+    <ds:schemaRef ds:uri="http://purl.org/dc/dcmitype/"/>
+    <ds:schemaRef ds:uri="http://schemas.microsoft.com/office/infopath/2007/PartnerControls"/>
+    <ds:schemaRef ds:uri="78610437-699c-4941-bf2e-0011b0af15d9"/>
+  </ds:schemaRefs>
+</ds:datastoreItem>
+</file>
+
+<file path=customXml/itemProps2.xml><?xml version="1.0" encoding="utf-8"?>
 <ds:datastoreItem xmlns:ds="http://schemas.openxmlformats.org/officeDocument/2006/customXml" ds:itemID="{130D9AEF-63DD-4286-96FE-CAAEA6D0A342}">
   <ds:schemaRefs>
     <ds:schemaRef ds:uri="http://schemas.microsoft.com/office/2006/metadata/contentType"/>
@@ -6686,23 +5921,6 @@
 </ds:datastoreItem>
 </file>
 
-<file path=customXml/itemProps2.xml><?xml version="1.0" encoding="utf-8"?>
-<ds:datastoreItem xmlns:ds="http://schemas.openxmlformats.org/officeDocument/2006/customXml" ds:itemID="{5B5A310F-8172-420C-8B07-5B368A43E2DC}">
-  <ds:schemaRefs>
-    <ds:schemaRef ds:uri="http://www.w3.org/XML/1998/namespace"/>
-    <ds:schemaRef ds:uri="http://schemas.microsoft.com/office/2006/documentManagement/types"/>
-    <ds:schemaRef ds:uri="http://purl.org/dc/elements/1.1/"/>
-    <ds:schemaRef ds:uri="http://purl.org/dc/terms/"/>
-    <ds:schemaRef ds:uri="http://schemas.microsoft.com/office/2006/metadata/properties"/>
-    <ds:schemaRef ds:uri="http://schemas.openxmlformats.org/package/2006/metadata/core-properties"/>
-    <ds:schemaRef ds:uri="c7ddc322-a81d-4d45-a8a3-b42cbb00bae7"/>
-    <ds:schemaRef ds:uri="http://purl.org/dc/dcmitype/"/>
-    <ds:schemaRef ds:uri="http://schemas.microsoft.com/office/infopath/2007/PartnerControls"/>
-    <ds:schemaRef ds:uri="78610437-699c-4941-bf2e-0011b0af15d9"/>
-  </ds:schemaRefs>
-</ds:datastoreItem>
-</file>
-
 <file path=customXml/itemProps3.xml><?xml version="1.0" encoding="utf-8"?>
 <ds:datastoreItem xmlns:ds="http://schemas.openxmlformats.org/officeDocument/2006/customXml" ds:itemID="{003B5CD9-841F-44FE-B239-F6092E6A3514}">
   <ds:schemaRefs>

</xml_diff>

<commit_message>
Updating PP and image
</commit_message>
<xml_diff>
--- a/ECS_Digital_Template.pptx
+++ b/ECS_Digital_Template.pptx
@@ -5,21 +5,24 @@
     <p:sldMasterId id="2147483648" r:id="rId4"/>
   </p:sldMasterIdLst>
   <p:notesMasterIdLst>
-    <p:notesMasterId r:id="rId14"/>
+    <p:notesMasterId r:id="rId17"/>
   </p:notesMasterIdLst>
   <p:handoutMasterIdLst>
-    <p:handoutMasterId r:id="rId15"/>
+    <p:handoutMasterId r:id="rId18"/>
   </p:handoutMasterIdLst>
   <p:sldIdLst>
-    <p:sldId id="257" r:id="rId5"/>
-    <p:sldId id="258" r:id="rId6"/>
+    <p:sldId id="303" r:id="rId5"/>
+    <p:sldId id="257" r:id="rId6"/>
     <p:sldId id="294" r:id="rId7"/>
-    <p:sldId id="291" r:id="rId8"/>
-    <p:sldId id="292" r:id="rId9"/>
-    <p:sldId id="295" r:id="rId10"/>
-    <p:sldId id="296" r:id="rId11"/>
-    <p:sldId id="293" r:id="rId12"/>
-    <p:sldId id="267" r:id="rId13"/>
+    <p:sldId id="304" r:id="rId8"/>
+    <p:sldId id="306" r:id="rId9"/>
+    <p:sldId id="291" r:id="rId10"/>
+    <p:sldId id="292" r:id="rId11"/>
+    <p:sldId id="295" r:id="rId12"/>
+    <p:sldId id="296" r:id="rId13"/>
+    <p:sldId id="293" r:id="rId14"/>
+    <p:sldId id="297" r:id="rId15"/>
+    <p:sldId id="267" r:id="rId16"/>
   </p:sldIdLst>
   <p:sldSz cx="9144000" cy="6858000" type="screen4x3"/>
   <p:notesSz cx="6858000" cy="9144000"/>
@@ -658,6 +661,90 @@
     </a:lvl9pPr>
   </p:notesStyle>
 </p:notesMaster>
+</file>
+
+<file path=ppt/notesSlides/notesSlide1.xml><?xml version="1.0" encoding="utf-8"?>
+<p:notes xmlns:a="http://schemas.openxmlformats.org/drawingml/2006/main" xmlns:r="http://schemas.openxmlformats.org/officeDocument/2006/relationships" xmlns:p="http://schemas.openxmlformats.org/presentationml/2006/main">
+  <p:cSld>
+    <p:spTree>
+      <p:nvGrpSpPr>
+        <p:cNvPr id="1" name=""/>
+        <p:cNvGrpSpPr/>
+        <p:nvPr/>
+      </p:nvGrpSpPr>
+      <p:grpSpPr>
+        <a:xfrm>
+          <a:off x="0" y="0"/>
+          <a:ext cx="0" cy="0"/>
+          <a:chOff x="0" y="0"/>
+          <a:chExt cx="0" cy="0"/>
+        </a:xfrm>
+      </p:grpSpPr>
+      <p:sp>
+        <p:nvSpPr>
+          <p:cNvPr id="2" name="Slide Image Placeholder 1"/>
+          <p:cNvSpPr>
+            <a:spLocks noGrp="1" noRot="1" noChangeAspect="1"/>
+          </p:cNvSpPr>
+          <p:nvPr>
+            <p:ph type="sldImg"/>
+          </p:nvPr>
+        </p:nvSpPr>
+        <p:spPr/>
+      </p:sp>
+      <p:sp>
+        <p:nvSpPr>
+          <p:cNvPr id="3" name="Notes Placeholder 2"/>
+          <p:cNvSpPr>
+            <a:spLocks noGrp="1"/>
+          </p:cNvSpPr>
+          <p:nvPr>
+            <p:ph type="body" idx="1"/>
+          </p:nvPr>
+        </p:nvSpPr>
+        <p:spPr/>
+        <p:txBody>
+          <a:bodyPr/>
+          <a:lstStyle/>
+          <a:p>
+            <a:endParaRPr lang="en-US" dirty="0"/>
+          </a:p>
+        </p:txBody>
+      </p:sp>
+      <p:sp>
+        <p:nvSpPr>
+          <p:cNvPr id="4" name="Slide Number Placeholder 3"/>
+          <p:cNvSpPr>
+            <a:spLocks noGrp="1"/>
+          </p:cNvSpPr>
+          <p:nvPr>
+            <p:ph type="sldNum" sz="quarter" idx="10"/>
+          </p:nvPr>
+        </p:nvSpPr>
+        <p:spPr/>
+        <p:txBody>
+          <a:bodyPr/>
+          <a:lstStyle/>
+          <a:p>
+            <a:fld id="{7A507E9C-E9CF-45CC-A225-331D2025989C}" type="slidenum">
+              <a:rPr lang="en-GB" smtClean="0"/>
+              <a:t>4</a:t>
+            </a:fld>
+            <a:endParaRPr lang="en-GB" dirty="0"/>
+          </a:p>
+        </p:txBody>
+      </p:sp>
+    </p:spTree>
+    <p:extLst>
+      <p:ext uri="{BB962C8B-B14F-4D97-AF65-F5344CB8AC3E}">
+        <p14:creationId xmlns:p14="http://schemas.microsoft.com/office/powerpoint/2010/main" val="4112685597"/>
+      </p:ext>
+    </p:extLst>
+  </p:cSld>
+  <p:clrMapOvr>
+    <a:masterClrMapping/>
+  </p:clrMapOvr>
+</p:notes>
 </file>
 
 <file path=ppt/slideLayouts/slideLayout1.xml><?xml version="1.0" encoding="utf-8"?>
@@ -3524,39 +3611,469 @@
       </p:grpSpPr>
       <p:sp>
         <p:nvSpPr>
-          <p:cNvPr id="6" name="Title 5"/>
+          <p:cNvPr id="2" name="Content Placeholder 1">
+            <a:extLst>
+              <a:ext uri="{FF2B5EF4-FFF2-40B4-BE49-F238E27FC236}">
+                <a16:creationId xmlns:a16="http://schemas.microsoft.com/office/drawing/2014/main" id="{BFC245A8-C054-A24E-9575-7C23AA411F7D}"/>
+              </a:ext>
+            </a:extLst>
+          </p:cNvPr>
           <p:cNvSpPr>
             <a:spLocks noGrp="1"/>
           </p:cNvSpPr>
           <p:nvPr>
-            <p:ph type="ctrTitle"/>
+            <p:ph idx="1"/>
+          </p:nvPr>
+        </p:nvSpPr>
+        <p:spPr/>
+        <p:txBody>
+          <a:bodyPr>
+            <a:normAutofit/>
+          </a:bodyPr>
+          <a:lstStyle/>
+          <a:p>
+            <a:pPr marL="85725" indent="0" algn="ctr">
+              <a:buNone/>
+            </a:pPr>
+            <a:r>
+              <a:rPr lang="en-US" sz="4050" dirty="0" err="1"/>
+              <a:t>Wifi</a:t>
+            </a:r>
+            <a:endParaRPr lang="en-US" sz="4050" dirty="0"/>
+          </a:p>
+          <a:p>
+            <a:pPr marL="0" indent="0" algn="ctr">
+              <a:buNone/>
+            </a:pPr>
+            <a:r>
+              <a:rPr lang="en-US" sz="4050" dirty="0"/>
+              <a:t>SSID :</a:t>
+            </a:r>
+            <a:r>
+              <a:rPr lang="en-GB" sz="4050" dirty="0"/>
+              <a:t>HMT Guest</a:t>
+            </a:r>
+          </a:p>
+          <a:p>
+            <a:pPr marL="85725" indent="0" algn="ctr">
+              <a:buNone/>
+            </a:pPr>
+            <a:r>
+              <a:rPr lang="en-US" sz="4050" dirty="0"/>
+              <a:t>Password : </a:t>
+            </a:r>
+            <a:r>
+              <a:rPr lang="en-GB" sz="4050" dirty="0"/>
+              <a:t>INN3R-bauble*shipment</a:t>
+            </a:r>
+            <a:endParaRPr lang="en-US" sz="4050" dirty="0"/>
+          </a:p>
+        </p:txBody>
+      </p:sp>
+    </p:spTree>
+    <p:extLst>
+      <p:ext uri="{BB962C8B-B14F-4D97-AF65-F5344CB8AC3E}">
+        <p14:creationId xmlns:p14="http://schemas.microsoft.com/office/powerpoint/2010/main" val="4087697416"/>
+      </p:ext>
+    </p:extLst>
+  </p:cSld>
+  <p:clrMapOvr>
+    <a:masterClrMapping/>
+  </p:clrMapOvr>
+</p:sld>
+</file>
+
+<file path=ppt/slides/slide10.xml><?xml version="1.0" encoding="utf-8"?>
+<p:sld xmlns:a="http://schemas.openxmlformats.org/drawingml/2006/main" xmlns:r="http://schemas.openxmlformats.org/officeDocument/2006/relationships" xmlns:p="http://schemas.openxmlformats.org/presentationml/2006/main">
+  <p:cSld>
+    <p:spTree>
+      <p:nvGrpSpPr>
+        <p:cNvPr id="1" name=""/>
+        <p:cNvGrpSpPr/>
+        <p:nvPr/>
+      </p:nvGrpSpPr>
+      <p:grpSpPr>
+        <a:xfrm>
+          <a:off x="0" y="0"/>
+          <a:ext cx="0" cy="0"/>
+          <a:chOff x="0" y="0"/>
+          <a:chExt cx="0" cy="0"/>
+        </a:xfrm>
+      </p:grpSpPr>
+      <p:sp>
+        <p:nvSpPr>
+          <p:cNvPr id="2" name="Content Placeholder 1"/>
+          <p:cNvSpPr>
+            <a:spLocks noGrp="1"/>
+          </p:cNvSpPr>
+          <p:nvPr>
+            <p:ph idx="1"/>
           </p:nvPr>
         </p:nvSpPr>
         <p:spPr>
           <a:xfrm>
-            <a:off x="611560" y="2276872"/>
-            <a:ext cx="7772400" cy="1470025"/>
+            <a:off x="611560" y="1600201"/>
+            <a:ext cx="7920880" cy="4525963"/>
           </a:xfrm>
         </p:spPr>
         <p:txBody>
+          <a:bodyPr>
+            <a:noAutofit/>
+          </a:bodyPr>
+          <a:lstStyle/>
+          <a:p>
+            <a:r>
+              <a:rPr lang="en-US" sz="2300" dirty="0"/>
+              <a:t>As well as running tests on VMs, </a:t>
+            </a:r>
+            <a:r>
+              <a:rPr lang="en-US" sz="2300" dirty="0" err="1"/>
+              <a:t>Zalenium</a:t>
+            </a:r>
+            <a:r>
+              <a:rPr lang="en-US" sz="2300" dirty="0"/>
+              <a:t> also has support for the following providers:</a:t>
+            </a:r>
+          </a:p>
+          <a:p>
+            <a:pPr lvl="2"/>
+            <a:r>
+              <a:rPr lang="en-US" sz="2300" dirty="0"/>
+              <a:t>Sauce Labs</a:t>
+            </a:r>
+          </a:p>
+          <a:p>
+            <a:pPr lvl="2"/>
+            <a:r>
+              <a:rPr lang="en-US" sz="2300" dirty="0" err="1"/>
+              <a:t>TestingBot</a:t>
+            </a:r>
+            <a:endParaRPr lang="en-US" sz="2300" dirty="0"/>
+          </a:p>
+          <a:p>
+            <a:pPr lvl="2"/>
+            <a:r>
+              <a:rPr lang="en-US" sz="2300" dirty="0"/>
+              <a:t>Browser Stack</a:t>
+            </a:r>
+          </a:p>
+          <a:p>
+            <a:pPr marL="914400" lvl="2" indent="0">
+              <a:buNone/>
+            </a:pPr>
+            <a:endParaRPr lang="en-US" sz="2300" dirty="0"/>
+          </a:p>
+          <a:p>
+            <a:r>
+              <a:rPr lang="en-US" sz="2300" dirty="0"/>
+              <a:t>To access these, add the following to your startup command:</a:t>
+            </a:r>
+          </a:p>
+          <a:p>
+            <a:pPr marL="0" indent="0">
+              <a:buNone/>
+            </a:pPr>
+            <a:r>
+              <a:rPr lang="en-US" sz="2300" i="1" dirty="0"/>
+              <a:t>	</a:t>
+            </a:r>
+            <a:r>
+              <a:rPr lang="en-GB" i="1" dirty="0"/>
+              <a:t>export SAUCE_USERNAME=&lt;your Sauce Labs username&gt; export 	SAUCE_ACCESS_KEY=&lt;your Sauce Labs access key&gt; export 	SAUCE_LABS_URL=&lt;your Sauce Labs </a:t>
+            </a:r>
+            <a:r>
+              <a:rPr lang="en-GB" i="1" dirty="0" err="1"/>
+              <a:t>url:port</a:t>
+            </a:r>
+            <a:r>
+              <a:rPr lang="en-GB" i="1" dirty="0"/>
+              <a:t> number&gt; </a:t>
+            </a:r>
+            <a:r>
+              <a:rPr lang="en-US" sz="2300" i="1" dirty="0"/>
+              <a:t> </a:t>
+            </a:r>
+            <a:br>
+              <a:rPr lang="en-US" sz="2300" dirty="0"/>
+            </a:br>
+            <a:br>
+              <a:rPr lang="en-US" sz="2300" dirty="0"/>
+            </a:br>
+            <a:br>
+              <a:rPr lang="en-US" sz="2300" dirty="0"/>
+            </a:br>
+            <a:endParaRPr lang="en-US" sz="2300" dirty="0"/>
+          </a:p>
+          <a:p>
+            <a:pPr marL="914400" lvl="2" indent="0">
+              <a:buNone/>
+            </a:pPr>
+            <a:endParaRPr lang="en-US" sz="2300" dirty="0"/>
+          </a:p>
+        </p:txBody>
+      </p:sp>
+      <p:sp>
+        <p:nvSpPr>
+          <p:cNvPr id="3" name="Footer Placeholder 2"/>
+          <p:cNvSpPr>
+            <a:spLocks noGrp="1"/>
+          </p:cNvSpPr>
+          <p:nvPr>
+            <p:ph type="ftr" sz="quarter" idx="3"/>
+          </p:nvPr>
+        </p:nvSpPr>
+        <p:spPr/>
+        <p:txBody>
           <a:bodyPr/>
           <a:lstStyle/>
           <a:p>
             <a:r>
               <a:rPr lang="en-GB" dirty="0"/>
-              <a:t>Auto-Scaling Selenium Grid with Docker using </a:t>
-            </a:r>
-            <a:r>
-              <a:rPr lang="en-GB" dirty="0" err="1"/>
-              <a:t>Zalenium</a:t>
-            </a:r>
-            <a:endParaRPr lang="en-GB" dirty="0"/>
-          </a:p>
-        </p:txBody>
-      </p:sp>
-      <p:sp>
-        <p:nvSpPr>
-          <p:cNvPr id="7" name="Title 5"/>
+              <a:t>Commercial In Confidence - ECS 2017  </a:t>
+            </a:r>
+          </a:p>
+        </p:txBody>
+      </p:sp>
+      <p:sp>
+        <p:nvSpPr>
+          <p:cNvPr id="4" name="TextBox 3"/>
+          <p:cNvSpPr txBox="1"/>
+          <p:nvPr/>
+        </p:nvSpPr>
+        <p:spPr>
+          <a:xfrm>
+            <a:off x="611560" y="692696"/>
+            <a:ext cx="7920880" cy="523220"/>
+          </a:xfrm>
+          <a:prstGeom prst="rect">
+            <a:avLst/>
+          </a:prstGeom>
+          <a:noFill/>
+        </p:spPr>
+        <p:txBody>
+          <a:bodyPr wrap="square" rtlCol="0">
+            <a:spAutoFit/>
+          </a:bodyPr>
+          <a:lstStyle/>
+          <a:p>
+            <a:r>
+              <a:rPr lang="en-GB" sz="2800" dirty="0">
+                <a:solidFill>
+                  <a:srgbClr val="0070B7"/>
+                </a:solidFill>
+                <a:latin typeface="Arial" panose="020B0604020202020204" pitchFamily="34" charset="0"/>
+                <a:cs typeface="Arial" panose="020B0604020202020204" pitchFamily="34" charset="0"/>
+              </a:rPr>
+              <a:t>Running tests on Cloud Proxy</a:t>
+            </a:r>
+          </a:p>
+        </p:txBody>
+      </p:sp>
+    </p:spTree>
+    <p:extLst>
+      <p:ext uri="{BB962C8B-B14F-4D97-AF65-F5344CB8AC3E}">
+        <p14:creationId xmlns:p14="http://schemas.microsoft.com/office/powerpoint/2010/main" val="630844028"/>
+      </p:ext>
+    </p:extLst>
+  </p:cSld>
+  <p:clrMapOvr>
+    <a:masterClrMapping/>
+  </p:clrMapOvr>
+</p:sld>
+</file>
+
+<file path=ppt/slides/slide11.xml><?xml version="1.0" encoding="utf-8"?>
+<p:sld xmlns:a="http://schemas.openxmlformats.org/drawingml/2006/main" xmlns:r="http://schemas.openxmlformats.org/officeDocument/2006/relationships" xmlns:p="http://schemas.openxmlformats.org/presentationml/2006/main">
+  <p:cSld>
+    <p:spTree>
+      <p:nvGrpSpPr>
+        <p:cNvPr id="1" name=""/>
+        <p:cNvGrpSpPr/>
+        <p:nvPr/>
+      </p:nvGrpSpPr>
+      <p:grpSpPr>
+        <a:xfrm>
+          <a:off x="0" y="0"/>
+          <a:ext cx="0" cy="0"/>
+          <a:chOff x="0" y="0"/>
+          <a:chExt cx="0" cy="0"/>
+        </a:xfrm>
+      </p:grpSpPr>
+      <p:sp>
+        <p:nvSpPr>
+          <p:cNvPr id="2" name="Content Placeholder 1"/>
+          <p:cNvSpPr>
+            <a:spLocks noGrp="1"/>
+          </p:cNvSpPr>
+          <p:nvPr>
+            <p:ph idx="1"/>
+          </p:nvPr>
+        </p:nvSpPr>
+        <p:spPr>
+          <a:xfrm>
+            <a:off x="611560" y="1600201"/>
+            <a:ext cx="7920880" cy="4525963"/>
+          </a:xfrm>
+        </p:spPr>
+        <p:txBody>
+          <a:bodyPr>
+            <a:noAutofit/>
+          </a:bodyPr>
+          <a:lstStyle/>
+          <a:p>
+            <a:br>
+              <a:rPr lang="en-US" sz="2300" dirty="0"/>
+            </a:br>
+            <a:br>
+              <a:rPr lang="en-US" sz="2300" dirty="0"/>
+            </a:br>
+            <a:br>
+              <a:rPr lang="en-US" sz="2300" dirty="0"/>
+            </a:br>
+            <a:endParaRPr lang="en-US" sz="2300" dirty="0"/>
+          </a:p>
+          <a:p>
+            <a:pPr marL="914400" lvl="2" indent="0">
+              <a:buNone/>
+            </a:pPr>
+            <a:endParaRPr lang="en-US" sz="2300" dirty="0"/>
+          </a:p>
+        </p:txBody>
+      </p:sp>
+      <p:sp>
+        <p:nvSpPr>
+          <p:cNvPr id="3" name="Footer Placeholder 2"/>
+          <p:cNvSpPr>
+            <a:spLocks noGrp="1"/>
+          </p:cNvSpPr>
+          <p:nvPr>
+            <p:ph type="ftr" sz="quarter" idx="3"/>
+          </p:nvPr>
+        </p:nvSpPr>
+        <p:spPr/>
+        <p:txBody>
+          <a:bodyPr/>
+          <a:lstStyle/>
+          <a:p>
+            <a:r>
+              <a:rPr lang="en-GB" dirty="0"/>
+              <a:t>Commercial In Confidence - ECS 2017  </a:t>
+            </a:r>
+          </a:p>
+        </p:txBody>
+      </p:sp>
+      <p:sp>
+        <p:nvSpPr>
+          <p:cNvPr id="4" name="TextBox 3"/>
+          <p:cNvSpPr txBox="1"/>
+          <p:nvPr/>
+        </p:nvSpPr>
+        <p:spPr>
+          <a:xfrm>
+            <a:off x="611560" y="692696"/>
+            <a:ext cx="7920880" cy="523220"/>
+          </a:xfrm>
+          <a:prstGeom prst="rect">
+            <a:avLst/>
+          </a:prstGeom>
+          <a:noFill/>
+        </p:spPr>
+        <p:txBody>
+          <a:bodyPr wrap="square" rtlCol="0">
+            <a:spAutoFit/>
+          </a:bodyPr>
+          <a:lstStyle/>
+          <a:p>
+            <a:r>
+              <a:rPr lang="en-GB" sz="2800" dirty="0">
+                <a:solidFill>
+                  <a:srgbClr val="0070B7"/>
+                </a:solidFill>
+                <a:latin typeface="Arial" panose="020B0604020202020204" pitchFamily="34" charset="0"/>
+                <a:cs typeface="Arial" panose="020B0604020202020204" pitchFamily="34" charset="0"/>
+              </a:rPr>
+              <a:t>What else can be customised?</a:t>
+            </a:r>
+          </a:p>
+        </p:txBody>
+      </p:sp>
+    </p:spTree>
+    <p:extLst>
+      <p:ext uri="{BB962C8B-B14F-4D97-AF65-F5344CB8AC3E}">
+        <p14:creationId xmlns:p14="http://schemas.microsoft.com/office/powerpoint/2010/main" val="199186152"/>
+      </p:ext>
+    </p:extLst>
+  </p:cSld>
+  <p:clrMapOvr>
+    <a:masterClrMapping/>
+  </p:clrMapOvr>
+</p:sld>
+</file>
+
+<file path=ppt/slides/slide12.xml><?xml version="1.0" encoding="utf-8"?>
+<p:sld xmlns:a="http://schemas.openxmlformats.org/drawingml/2006/main" xmlns:r="http://schemas.openxmlformats.org/officeDocument/2006/relationships" xmlns:p="http://schemas.openxmlformats.org/presentationml/2006/main">
+  <p:cSld>
+    <p:spTree>
+      <p:nvGrpSpPr>
+        <p:cNvPr id="1" name=""/>
+        <p:cNvGrpSpPr/>
+        <p:nvPr/>
+      </p:nvGrpSpPr>
+      <p:grpSpPr>
+        <a:xfrm>
+          <a:off x="0" y="0"/>
+          <a:ext cx="0" cy="0"/>
+          <a:chOff x="0" y="0"/>
+          <a:chExt cx="0" cy="0"/>
+        </a:xfrm>
+      </p:grpSpPr>
+      <p:sp>
+        <p:nvSpPr>
+          <p:cNvPr id="2" name="Footer Placeholder 1"/>
+          <p:cNvSpPr>
+            <a:spLocks noGrp="1"/>
+          </p:cNvSpPr>
+          <p:nvPr>
+            <p:ph type="ftr" sz="quarter" idx="11"/>
+          </p:nvPr>
+        </p:nvSpPr>
+        <p:spPr/>
+        <p:txBody>
+          <a:bodyPr/>
+          <a:lstStyle/>
+          <a:p>
+            <a:r>
+              <a:rPr lang="en-GB" dirty="0"/>
+              <a:t>Commercial In Confidence - ECS 2017  </a:t>
+            </a:r>
+          </a:p>
+        </p:txBody>
+      </p:sp>
+      <p:sp>
+        <p:nvSpPr>
+          <p:cNvPr id="3" name="Text Placeholder 2"/>
+          <p:cNvSpPr>
+            <a:spLocks noGrp="1"/>
+          </p:cNvSpPr>
+          <p:nvPr>
+            <p:ph type="body" idx="13"/>
+          </p:nvPr>
+        </p:nvSpPr>
+        <p:spPr/>
+        <p:txBody>
+          <a:bodyPr/>
+          <a:lstStyle/>
+          <a:p>
+            <a:r>
+              <a:rPr lang="en-GB" dirty="0"/>
+              <a:t>Thank You</a:t>
+            </a:r>
+          </a:p>
+        </p:txBody>
+      </p:sp>
+      <p:sp>
+        <p:nvSpPr>
+          <p:cNvPr id="4" name="Title 5"/>
           <p:cNvSpPr txBox="1">
             <a:spLocks/>
           </p:cNvSpPr>
@@ -3610,7 +4127,7 @@
     </p:spTree>
     <p:extLst>
       <p:ext uri="{BB962C8B-B14F-4D97-AF65-F5344CB8AC3E}">
-        <p14:creationId xmlns:p14="http://schemas.microsoft.com/office/powerpoint/2010/main" val="2954165043"/>
+        <p14:creationId xmlns:p14="http://schemas.microsoft.com/office/powerpoint/2010/main" val="2079933839"/>
       </p:ext>
     </p:extLst>
   </p:cSld>
@@ -3639,118 +4156,85 @@
       </p:grpSpPr>
       <p:sp>
         <p:nvSpPr>
-          <p:cNvPr id="2" name="Content Placeholder 1"/>
+          <p:cNvPr id="6" name="Title 5"/>
           <p:cNvSpPr>
             <a:spLocks noGrp="1"/>
           </p:cNvSpPr>
           <p:nvPr>
-            <p:ph idx="1"/>
+            <p:ph type="ctrTitle"/>
           </p:nvPr>
         </p:nvSpPr>
         <p:spPr>
           <a:xfrm>
-            <a:off x="611560" y="1600201"/>
-            <a:ext cx="7920880" cy="4525963"/>
+            <a:off x="611560" y="2276872"/>
+            <a:ext cx="7772400" cy="1470025"/>
           </a:xfrm>
         </p:spPr>
         <p:txBody>
-          <a:bodyPr>
-            <a:noAutofit/>
-          </a:bodyPr>
-          <a:lstStyle/>
-          <a:p>
-            <a:r>
-              <a:rPr lang="en-GB" sz="2300" dirty="0"/>
-              <a:t>Formed in 2016 by the acquisition of Forest Technologies, an Automation &amp; Transformation consultancy founded in 2003.</a:t>
-            </a:r>
-          </a:p>
-          <a:p>
-            <a:r>
-              <a:rPr lang="en-GB" sz="2300" dirty="0"/>
-              <a:t>12+ years focused only Continuous Delivery, DevOps and Digital Transformation.</a:t>
-            </a:r>
-            <a:endParaRPr lang="en-US" sz="2300" dirty="0"/>
-          </a:p>
-          <a:p>
-            <a:r>
-              <a:rPr lang="en-US" sz="2300" dirty="0"/>
-              <a:t>Tool agnostic agile methodology for delivering DevOps.</a:t>
-            </a:r>
-            <a:endParaRPr lang="en-GB" sz="2300" dirty="0"/>
-          </a:p>
-          <a:p>
-            <a:r>
-              <a:rPr lang="en-GB" sz="2300" dirty="0"/>
-              <a:t>DevOps solutions delivered successfully globally.</a:t>
-            </a:r>
-          </a:p>
-          <a:p>
-            <a:r>
-              <a:rPr lang="en-US" sz="2300" dirty="0"/>
-              <a:t>Customers from startups to global enterprises in all sectors including Finance, Telecoms, Government, Retail and Online Betting.</a:t>
-            </a:r>
-          </a:p>
-          <a:p>
-            <a:r>
-              <a:rPr lang="en-US" sz="2300" dirty="0"/>
-              <a:t>Teams based in London, Singapore and Pune with English, German, Spanish, French, Polish, Russian, Slovakian, Mandarin, Cantonese and Indian speaking consultants.</a:t>
-            </a:r>
-          </a:p>
-        </p:txBody>
-      </p:sp>
-      <p:sp>
-        <p:nvSpPr>
-          <p:cNvPr id="3" name="Footer Placeholder 2"/>
-          <p:cNvSpPr>
-            <a:spLocks noGrp="1"/>
-          </p:cNvSpPr>
-          <p:nvPr>
-            <p:ph type="ftr" sz="quarter" idx="3"/>
-          </p:nvPr>
-        </p:nvSpPr>
-        <p:spPr/>
-        <p:txBody>
           <a:bodyPr/>
           <a:lstStyle/>
           <a:p>
             <a:r>
               <a:rPr lang="en-GB" dirty="0"/>
-              <a:t>Commercial In Confidence - ECS 2017  </a:t>
-            </a:r>
-          </a:p>
-        </p:txBody>
-      </p:sp>
-      <p:sp>
-        <p:nvSpPr>
-          <p:cNvPr id="4" name="TextBox 3"/>
-          <p:cNvSpPr txBox="1"/>
+              <a:t>Auto-Scaling Selenium Grid with Docker using </a:t>
+            </a:r>
+            <a:r>
+              <a:rPr lang="en-GB" dirty="0" err="1"/>
+              <a:t>Zalenium</a:t>
+            </a:r>
+            <a:endParaRPr lang="en-GB" dirty="0"/>
+          </a:p>
+        </p:txBody>
+      </p:sp>
+      <p:sp>
+        <p:nvSpPr>
+          <p:cNvPr id="7" name="Title 5"/>
+          <p:cNvSpPr txBox="1">
+            <a:spLocks/>
+          </p:cNvSpPr>
           <p:nvPr/>
         </p:nvSpPr>
         <p:spPr>
           <a:xfrm>
-            <a:off x="611560" y="692696"/>
-            <a:ext cx="7920880" cy="523220"/>
+            <a:off x="539552" y="5661248"/>
+            <a:ext cx="7772400" cy="345281"/>
           </a:xfrm>
           <a:prstGeom prst="rect">
             <a:avLst/>
           </a:prstGeom>
-          <a:noFill/>
         </p:spPr>
         <p:txBody>
-          <a:bodyPr wrap="square" rtlCol="0">
-            <a:spAutoFit/>
+          <a:bodyPr vert="horz" lIns="91440" tIns="45720" rIns="91440" bIns="45720" rtlCol="0" anchor="ctr">
+            <a:normAutofit fontScale="85000" lnSpcReduction="20000"/>
           </a:bodyPr>
-          <a:lstStyle/>
-          <a:p>
-            <a:r>
-              <a:rPr lang="en-GB" sz="2800" dirty="0">
+          <a:lstStyle>
+            <a:lvl1pPr algn="l" defTabSz="914400" rtl="0" eaLnBrk="1" latinLnBrk="0" hangingPunct="1">
+              <a:spcBef>
+                <a:spcPct val="0"/>
+              </a:spcBef>
+              <a:buNone/>
+              <a:defRPr sz="4000" kern="1200">
                 <a:solidFill>
-                  <a:srgbClr val="0070B7"/>
+                  <a:schemeClr val="bg1"/>
                 </a:solidFill>
                 <a:latin typeface="Arial" panose="020B0604020202020204" pitchFamily="34" charset="0"/>
+                <a:ea typeface="+mj-ea"/>
                 <a:cs typeface="Arial" panose="020B0604020202020204" pitchFamily="34" charset="0"/>
-              </a:rPr>
-              <a:t>About ECS Digital </a:t>
+              </a:defRPr>
+            </a:lvl1pPr>
+          </a:lstStyle>
+          <a:p>
+            <a:r>
+              <a:rPr lang="en-GB" sz="2400" dirty="0"/>
+              <a:t>Ali Hill, Hammad </a:t>
+            </a:r>
+            <a:r>
+              <a:rPr lang="en-GB" sz="2400" dirty="0" err="1"/>
+              <a:t>Chandio</a:t>
+            </a:r>
+            <a:r>
+              <a:rPr lang="en-GB" sz="2400" dirty="0"/>
+              <a:t>, Farhan Shaikh</a:t>
             </a:r>
           </a:p>
         </p:txBody>
@@ -3758,7 +4242,7 @@
     </p:spTree>
     <p:extLst>
       <p:ext uri="{BB962C8B-B14F-4D97-AF65-F5344CB8AC3E}">
-        <p14:creationId xmlns:p14="http://schemas.microsoft.com/office/powerpoint/2010/main" val="4030457782"/>
+        <p14:creationId xmlns:p14="http://schemas.microsoft.com/office/powerpoint/2010/main" val="2954165043"/>
       </p:ext>
     </p:extLst>
   </p:cSld>
@@ -3809,7 +4293,21 @@
           <a:p>
             <a:r>
               <a:rPr lang="en-US" sz="2300" dirty="0"/>
-              <a:t>WebDriver</a:t>
+              <a:t>Ali Hill</a:t>
+            </a:r>
+          </a:p>
+          <a:p>
+            <a:pPr lvl="1"/>
+            <a:r>
+              <a:rPr lang="en-US" sz="2300" dirty="0"/>
+              <a:t>QA and Continuous Delivery Consultant (Edinburgh)</a:t>
+            </a:r>
+          </a:p>
+          <a:p>
+            <a:pPr lvl="1"/>
+            <a:r>
+              <a:rPr lang="en-US" sz="2300" dirty="0"/>
+              <a:t>Twitter: @ali_hill91</a:t>
             </a:r>
           </a:p>
           <a:p>
@@ -3817,36 +4315,39 @@
           </a:p>
           <a:p>
             <a:r>
-              <a:rPr lang="en-US" sz="2300"/>
-              <a:t>Docker-selenium</a:t>
+              <a:rPr lang="en-US" sz="2300" dirty="0"/>
+              <a:t>Hammad </a:t>
+            </a:r>
+            <a:r>
+              <a:rPr lang="en-US" sz="2300" dirty="0" err="1"/>
+              <a:t>Chandio</a:t>
             </a:r>
             <a:endParaRPr lang="en-US" sz="2300" dirty="0"/>
           </a:p>
           <a:p>
+            <a:pPr lvl="1"/>
+            <a:r>
+              <a:rPr lang="en-US" sz="2300" dirty="0"/>
+              <a:t>QA and Continuous Delivery Consultant (London)</a:t>
+            </a:r>
+          </a:p>
+          <a:p>
             <a:endParaRPr lang="en-US" sz="2300" dirty="0"/>
           </a:p>
           <a:p>
             <a:r>
               <a:rPr lang="en-US" sz="2300" dirty="0"/>
-              <a:t>Grid</a:t>
+              <a:t>Farhan Shaikh</a:t>
             </a:r>
           </a:p>
           <a:p>
             <a:pPr lvl="1"/>
             <a:r>
               <a:rPr lang="en-US" sz="2300" dirty="0"/>
-              <a:t>Difficult to maintain to keep versions maintained. </a:t>
-            </a:r>
-          </a:p>
-          <a:p>
-            <a:pPr lvl="1"/>
-            <a:r>
-              <a:rPr lang="en-US" sz="2300" dirty="0"/>
-              <a:t>Tests can fail due to flaky Grid.</a:t>
-            </a:r>
-          </a:p>
-          <a:p>
-            <a:pPr lvl="1"/>
+              <a:t>QA and Continuous Delivery Consultant (London)</a:t>
+            </a:r>
+          </a:p>
+          <a:p>
             <a:endParaRPr lang="en-US" sz="2300" dirty="0"/>
           </a:p>
         </p:txBody>
@@ -3903,7 +4404,7 @@
                 <a:latin typeface="Arial" panose="020B0604020202020204" pitchFamily="34" charset="0"/>
                 <a:cs typeface="Arial" panose="020B0604020202020204" pitchFamily="34" charset="0"/>
               </a:rPr>
-              <a:t>Selenium Overview</a:t>
+              <a:t>About Us</a:t>
             </a:r>
           </a:p>
         </p:txBody>
@@ -3938,91 +4439,93 @@
           <a:chExt cx="0" cy="0"/>
         </a:xfrm>
       </p:grpSpPr>
-      <p:sp>
-        <p:nvSpPr>
-          <p:cNvPr id="2" name="Content Placeholder 1"/>
-          <p:cNvSpPr>
-            <a:spLocks noGrp="1"/>
-          </p:cNvSpPr>
+      <p:pic>
+        <p:nvPicPr>
+          <p:cNvPr id="5" name="Content Placeholder 4">
+            <a:extLst>
+              <a:ext uri="{FF2B5EF4-FFF2-40B4-BE49-F238E27FC236}">
+                <a16:creationId xmlns:a16="http://schemas.microsoft.com/office/drawing/2014/main" id="{4D74334C-8D09-A647-8B55-CDD7F8C8B339}"/>
+              </a:ext>
+            </a:extLst>
+          </p:cNvPr>
+          <p:cNvPicPr>
+            <a:picLocks noGrp="1" noChangeAspect="1"/>
+          </p:cNvPicPr>
           <p:nvPr>
             <p:ph idx="1"/>
           </p:nvPr>
-        </p:nvSpPr>
+        </p:nvPicPr>
+        <p:blipFill>
+          <a:blip r:embed="rId3">
+            <a:extLst>
+              <a:ext uri="{28A0092B-C50C-407E-A947-70E740481C1C}">
+                <a14:useLocalDpi xmlns:a14="http://schemas.microsoft.com/office/drawing/2010/main" val="0"/>
+              </a:ext>
+            </a:extLst>
+          </a:blip>
+          <a:stretch>
+            <a:fillRect/>
+          </a:stretch>
+        </p:blipFill>
         <p:spPr>
           <a:xfrm>
-            <a:off x="611560" y="1600201"/>
-            <a:ext cx="7920880" cy="4525963"/>
+            <a:off x="634380" y="1808820"/>
+            <a:ext cx="3073524" cy="3073524"/>
           </a:xfrm>
         </p:spPr>
-        <p:txBody>
-          <a:bodyPr>
-            <a:noAutofit/>
-          </a:bodyPr>
-          <a:lstStyle/>
-          <a:p>
-            <a:r>
-              <a:rPr lang="en-US" sz="2300" dirty="0"/>
-              <a:t>Dynamic, on-demand Selenium Grid.</a:t>
-            </a:r>
-          </a:p>
-          <a:p>
-            <a:r>
-              <a:rPr lang="en-US" sz="2300" dirty="0"/>
-              <a:t>Auto-scales during run-time – including deleting nodes after tests are finished.</a:t>
-            </a:r>
-          </a:p>
-          <a:p>
-            <a:r>
-              <a:rPr lang="en-US" sz="2300" dirty="0"/>
-              <a:t>Based on docker-selenium.</a:t>
-            </a:r>
-          </a:p>
-          <a:p>
-            <a:r>
-              <a:rPr lang="en-US" sz="2300" dirty="0"/>
-              <a:t>Simple to set up and run.</a:t>
-            </a:r>
-          </a:p>
-          <a:p>
-            <a:pPr marL="0" indent="0">
-              <a:buNone/>
-            </a:pPr>
-            <a:endParaRPr lang="en-US" sz="2300" dirty="0"/>
-          </a:p>
-        </p:txBody>
-      </p:sp>
-      <p:sp>
-        <p:nvSpPr>
-          <p:cNvPr id="3" name="Footer Placeholder 2"/>
-          <p:cNvSpPr>
-            <a:spLocks noGrp="1"/>
-          </p:cNvSpPr>
-          <p:nvPr>
-            <p:ph type="ftr" sz="quarter" idx="3"/>
-          </p:nvPr>
-        </p:nvSpPr>
-        <p:spPr/>
-        <p:txBody>
-          <a:bodyPr/>
-          <a:lstStyle/>
-          <a:p>
-            <a:r>
-              <a:rPr lang="en-GB" dirty="0"/>
-              <a:t>Commercial In Confidence - ECS 2017  </a:t>
-            </a:r>
-          </a:p>
-        </p:txBody>
-      </p:sp>
-      <p:sp>
-        <p:nvSpPr>
-          <p:cNvPr id="4" name="TextBox 3"/>
+      </p:pic>
+      <p:pic>
+        <p:nvPicPr>
+          <p:cNvPr id="7" name="Picture 6">
+            <a:extLst>
+              <a:ext uri="{FF2B5EF4-FFF2-40B4-BE49-F238E27FC236}">
+                <a16:creationId xmlns:a16="http://schemas.microsoft.com/office/drawing/2014/main" id="{C434120E-954D-1F40-9F56-757C29069AA1}"/>
+              </a:ext>
+            </a:extLst>
+          </p:cNvPr>
+          <p:cNvPicPr>
+            <a:picLocks noChangeAspect="1"/>
+          </p:cNvPicPr>
+          <p:nvPr/>
+        </p:nvPicPr>
+        <p:blipFill>
+          <a:blip r:embed="rId4">
+            <a:extLst>
+              <a:ext uri="{28A0092B-C50C-407E-A947-70E740481C1C}">
+                <a14:useLocalDpi xmlns:a14="http://schemas.microsoft.com/office/drawing/2010/main" val="0"/>
+              </a:ext>
+            </a:extLst>
+          </a:blip>
+          <a:stretch>
+            <a:fillRect/>
+          </a:stretch>
+        </p:blipFill>
+        <p:spPr>
+          <a:xfrm>
+            <a:off x="4896036" y="2726922"/>
+            <a:ext cx="3611942" cy="1512256"/>
+          </a:xfrm>
+          <a:prstGeom prst="rect">
+            <a:avLst/>
+          </a:prstGeom>
+        </p:spPr>
+      </p:pic>
+      <p:sp>
+        <p:nvSpPr>
+          <p:cNvPr id="8" name="TextBox 7">
+            <a:extLst>
+              <a:ext uri="{FF2B5EF4-FFF2-40B4-BE49-F238E27FC236}">
+                <a16:creationId xmlns:a16="http://schemas.microsoft.com/office/drawing/2014/main" id="{47643DDA-87ED-724D-AF74-C1F3D7F53847}"/>
+              </a:ext>
+            </a:extLst>
+          </p:cNvPr>
           <p:cNvSpPr txBox="1"/>
           <p:nvPr/>
         </p:nvSpPr>
         <p:spPr>
           <a:xfrm>
-            <a:off x="611560" y="692696"/>
-            <a:ext cx="7920880" cy="523220"/>
+            <a:off x="683568" y="5427222"/>
+            <a:ext cx="7824410" cy="300082"/>
           </a:xfrm>
           <a:prstGeom prst="rect">
             <a:avLst/>
@@ -4035,35 +4538,53 @@
           </a:bodyPr>
           <a:lstStyle/>
           <a:p>
-            <a:r>
-              <a:rPr lang="en-GB" sz="2800" dirty="0">
-                <a:solidFill>
-                  <a:srgbClr val="0070B7"/>
-                </a:solidFill>
-                <a:latin typeface="Arial" panose="020B0604020202020204" pitchFamily="34" charset="0"/>
-                <a:cs typeface="Arial" panose="020B0604020202020204" pitchFamily="34" charset="0"/>
-              </a:rPr>
-              <a:t>What is </a:t>
-            </a:r>
-            <a:r>
-              <a:rPr lang="en-GB" sz="2800" dirty="0" err="1">
-                <a:solidFill>
-                  <a:srgbClr val="0070B7"/>
-                </a:solidFill>
-                <a:latin typeface="Arial" panose="020B0604020202020204" pitchFamily="34" charset="0"/>
-                <a:cs typeface="Arial" panose="020B0604020202020204" pitchFamily="34" charset="0"/>
-              </a:rPr>
-              <a:t>Zalenium</a:t>
-            </a:r>
-            <a:r>
-              <a:rPr lang="en-GB" sz="2800" dirty="0">
-                <a:solidFill>
-                  <a:srgbClr val="0070B7"/>
-                </a:solidFill>
-                <a:latin typeface="Arial" panose="020B0604020202020204" pitchFamily="34" charset="0"/>
-                <a:cs typeface="Arial" panose="020B0604020202020204" pitchFamily="34" charset="0"/>
-              </a:rPr>
-              <a:t>?</a:t>
+            <a:pPr algn="ctr"/>
+            <a:r>
+              <a:rPr lang="en-US" sz="1350" dirty="0"/>
+              <a:t>Thursday Nov 1 – Friday Nov 2</a:t>
+            </a:r>
+          </a:p>
+        </p:txBody>
+      </p:sp>
+      <p:sp>
+        <p:nvSpPr>
+          <p:cNvPr id="9" name="TextBox 8">
+            <a:extLst>
+              <a:ext uri="{FF2B5EF4-FFF2-40B4-BE49-F238E27FC236}">
+                <a16:creationId xmlns:a16="http://schemas.microsoft.com/office/drawing/2014/main" id="{12EEDC4B-D179-5240-94EF-03491ACB3399}"/>
+              </a:ext>
+            </a:extLst>
+          </p:cNvPr>
+          <p:cNvSpPr txBox="1"/>
+          <p:nvPr/>
+        </p:nvSpPr>
+        <p:spPr>
+          <a:xfrm>
+            <a:off x="2257417" y="5060867"/>
+            <a:ext cx="4726615" cy="300082"/>
+          </a:xfrm>
+          <a:prstGeom prst="rect">
+            <a:avLst/>
+          </a:prstGeom>
+          <a:noFill/>
+        </p:spPr>
+        <p:txBody>
+          <a:bodyPr wrap="none" rtlCol="0">
+            <a:spAutoFit/>
+          </a:bodyPr>
+          <a:lstStyle/>
+          <a:p>
+            <a:r>
+              <a:rPr lang="en-US" sz="1350" dirty="0"/>
+              <a:t>https://</a:t>
+            </a:r>
+            <a:r>
+              <a:rPr lang="en-US" sz="1350" dirty="0" err="1"/>
+              <a:t>www.devopsdays.org</a:t>
+            </a:r>
+            <a:r>
+              <a:rPr lang="en-US" sz="1350" dirty="0"/>
+              <a:t>/events/2018-edinburgh/welcome/</a:t>
             </a:r>
           </a:p>
         </p:txBody>
@@ -4071,7 +4592,7 @@
     </p:spTree>
     <p:extLst>
       <p:ext uri="{BB962C8B-B14F-4D97-AF65-F5344CB8AC3E}">
-        <p14:creationId xmlns:p14="http://schemas.microsoft.com/office/powerpoint/2010/main" val="1437738720"/>
+        <p14:creationId xmlns:p14="http://schemas.microsoft.com/office/powerpoint/2010/main" val="3071101924"/>
       </p:ext>
     </p:extLst>
   </p:cSld>
@@ -4122,36 +4643,44 @@
           <a:p>
             <a:r>
               <a:rPr lang="en-US" sz="2300" dirty="0"/>
-              <a:t>Hard to maintain stable Selenium Grid.</a:t>
-            </a:r>
+              <a:t>WebDriver</a:t>
+            </a:r>
+          </a:p>
+          <a:p>
+            <a:endParaRPr lang="en-US" sz="2300" dirty="0"/>
+          </a:p>
+          <a:p>
+            <a:r>
+              <a:rPr lang="en-US" sz="2300"/>
+              <a:t>Docker-selenium</a:t>
+            </a:r>
+            <a:endParaRPr lang="en-US" sz="2300" dirty="0"/>
+          </a:p>
+          <a:p>
+            <a:endParaRPr lang="en-US" sz="2300" dirty="0"/>
           </a:p>
           <a:p>
             <a:r>
               <a:rPr lang="en-US" sz="2300" dirty="0"/>
-              <a:t>Difficult to maintain all requirements in Grid (e.g. different browsers).</a:t>
-            </a:r>
-          </a:p>
-          <a:p>
+              <a:t>Grid</a:t>
+            </a:r>
+          </a:p>
+          <a:p>
+            <a:pPr lvl="1"/>
             <a:r>
               <a:rPr lang="en-US" sz="2300" dirty="0"/>
-              <a:t>Allows anyone in your team to have flexible and disposable Grid infrastructure.</a:t>
-            </a:r>
-          </a:p>
-          <a:p>
+              <a:t>Difficult to maintain to keep versions maintained. </a:t>
+            </a:r>
+          </a:p>
+          <a:p>
+            <a:pPr lvl="1"/>
             <a:r>
               <a:rPr lang="en-US" sz="2300" dirty="0"/>
-              <a:t>Compliments providers like </a:t>
-            </a:r>
-            <a:r>
-              <a:rPr lang="en-US" sz="2300" dirty="0" err="1"/>
-              <a:t>SauceLabs</a:t>
-            </a:r>
-            <a:r>
-              <a:rPr lang="en-US" sz="2300" dirty="0"/>
-              <a:t>. Provides a local alternative.</a:t>
-            </a:r>
-          </a:p>
-          <a:p>
+              <a:t>Tests can fail due to flaky Grid.</a:t>
+            </a:r>
+          </a:p>
+          <a:p>
+            <a:pPr lvl="1"/>
             <a:endParaRPr lang="en-US" sz="2300" dirty="0"/>
           </a:p>
         </p:txBody>
@@ -4208,27 +4737,7 @@
                 <a:latin typeface="Arial" panose="020B0604020202020204" pitchFamily="34" charset="0"/>
                 <a:cs typeface="Arial" panose="020B0604020202020204" pitchFamily="34" charset="0"/>
               </a:rPr>
-              <a:t>Why use </a:t>
-            </a:r>
-            <a:r>
-              <a:rPr lang="en-GB" sz="2800" dirty="0" err="1">
-                <a:solidFill>
-                  <a:srgbClr val="0070B7"/>
-                </a:solidFill>
-                <a:latin typeface="Arial" panose="020B0604020202020204" pitchFamily="34" charset="0"/>
-                <a:cs typeface="Arial" panose="020B0604020202020204" pitchFamily="34" charset="0"/>
-              </a:rPr>
-              <a:t>Zalenium</a:t>
-            </a:r>
-            <a:r>
-              <a:rPr lang="en-GB" sz="2800" dirty="0">
-                <a:solidFill>
-                  <a:srgbClr val="0070B7"/>
-                </a:solidFill>
-                <a:latin typeface="Arial" panose="020B0604020202020204" pitchFamily="34" charset="0"/>
-                <a:cs typeface="Arial" panose="020B0604020202020204" pitchFamily="34" charset="0"/>
-              </a:rPr>
-              <a:t>?</a:t>
+              <a:t>Selenium Overview</a:t>
             </a:r>
           </a:p>
         </p:txBody>
@@ -4236,7 +4745,7 @@
     </p:spTree>
     <p:extLst>
       <p:ext uri="{BB962C8B-B14F-4D97-AF65-F5344CB8AC3E}">
-        <p14:creationId xmlns:p14="http://schemas.microsoft.com/office/powerpoint/2010/main" val="1200131251"/>
+        <p14:creationId xmlns:p14="http://schemas.microsoft.com/office/powerpoint/2010/main" val="1663746683"/>
       </p:ext>
     </p:extLst>
   </p:cSld>
@@ -4287,32 +4796,26 @@
           <a:p>
             <a:r>
               <a:rPr lang="en-US" sz="2300" dirty="0"/>
-              <a:t>A Selenium Grid Hub starts</a:t>
+              <a:t>Dynamic, on-demand Selenium Grid.</a:t>
             </a:r>
           </a:p>
           <a:p>
             <a:r>
               <a:rPr lang="en-US" sz="2300" dirty="0"/>
-              <a:t>A docker-selenium Starter Proxy then starts. This handles incoming requests.</a:t>
+              <a:t>Auto-scales during run-time – including deleting nodes after tests are finished.</a:t>
             </a:r>
           </a:p>
           <a:p>
             <a:r>
               <a:rPr lang="en-US" sz="2300" dirty="0"/>
-              <a:t>Cloud Proxy (e.g. Sauce Labs)</a:t>
-            </a:r>
-          </a:p>
-          <a:p>
-            <a:endParaRPr lang="en-US" sz="2300" dirty="0"/>
+              <a:t>Based on docker-selenium.</a:t>
+            </a:r>
           </a:p>
           <a:p>
             <a:r>
               <a:rPr lang="en-US" sz="2300" dirty="0"/>
-              <a:t>Test request is sent to Hub from local machine. Docker-selenium then analyses the test and creates a new docker-selenium container which registers itself to the Hub. Hub then assigns new test to the container. Then test is executed on the selenium container. Once it is complete the node shuts down, after taking video recording and saving file locally to users’ machine.</a:t>
-            </a:r>
-          </a:p>
-          <a:p>
-            <a:endParaRPr lang="en-US" sz="2300" dirty="0"/>
+              <a:t>Simple to set up and run.</a:t>
+            </a:r>
           </a:p>
           <a:p>
             <a:pPr marL="0" indent="0">
@@ -4374,7 +4877,27 @@
                 <a:latin typeface="Arial" panose="020B0604020202020204" pitchFamily="34" charset="0"/>
                 <a:cs typeface="Arial" panose="020B0604020202020204" pitchFamily="34" charset="0"/>
               </a:rPr>
-              <a:t>How it works</a:t>
+              <a:t>What is </a:t>
+            </a:r>
+            <a:r>
+              <a:rPr lang="en-GB" sz="2800" dirty="0" err="1">
+                <a:solidFill>
+                  <a:srgbClr val="0070B7"/>
+                </a:solidFill>
+                <a:latin typeface="Arial" panose="020B0604020202020204" pitchFamily="34" charset="0"/>
+                <a:cs typeface="Arial" panose="020B0604020202020204" pitchFamily="34" charset="0"/>
+              </a:rPr>
+              <a:t>Zalenium</a:t>
+            </a:r>
+            <a:r>
+              <a:rPr lang="en-GB" sz="2800" dirty="0">
+                <a:solidFill>
+                  <a:srgbClr val="0070B7"/>
+                </a:solidFill>
+                <a:latin typeface="Arial" panose="020B0604020202020204" pitchFamily="34" charset="0"/>
+                <a:cs typeface="Arial" panose="020B0604020202020204" pitchFamily="34" charset="0"/>
+              </a:rPr>
+              <a:t>?</a:t>
             </a:r>
           </a:p>
         </p:txBody>
@@ -4382,7 +4905,7 @@
     </p:spTree>
     <p:extLst>
       <p:ext uri="{BB962C8B-B14F-4D97-AF65-F5344CB8AC3E}">
-        <p14:creationId xmlns:p14="http://schemas.microsoft.com/office/powerpoint/2010/main" val="2596209834"/>
+        <p14:creationId xmlns:p14="http://schemas.microsoft.com/office/powerpoint/2010/main" val="1437738720"/>
       </p:ext>
     </p:extLst>
   </p:cSld>
@@ -4433,7 +4956,25 @@
           <a:p>
             <a:r>
               <a:rPr lang="en-US" sz="2300" dirty="0"/>
-              <a:t>If the Hub receives a test that docker-selenium is not compatible with e.g. Safari, IE. Hub will ask docker-selenium proxy if it can run it. If it can’t then it will talk to Cloud Proxy and run test on Cloud Proxy (e.g. </a:t>
+              <a:t>Hard to maintain stable Selenium Grid.</a:t>
+            </a:r>
+          </a:p>
+          <a:p>
+            <a:r>
+              <a:rPr lang="en-US" sz="2300" dirty="0"/>
+              <a:t>Difficult to maintain all requirements in Grid (e.g. different browsers).</a:t>
+            </a:r>
+          </a:p>
+          <a:p>
+            <a:r>
+              <a:rPr lang="en-US" sz="2300" dirty="0"/>
+              <a:t>Allows anyone in your team to have flexible and disposable Grid infrastructure.</a:t>
+            </a:r>
+          </a:p>
+          <a:p>
+            <a:r>
+              <a:rPr lang="en-US" sz="2300" dirty="0"/>
+              <a:t>Compliments providers like </a:t>
             </a:r>
             <a:r>
               <a:rPr lang="en-US" sz="2300" dirty="0" err="1"/>
@@ -4441,13 +4982,10 @@
             </a:r>
             <a:r>
               <a:rPr lang="en-US" sz="2300" dirty="0"/>
-              <a:t>) if available. </a:t>
-            </a:r>
-          </a:p>
-          <a:p>
-            <a:pPr marL="0" indent="0">
-              <a:buNone/>
-            </a:pPr>
+              <a:t>. Provides a local alternative.</a:t>
+            </a:r>
+          </a:p>
+          <a:p>
             <a:endParaRPr lang="en-US" sz="2300" dirty="0"/>
           </a:p>
         </p:txBody>
@@ -4504,7 +5042,27 @@
                 <a:latin typeface="Arial" panose="020B0604020202020204" pitchFamily="34" charset="0"/>
                 <a:cs typeface="Arial" panose="020B0604020202020204" pitchFamily="34" charset="0"/>
               </a:rPr>
-              <a:t>How it works</a:t>
+              <a:t>Why use </a:t>
+            </a:r>
+            <a:r>
+              <a:rPr lang="en-GB" sz="2800" dirty="0" err="1">
+                <a:solidFill>
+                  <a:srgbClr val="0070B7"/>
+                </a:solidFill>
+                <a:latin typeface="Arial" panose="020B0604020202020204" pitchFamily="34" charset="0"/>
+                <a:cs typeface="Arial" panose="020B0604020202020204" pitchFamily="34" charset="0"/>
+              </a:rPr>
+              <a:t>Zalenium</a:t>
+            </a:r>
+            <a:r>
+              <a:rPr lang="en-GB" sz="2800" dirty="0">
+                <a:solidFill>
+                  <a:srgbClr val="0070B7"/>
+                </a:solidFill>
+                <a:latin typeface="Arial" panose="020B0604020202020204" pitchFamily="34" charset="0"/>
+                <a:cs typeface="Arial" panose="020B0604020202020204" pitchFamily="34" charset="0"/>
+              </a:rPr>
+              <a:t>?</a:t>
             </a:r>
           </a:p>
         </p:txBody>
@@ -4512,7 +5070,7 @@
     </p:spTree>
     <p:extLst>
       <p:ext uri="{BB962C8B-B14F-4D97-AF65-F5344CB8AC3E}">
-        <p14:creationId xmlns:p14="http://schemas.microsoft.com/office/powerpoint/2010/main" val="3047678062"/>
+        <p14:creationId xmlns:p14="http://schemas.microsoft.com/office/powerpoint/2010/main" val="1200131251"/>
       </p:ext>
     </p:extLst>
   </p:cSld>
@@ -4563,88 +5121,35 @@
           <a:p>
             <a:r>
               <a:rPr lang="en-US" sz="2300" dirty="0"/>
-              <a:t>As well as running tests on VMs, </a:t>
-            </a:r>
-            <a:r>
-              <a:rPr lang="en-US" sz="2300" dirty="0" err="1"/>
-              <a:t>Zalenium</a:t>
-            </a:r>
+              <a:t>A Selenium Grid Hub starts</a:t>
+            </a:r>
+          </a:p>
+          <a:p>
             <a:r>
               <a:rPr lang="en-US" sz="2300" dirty="0"/>
-              <a:t> also has support for the following providers:</a:t>
-            </a:r>
-          </a:p>
-          <a:p>
-            <a:pPr lvl="2"/>
+              <a:t>A docker-selenium Starter Proxy then starts. This handles incoming requests.</a:t>
+            </a:r>
+          </a:p>
+          <a:p>
             <a:r>
               <a:rPr lang="en-US" sz="2300" dirty="0"/>
-              <a:t>Sauce Labs</a:t>
-            </a:r>
-          </a:p>
-          <a:p>
-            <a:pPr lvl="2"/>
-            <a:r>
-              <a:rPr lang="en-US" sz="2300" dirty="0" err="1"/>
-              <a:t>TestingBot</a:t>
-            </a:r>
+              <a:t>Cloud Proxy (e.g. Sauce Labs)</a:t>
+            </a:r>
+          </a:p>
+          <a:p>
             <a:endParaRPr lang="en-US" sz="2300" dirty="0"/>
           </a:p>
           <a:p>
-            <a:pPr lvl="2"/>
             <a:r>
               <a:rPr lang="en-US" sz="2300" dirty="0"/>
-              <a:t>Browser Stack</a:t>
-            </a:r>
-          </a:p>
-          <a:p>
-            <a:pPr marL="914400" lvl="2" indent="0">
-              <a:buNone/>
-            </a:pPr>
+              <a:t>Test request is sent to Hub from local machine. Docker-selenium then analyses the test and creates a new docker-selenium container which registers itself to the Hub. Hub then assigns new test to the container. Then test is executed on the selenium container. Once it is complete the node shuts down, after taking video recording and saving file locally to users’ machine.</a:t>
+            </a:r>
+          </a:p>
+          <a:p>
             <a:endParaRPr lang="en-US" sz="2300" dirty="0"/>
           </a:p>
           <a:p>
-            <a:r>
-              <a:rPr lang="en-US" sz="2300" dirty="0"/>
-              <a:t>To access these, add the following to your startup command:</a:t>
-            </a:r>
-          </a:p>
-          <a:p>
             <a:pPr marL="0" indent="0">
-              <a:buNone/>
-            </a:pPr>
-            <a:r>
-              <a:rPr lang="en-US" sz="2300" i="1" dirty="0"/>
-              <a:t>	</a:t>
-            </a:r>
-            <a:r>
-              <a:rPr lang="en-GB" i="1" dirty="0"/>
-              <a:t>export SAUCE_USERNAME=&lt;your Sauce Labs username&gt; export 	SAUCE_ACCESS_KEY=&lt;your Sauce Labs access key&gt; export 	SAUCE_LABS_URL=&lt;your Sauce Labs </a:t>
-            </a:r>
-            <a:r>
-              <a:rPr lang="en-GB" i="1" dirty="0" err="1"/>
-              <a:t>url:port</a:t>
-            </a:r>
-            <a:r>
-              <a:rPr lang="en-GB" i="1" dirty="0"/>
-              <a:t> number&gt; </a:t>
-            </a:r>
-            <a:r>
-              <a:rPr lang="en-US" sz="2300" i="1" dirty="0"/>
-              <a:t> </a:t>
-            </a:r>
-            <a:br>
-              <a:rPr lang="en-US" sz="2300" dirty="0"/>
-            </a:br>
-            <a:br>
-              <a:rPr lang="en-US" sz="2300" dirty="0"/>
-            </a:br>
-            <a:br>
-              <a:rPr lang="en-US" sz="2300" dirty="0"/>
-            </a:br>
-            <a:endParaRPr lang="en-US" sz="2300" dirty="0"/>
-          </a:p>
-          <a:p>
-            <a:pPr marL="914400" lvl="2" indent="0">
               <a:buNone/>
             </a:pPr>
             <a:endParaRPr lang="en-US" sz="2300" dirty="0"/>
@@ -4703,7 +5208,7 @@
                 <a:latin typeface="Arial" panose="020B0604020202020204" pitchFamily="34" charset="0"/>
                 <a:cs typeface="Arial" panose="020B0604020202020204" pitchFamily="34" charset="0"/>
               </a:rPr>
-              <a:t>Running Tests on Cloud Proxy</a:t>
+              <a:t>How it works</a:t>
             </a:r>
           </a:p>
         </p:txBody>
@@ -4711,7 +5216,7 @@
     </p:spTree>
     <p:extLst>
       <p:ext uri="{BB962C8B-B14F-4D97-AF65-F5344CB8AC3E}">
-        <p14:creationId xmlns:p14="http://schemas.microsoft.com/office/powerpoint/2010/main" val="630844028"/>
+        <p14:creationId xmlns:p14="http://schemas.microsoft.com/office/powerpoint/2010/main" val="2596209834"/>
       </p:ext>
     </p:extLst>
   </p:cSld>
@@ -4740,12 +5245,55 @@
       </p:grpSpPr>
       <p:sp>
         <p:nvSpPr>
-          <p:cNvPr id="2" name="Footer Placeholder 1"/>
+          <p:cNvPr id="2" name="Content Placeholder 1"/>
           <p:cNvSpPr>
             <a:spLocks noGrp="1"/>
           </p:cNvSpPr>
           <p:nvPr>
-            <p:ph type="ftr" sz="quarter" idx="11"/>
+            <p:ph idx="1"/>
+          </p:nvPr>
+        </p:nvSpPr>
+        <p:spPr>
+          <a:xfrm>
+            <a:off x="611560" y="1600201"/>
+            <a:ext cx="7920880" cy="4525963"/>
+          </a:xfrm>
+        </p:spPr>
+        <p:txBody>
+          <a:bodyPr>
+            <a:noAutofit/>
+          </a:bodyPr>
+          <a:lstStyle/>
+          <a:p>
+            <a:r>
+              <a:rPr lang="en-US" sz="2300" dirty="0"/>
+              <a:t>If the Hub receives a test that docker-selenium is not compatible with e.g. Safari, IE. Hub will ask docker-selenium proxy if it can run it. If it can’t then it will talk to Cloud Proxy and run test on Cloud Proxy (e.g. </a:t>
+            </a:r>
+            <a:r>
+              <a:rPr lang="en-US" sz="2300" dirty="0" err="1"/>
+              <a:t>SauceLabs</a:t>
+            </a:r>
+            <a:r>
+              <a:rPr lang="en-US" sz="2300" dirty="0"/>
+              <a:t>) if available. </a:t>
+            </a:r>
+          </a:p>
+          <a:p>
+            <a:pPr marL="0" indent="0">
+              <a:buNone/>
+            </a:pPr>
+            <a:endParaRPr lang="en-US" sz="2300" dirty="0"/>
+          </a:p>
+        </p:txBody>
+      </p:sp>
+      <p:sp>
+        <p:nvSpPr>
+          <p:cNvPr id="3" name="Footer Placeholder 2"/>
+          <p:cNvSpPr>
+            <a:spLocks noGrp="1"/>
+          </p:cNvSpPr>
+          <p:nvPr>
+            <p:ph type="ftr" sz="quarter" idx="3"/>
           </p:nvPr>
         </p:nvSpPr>
         <p:spPr/>
@@ -4762,75 +5310,35 @@
       </p:sp>
       <p:sp>
         <p:nvSpPr>
-          <p:cNvPr id="3" name="Text Placeholder 2"/>
-          <p:cNvSpPr>
-            <a:spLocks noGrp="1"/>
-          </p:cNvSpPr>
-          <p:nvPr>
-            <p:ph type="body" idx="13"/>
-          </p:nvPr>
-        </p:nvSpPr>
-        <p:spPr/>
-        <p:txBody>
-          <a:bodyPr/>
-          <a:lstStyle/>
-          <a:p>
-            <a:r>
-              <a:rPr lang="en-GB" dirty="0"/>
-              <a:t>Thank You</a:t>
-            </a:r>
-          </a:p>
-        </p:txBody>
-      </p:sp>
-      <p:sp>
-        <p:nvSpPr>
-          <p:cNvPr id="4" name="Title 5"/>
-          <p:cNvSpPr txBox="1">
-            <a:spLocks/>
-          </p:cNvSpPr>
+          <p:cNvPr id="4" name="TextBox 3"/>
+          <p:cNvSpPr txBox="1"/>
           <p:nvPr/>
         </p:nvSpPr>
         <p:spPr>
           <a:xfrm>
-            <a:off x="539552" y="5661248"/>
-            <a:ext cx="7772400" cy="345281"/>
+            <a:off x="611560" y="692696"/>
+            <a:ext cx="7920880" cy="523220"/>
           </a:xfrm>
           <a:prstGeom prst="rect">
             <a:avLst/>
           </a:prstGeom>
+          <a:noFill/>
         </p:spPr>
         <p:txBody>
-          <a:bodyPr vert="horz" lIns="91440" tIns="45720" rIns="91440" bIns="45720" rtlCol="0" anchor="ctr">
-            <a:normAutofit fontScale="85000" lnSpcReduction="20000"/>
+          <a:bodyPr wrap="square" rtlCol="0">
+            <a:spAutoFit/>
           </a:bodyPr>
-          <a:lstStyle>
-            <a:lvl1pPr algn="l" defTabSz="914400" rtl="0" eaLnBrk="1" latinLnBrk="0" hangingPunct="1">
-              <a:spcBef>
-                <a:spcPct val="0"/>
-              </a:spcBef>
-              <a:buNone/>
-              <a:defRPr sz="4000" kern="1200">
+          <a:lstStyle/>
+          <a:p>
+            <a:r>
+              <a:rPr lang="en-GB" sz="2800" dirty="0">
                 <a:solidFill>
-                  <a:schemeClr val="bg1"/>
+                  <a:srgbClr val="0070B7"/>
                 </a:solidFill>
                 <a:latin typeface="Arial" panose="020B0604020202020204" pitchFamily="34" charset="0"/>
-                <a:ea typeface="+mj-ea"/>
                 <a:cs typeface="Arial" panose="020B0604020202020204" pitchFamily="34" charset="0"/>
-              </a:defRPr>
-            </a:lvl1pPr>
-          </a:lstStyle>
-          <a:p>
-            <a:r>
-              <a:rPr lang="en-GB" sz="2400" dirty="0"/>
-              <a:t>Ali Hill, Hammad </a:t>
-            </a:r>
-            <a:r>
-              <a:rPr lang="en-GB" sz="2400" dirty="0" err="1"/>
-              <a:t>Chandio</a:t>
-            </a:r>
-            <a:r>
-              <a:rPr lang="en-GB" sz="2400" dirty="0"/>
-              <a:t>, Farhan Shaikh</a:t>
+              </a:rPr>
+              <a:t>How it works</a:t>
             </a:r>
           </a:p>
         </p:txBody>
@@ -4838,7 +5346,7 @@
     </p:spTree>
     <p:extLst>
       <p:ext uri="{BB962C8B-B14F-4D97-AF65-F5344CB8AC3E}">
-        <p14:creationId xmlns:p14="http://schemas.microsoft.com/office/powerpoint/2010/main" val="2079933839"/>
+        <p14:creationId xmlns:p14="http://schemas.microsoft.com/office/powerpoint/2010/main" val="3047678062"/>
       </p:ext>
     </p:extLst>
   </p:cSld>

</xml_diff>

<commit_message>
ReadMe and PowerPoint update
</commit_message>
<xml_diff>
--- a/ECS_Digital_Template.pptx
+++ b/ECS_Digital_Template.pptx
@@ -5,10 +5,10 @@
     <p:sldMasterId id="2147483648" r:id="rId4"/>
   </p:sldMasterIdLst>
   <p:notesMasterIdLst>
-    <p:notesMasterId r:id="rId17"/>
+    <p:notesMasterId r:id="rId19"/>
   </p:notesMasterIdLst>
   <p:handoutMasterIdLst>
-    <p:handoutMasterId r:id="rId18"/>
+    <p:handoutMasterId r:id="rId20"/>
   </p:handoutMasterIdLst>
   <p:sldIdLst>
     <p:sldId id="303" r:id="rId5"/>
@@ -20,9 +20,11 @@
     <p:sldId id="292" r:id="rId11"/>
     <p:sldId id="295" r:id="rId12"/>
     <p:sldId id="296" r:id="rId13"/>
-    <p:sldId id="293" r:id="rId14"/>
-    <p:sldId id="297" r:id="rId15"/>
-    <p:sldId id="267" r:id="rId16"/>
+    <p:sldId id="307" r:id="rId14"/>
+    <p:sldId id="308" r:id="rId15"/>
+    <p:sldId id="293" r:id="rId16"/>
+    <p:sldId id="297" r:id="rId17"/>
+    <p:sldId id="267" r:id="rId18"/>
   </p:sldIdLst>
   <p:sldSz cx="9144000" cy="6858000" type="screen4x3"/>
   <p:notesSz cx="6858000" cy="9144000"/>
@@ -664,6 +666,90 @@
 </file>
 
 <file path=ppt/notesSlides/notesSlide1.xml><?xml version="1.0" encoding="utf-8"?>
+<p:notes xmlns:a="http://schemas.openxmlformats.org/drawingml/2006/main" xmlns:r="http://schemas.openxmlformats.org/officeDocument/2006/relationships" xmlns:p="http://schemas.openxmlformats.org/presentationml/2006/main">
+  <p:cSld>
+    <p:spTree>
+      <p:nvGrpSpPr>
+        <p:cNvPr id="1" name=""/>
+        <p:cNvGrpSpPr/>
+        <p:nvPr/>
+      </p:nvGrpSpPr>
+      <p:grpSpPr>
+        <a:xfrm>
+          <a:off x="0" y="0"/>
+          <a:ext cx="0" cy="0"/>
+          <a:chOff x="0" y="0"/>
+          <a:chExt cx="0" cy="0"/>
+        </a:xfrm>
+      </p:grpSpPr>
+      <p:sp>
+        <p:nvSpPr>
+          <p:cNvPr id="2" name="Slide Image Placeholder 1"/>
+          <p:cNvSpPr>
+            <a:spLocks noGrp="1" noRot="1" noChangeAspect="1"/>
+          </p:cNvSpPr>
+          <p:nvPr>
+            <p:ph type="sldImg"/>
+          </p:nvPr>
+        </p:nvSpPr>
+        <p:spPr/>
+      </p:sp>
+      <p:sp>
+        <p:nvSpPr>
+          <p:cNvPr id="3" name="Notes Placeholder 2"/>
+          <p:cNvSpPr>
+            <a:spLocks noGrp="1"/>
+          </p:cNvSpPr>
+          <p:nvPr>
+            <p:ph type="body" idx="1"/>
+          </p:nvPr>
+        </p:nvSpPr>
+        <p:spPr/>
+        <p:txBody>
+          <a:bodyPr/>
+          <a:lstStyle/>
+          <a:p>
+            <a:endParaRPr lang="en-US" dirty="0"/>
+          </a:p>
+        </p:txBody>
+      </p:sp>
+      <p:sp>
+        <p:nvSpPr>
+          <p:cNvPr id="4" name="Slide Number Placeholder 3"/>
+          <p:cNvSpPr>
+            <a:spLocks noGrp="1"/>
+          </p:cNvSpPr>
+          <p:nvPr>
+            <p:ph type="sldNum" sz="quarter" idx="5"/>
+          </p:nvPr>
+        </p:nvSpPr>
+        <p:spPr/>
+        <p:txBody>
+          <a:bodyPr/>
+          <a:lstStyle/>
+          <a:p>
+            <a:fld id="{7A507E9C-E9CF-45CC-A225-331D2025989C}" type="slidenum">
+              <a:rPr lang="en-GB" smtClean="0"/>
+              <a:t>3</a:t>
+            </a:fld>
+            <a:endParaRPr lang="en-GB" dirty="0"/>
+          </a:p>
+        </p:txBody>
+      </p:sp>
+    </p:spTree>
+    <p:extLst>
+      <p:ext uri="{BB962C8B-B14F-4D97-AF65-F5344CB8AC3E}">
+        <p14:creationId xmlns:p14="http://schemas.microsoft.com/office/powerpoint/2010/main" val="2549555706"/>
+      </p:ext>
+    </p:extLst>
+  </p:cSld>
+  <p:clrMapOvr>
+    <a:masterClrMapping/>
+  </p:clrMapOvr>
+</p:notes>
+</file>
+
+<file path=ppt/notesSlides/notesSlide2.xml><?xml version="1.0" encoding="utf-8"?>
 <p:notes xmlns:a="http://schemas.openxmlformats.org/drawingml/2006/main" xmlns:r="http://schemas.openxmlformats.org/officeDocument/2006/relationships" xmlns:p="http://schemas.openxmlformats.org/presentationml/2006/main">
   <p:cSld>
     <p:spTree>
@@ -3700,118 +3786,41 @@
           <a:chExt cx="0" cy="0"/>
         </a:xfrm>
       </p:grpSpPr>
-      <p:sp>
-        <p:nvSpPr>
-          <p:cNvPr id="2" name="Content Placeholder 1"/>
-          <p:cNvSpPr>
-            <a:spLocks noGrp="1"/>
-          </p:cNvSpPr>
+      <p:pic>
+        <p:nvPicPr>
+          <p:cNvPr id="6" name="Content Placeholder 5">
+            <a:extLst>
+              <a:ext uri="{FF2B5EF4-FFF2-40B4-BE49-F238E27FC236}">
+                <a16:creationId xmlns:a16="http://schemas.microsoft.com/office/drawing/2014/main" id="{95677DF3-8E4B-F040-9C38-E181634D7F65}"/>
+              </a:ext>
+            </a:extLst>
+          </p:cNvPr>
+          <p:cNvPicPr>
+            <a:picLocks noGrp="1" noChangeAspect="1"/>
+          </p:cNvPicPr>
           <p:nvPr>
             <p:ph idx="1"/>
           </p:nvPr>
-        </p:nvSpPr>
-        <p:spPr>
-          <a:xfrm>
-            <a:off x="611560" y="1600201"/>
-            <a:ext cx="7920880" cy="4525963"/>
-          </a:xfrm>
-        </p:spPr>
-        <p:txBody>
-          <a:bodyPr>
-            <a:noAutofit/>
-          </a:bodyPr>
-          <a:lstStyle/>
-          <a:p>
-            <a:r>
-              <a:rPr lang="en-US" sz="2300" dirty="0"/>
-              <a:t>As well as running tests on VMs, </a:t>
-            </a:r>
-            <a:r>
-              <a:rPr lang="en-US" sz="2300" dirty="0" err="1"/>
-              <a:t>Zalenium</a:t>
-            </a:r>
-            <a:r>
-              <a:rPr lang="en-US" sz="2300" dirty="0"/>
-              <a:t> also has support for the following providers:</a:t>
-            </a:r>
-          </a:p>
-          <a:p>
-            <a:pPr lvl="2"/>
-            <a:r>
-              <a:rPr lang="en-US" sz="2300" dirty="0"/>
-              <a:t>Sauce Labs</a:t>
-            </a:r>
-          </a:p>
-          <a:p>
-            <a:pPr lvl="2"/>
-            <a:r>
-              <a:rPr lang="en-US" sz="2300" dirty="0" err="1"/>
-              <a:t>TestingBot</a:t>
-            </a:r>
-            <a:endParaRPr lang="en-US" sz="2300" dirty="0"/>
-          </a:p>
-          <a:p>
-            <a:pPr lvl="2"/>
-            <a:r>
-              <a:rPr lang="en-US" sz="2300" dirty="0"/>
-              <a:t>Browser Stack</a:t>
-            </a:r>
-          </a:p>
-          <a:p>
-            <a:pPr marL="914400" lvl="2" indent="0">
-              <a:buNone/>
-            </a:pPr>
-            <a:endParaRPr lang="en-US" sz="2300" dirty="0"/>
-          </a:p>
-          <a:p>
-            <a:r>
-              <a:rPr lang="en-US" sz="2300" dirty="0"/>
-              <a:t>To access these, add the following to your startup command:</a:t>
-            </a:r>
-          </a:p>
-          <a:p>
-            <a:pPr marL="0" indent="0">
-              <a:buNone/>
-            </a:pPr>
-            <a:r>
-              <a:rPr lang="en-US" sz="2300" i="1" dirty="0"/>
-              <a:t>	</a:t>
-            </a:r>
-            <a:r>
-              <a:rPr lang="en-GB" i="1" dirty="0"/>
-              <a:t>export SAUCE_USERNAME=&lt;your Sauce Labs username&gt; export 	SAUCE_ACCESS_KEY=&lt;your Sauce Labs access key&gt; export 	SAUCE_LABS_URL=&lt;your Sauce Labs </a:t>
-            </a:r>
-            <a:r>
-              <a:rPr lang="en-GB" i="1" dirty="0" err="1"/>
-              <a:t>url:port</a:t>
-            </a:r>
-            <a:r>
-              <a:rPr lang="en-GB" i="1" dirty="0"/>
-              <a:t> number&gt; </a:t>
-            </a:r>
-            <a:r>
-              <a:rPr lang="en-US" sz="2300" i="1" dirty="0"/>
-              <a:t> </a:t>
-            </a:r>
-            <a:br>
-              <a:rPr lang="en-US" sz="2300" dirty="0"/>
-            </a:br>
-            <a:br>
-              <a:rPr lang="en-US" sz="2300" dirty="0"/>
-            </a:br>
-            <a:br>
-              <a:rPr lang="en-US" sz="2300" dirty="0"/>
-            </a:br>
-            <a:endParaRPr lang="en-US" sz="2300" dirty="0"/>
-          </a:p>
-          <a:p>
-            <a:pPr marL="914400" lvl="2" indent="0">
-              <a:buNone/>
-            </a:pPr>
-            <a:endParaRPr lang="en-US" sz="2300" dirty="0"/>
-          </a:p>
-        </p:txBody>
-      </p:sp>
+        </p:nvPicPr>
+        <p:blipFill>
+          <a:blip r:embed="rId2">
+            <a:extLst>
+              <a:ext uri="{28A0092B-C50C-407E-A947-70E740481C1C}">
+                <a14:useLocalDpi xmlns:a14="http://schemas.microsoft.com/office/drawing/2010/main" val="0"/>
+              </a:ext>
+            </a:extLst>
+          </a:blip>
+          <a:stretch>
+            <a:fillRect/>
+          </a:stretch>
+        </p:blipFill>
+        <p:spPr>
+          <a:xfrm>
+            <a:off x="611188" y="1823726"/>
+            <a:ext cx="7921625" cy="4078910"/>
+          </a:xfrm>
+        </p:spPr>
+      </p:pic>
       <p:sp>
         <p:nvSpPr>
           <p:cNvPr id="3" name="Footer Placeholder 2"/>
@@ -3828,9 +3837,14 @@
           <a:lstStyle/>
           <a:p>
             <a:r>
-              <a:rPr lang="en-GB" dirty="0"/>
-              <a:t>Commercial In Confidence - ECS 2017  </a:t>
-            </a:r>
+              <a:rPr lang="en-GB" sz="1600" dirty="0"/>
+              <a:t>#</a:t>
+            </a:r>
+            <a:r>
+              <a:rPr lang="en-GB" sz="1600" dirty="0" err="1"/>
+              <a:t>DevOpsPlayground</a:t>
+            </a:r>
+            <a:endParaRPr lang="en-GB" sz="1600" dirty="0"/>
           </a:p>
         </p:txBody>
       </p:sp>
@@ -3864,7 +3878,7 @@
                 <a:latin typeface="Arial" panose="020B0604020202020204" pitchFamily="34" charset="0"/>
                 <a:cs typeface="Arial" panose="020B0604020202020204" pitchFamily="34" charset="0"/>
               </a:rPr>
-              <a:t>Running tests on Cloud Proxy</a:t>
+              <a:t>How it works</a:t>
             </a:r>
           </a:p>
         </p:txBody>
@@ -3872,7 +3886,7 @@
     </p:spTree>
     <p:extLst>
       <p:ext uri="{BB962C8B-B14F-4D97-AF65-F5344CB8AC3E}">
-        <p14:creationId xmlns:p14="http://schemas.microsoft.com/office/powerpoint/2010/main" val="630844028"/>
+        <p14:creationId xmlns:p14="http://schemas.microsoft.com/office/powerpoint/2010/main" val="2039348773"/>
       </p:ext>
     </p:extLst>
   </p:cSld>
@@ -3901,47 +3915,6 @@
       </p:grpSpPr>
       <p:sp>
         <p:nvSpPr>
-          <p:cNvPr id="2" name="Content Placeholder 1"/>
-          <p:cNvSpPr>
-            <a:spLocks noGrp="1"/>
-          </p:cNvSpPr>
-          <p:nvPr>
-            <p:ph idx="1"/>
-          </p:nvPr>
-        </p:nvSpPr>
-        <p:spPr>
-          <a:xfrm>
-            <a:off x="611560" y="1600201"/>
-            <a:ext cx="7920880" cy="4525963"/>
-          </a:xfrm>
-        </p:spPr>
-        <p:txBody>
-          <a:bodyPr>
-            <a:noAutofit/>
-          </a:bodyPr>
-          <a:lstStyle/>
-          <a:p>
-            <a:br>
-              <a:rPr lang="en-US" sz="2300" dirty="0"/>
-            </a:br>
-            <a:br>
-              <a:rPr lang="en-US" sz="2300" dirty="0"/>
-            </a:br>
-            <a:br>
-              <a:rPr lang="en-US" sz="2300" dirty="0"/>
-            </a:br>
-            <a:endParaRPr lang="en-US" sz="2300" dirty="0"/>
-          </a:p>
-          <a:p>
-            <a:pPr marL="914400" lvl="2" indent="0">
-              <a:buNone/>
-            </a:pPr>
-            <a:endParaRPr lang="en-US" sz="2300" dirty="0"/>
-          </a:p>
-        </p:txBody>
-      </p:sp>
-      <p:sp>
-        <p:nvSpPr>
           <p:cNvPr id="3" name="Footer Placeholder 2"/>
           <p:cNvSpPr>
             <a:spLocks noGrp="1"/>
@@ -3956,9 +3929,14 @@
           <a:lstStyle/>
           <a:p>
             <a:r>
-              <a:rPr lang="en-GB" dirty="0"/>
-              <a:t>Commercial In Confidence - ECS 2017  </a:t>
-            </a:r>
+              <a:rPr lang="en-GB" sz="1600" dirty="0"/>
+              <a:t>#</a:t>
+            </a:r>
+            <a:r>
+              <a:rPr lang="en-GB" sz="1600" dirty="0" err="1"/>
+              <a:t>DevOpsPlayground</a:t>
+            </a:r>
+            <a:endParaRPr lang="en-GB" sz="1600" dirty="0"/>
           </a:p>
         </p:txBody>
       </p:sp>
@@ -3992,15 +3970,136 @@
                 <a:latin typeface="Arial" panose="020B0604020202020204" pitchFamily="34" charset="0"/>
                 <a:cs typeface="Arial" panose="020B0604020202020204" pitchFamily="34" charset="0"/>
               </a:rPr>
-              <a:t>What else can be customised?</a:t>
-            </a:r>
+              <a:t>Playground</a:t>
+            </a:r>
+          </a:p>
+        </p:txBody>
+      </p:sp>
+      <p:sp>
+        <p:nvSpPr>
+          <p:cNvPr id="5" name="Content Placeholder 4">
+            <a:extLst>
+              <a:ext uri="{FF2B5EF4-FFF2-40B4-BE49-F238E27FC236}">
+                <a16:creationId xmlns:a16="http://schemas.microsoft.com/office/drawing/2014/main" id="{122D25EA-2C5B-F546-B0F0-A1ECE4E5202C}"/>
+              </a:ext>
+            </a:extLst>
+          </p:cNvPr>
+          <p:cNvSpPr>
+            <a:spLocks noGrp="1"/>
+          </p:cNvSpPr>
+          <p:nvPr>
+            <p:ph idx="1"/>
+          </p:nvPr>
+        </p:nvSpPr>
+        <p:spPr/>
+        <p:txBody>
+          <a:bodyPr/>
+          <a:lstStyle/>
+          <a:p>
+            <a:r>
+              <a:rPr lang="en-US" dirty="0"/>
+              <a:t>Everyone should have an IP address to log into over SSH.</a:t>
+            </a:r>
+          </a:p>
+          <a:p>
+            <a:endParaRPr lang="en-US" dirty="0"/>
+          </a:p>
+          <a:p>
+            <a:r>
+              <a:rPr lang="en-US" dirty="0"/>
+              <a:t>Access the Playground ReadMe and GitHub repo here: </a:t>
+            </a:r>
+            <a:r>
+              <a:rPr lang="en-US" dirty="0">
+                <a:hlinkClick r:id="rId2"/>
+              </a:rPr>
+              <a:t>https://bit.ly/2zrbOED</a:t>
+            </a:r>
+            <a:endParaRPr lang="en-US" dirty="0"/>
+          </a:p>
+          <a:p>
+            <a:endParaRPr lang="en-US" dirty="0"/>
+          </a:p>
+          <a:p>
+            <a:r>
+              <a:rPr lang="en-US" dirty="0"/>
+              <a:t>We’re going to:</a:t>
+            </a:r>
+          </a:p>
+          <a:p>
+            <a:pPr lvl="1"/>
+            <a:r>
+              <a:rPr lang="en-US" dirty="0"/>
+              <a:t>Install docker-selenium and </a:t>
+            </a:r>
+            <a:r>
+              <a:rPr lang="en-US" dirty="0" err="1"/>
+              <a:t>Zalenium</a:t>
+            </a:r>
+            <a:r>
+              <a:rPr lang="en-US" dirty="0"/>
+              <a:t>.</a:t>
+            </a:r>
+          </a:p>
+          <a:p>
+            <a:pPr lvl="1"/>
+            <a:r>
+              <a:rPr lang="en-US" dirty="0"/>
+              <a:t>Run </a:t>
+            </a:r>
+            <a:r>
+              <a:rPr lang="en-US" dirty="0" err="1"/>
+              <a:t>Zalenium</a:t>
+            </a:r>
+            <a:endParaRPr lang="en-US" dirty="0"/>
+          </a:p>
+          <a:p>
+            <a:pPr lvl="1"/>
+            <a:r>
+              <a:rPr lang="en-US" dirty="0"/>
+              <a:t>Run JavaScript </a:t>
+            </a:r>
+            <a:r>
+              <a:rPr lang="en-US" dirty="0" err="1"/>
+              <a:t>WebDriver.io</a:t>
+            </a:r>
+            <a:r>
+              <a:rPr lang="en-US" dirty="0"/>
+              <a:t> tests in parallel using </a:t>
+            </a:r>
+            <a:r>
+              <a:rPr lang="en-US" dirty="0" err="1"/>
+              <a:t>Zalenium</a:t>
+            </a:r>
+            <a:endParaRPr lang="en-US" dirty="0"/>
+          </a:p>
+          <a:p>
+            <a:pPr lvl="1"/>
+            <a:r>
+              <a:rPr lang="en-US" dirty="0"/>
+              <a:t>View the </a:t>
+            </a:r>
+            <a:r>
+              <a:rPr lang="en-US" dirty="0" err="1"/>
+              <a:t>Zalenium</a:t>
+            </a:r>
+            <a:r>
+              <a:rPr lang="en-US" dirty="0"/>
+              <a:t> Dashboard</a:t>
+            </a:r>
+          </a:p>
+          <a:p>
+            <a:endParaRPr lang="en-US" dirty="0"/>
+          </a:p>
+          <a:p>
+            <a:endParaRPr lang="en-US" dirty="0"/>
           </a:p>
         </p:txBody>
       </p:sp>
     </p:spTree>
     <p:extLst>
       <p:ext uri="{BB962C8B-B14F-4D97-AF65-F5344CB8AC3E}">
-        <p14:creationId xmlns:p14="http://schemas.microsoft.com/office/powerpoint/2010/main" val="199186152"/>
+        <p14:creationId xmlns:p14="http://schemas.microsoft.com/office/powerpoint/2010/main" val="2752887665"/>
       </p:ext>
     </p:extLst>
   </p:cSld>
@@ -4029,6 +4128,488 @@
       </p:grpSpPr>
       <p:sp>
         <p:nvSpPr>
+          <p:cNvPr id="2" name="Content Placeholder 1"/>
+          <p:cNvSpPr>
+            <a:spLocks noGrp="1"/>
+          </p:cNvSpPr>
+          <p:nvPr>
+            <p:ph idx="1"/>
+          </p:nvPr>
+        </p:nvSpPr>
+        <p:spPr>
+          <a:xfrm>
+            <a:off x="611560" y="1600201"/>
+            <a:ext cx="7920880" cy="4525963"/>
+          </a:xfrm>
+        </p:spPr>
+        <p:txBody>
+          <a:bodyPr>
+            <a:noAutofit/>
+          </a:bodyPr>
+          <a:lstStyle/>
+          <a:p>
+            <a:r>
+              <a:rPr lang="en-US" sz="2300" dirty="0"/>
+              <a:t>As well as running tests on VMs, </a:t>
+            </a:r>
+            <a:r>
+              <a:rPr lang="en-US" sz="2300" dirty="0" err="1"/>
+              <a:t>Zalenium</a:t>
+            </a:r>
+            <a:r>
+              <a:rPr lang="en-US" sz="2300" dirty="0"/>
+              <a:t> also has support for the following providers:</a:t>
+            </a:r>
+          </a:p>
+          <a:p>
+            <a:pPr lvl="2"/>
+            <a:r>
+              <a:rPr lang="en-US" sz="2300" dirty="0"/>
+              <a:t>Sauce Labs</a:t>
+            </a:r>
+          </a:p>
+          <a:p>
+            <a:pPr lvl="2"/>
+            <a:r>
+              <a:rPr lang="en-US" sz="2300" dirty="0" err="1"/>
+              <a:t>TestingBot</a:t>
+            </a:r>
+            <a:endParaRPr lang="en-US" sz="2300" dirty="0"/>
+          </a:p>
+          <a:p>
+            <a:pPr lvl="2"/>
+            <a:r>
+              <a:rPr lang="en-US" sz="2300" dirty="0"/>
+              <a:t>Browser Stack</a:t>
+            </a:r>
+          </a:p>
+          <a:p>
+            <a:pPr marL="914400" lvl="2" indent="0">
+              <a:buNone/>
+            </a:pPr>
+            <a:endParaRPr lang="en-US" sz="2300" dirty="0"/>
+          </a:p>
+          <a:p>
+            <a:r>
+              <a:rPr lang="en-US" sz="2300" dirty="0"/>
+              <a:t>An example of this, to access Sauce Labs, add the following to your startup command:</a:t>
+            </a:r>
+          </a:p>
+          <a:p>
+            <a:pPr marL="0" indent="0">
+              <a:buNone/>
+            </a:pPr>
+            <a:r>
+              <a:rPr lang="en-US" sz="2300" i="1" dirty="0"/>
+              <a:t>	</a:t>
+            </a:r>
+            <a:r>
+              <a:rPr lang="en-GB" i="1" dirty="0"/>
+              <a:t>export SAUCE_USERNAME=&lt;your Sauce Labs username&gt; export 	SAUCE_ACCESS_KEY=&lt;your Sauce Labs access key&gt; export 	SAUCE_LABS_URL=&lt;your Sauce Labs </a:t>
+            </a:r>
+            <a:r>
+              <a:rPr lang="en-GB" i="1" dirty="0" err="1"/>
+              <a:t>url:port</a:t>
+            </a:r>
+            <a:r>
+              <a:rPr lang="en-GB" i="1" dirty="0"/>
+              <a:t> number&gt; </a:t>
+            </a:r>
+            <a:r>
+              <a:rPr lang="en-US" sz="2300" i="1" dirty="0"/>
+              <a:t> </a:t>
+            </a:r>
+          </a:p>
+          <a:p>
+            <a:pPr marL="0" indent="0">
+              <a:buNone/>
+            </a:pPr>
+            <a:r>
+              <a:rPr lang="en-GB" dirty="0"/>
+              <a:t>                </a:t>
+            </a:r>
+            <a:r>
+              <a:rPr lang="en-GB" i="1" dirty="0"/>
+              <a:t>--</a:t>
+            </a:r>
+            <a:r>
+              <a:rPr lang="en-GB" i="1" dirty="0" err="1"/>
+              <a:t>sauceLabsEnabled</a:t>
+            </a:r>
+            <a:r>
+              <a:rPr lang="en-GB" i="1" dirty="0"/>
+              <a:t> true</a:t>
+            </a:r>
+            <a:br>
+              <a:rPr lang="en-US" sz="2300" dirty="0"/>
+            </a:br>
+            <a:br>
+              <a:rPr lang="en-US" sz="2300" dirty="0"/>
+            </a:br>
+            <a:br>
+              <a:rPr lang="en-US" sz="2300" dirty="0"/>
+            </a:br>
+            <a:endParaRPr lang="en-US" sz="2300" dirty="0"/>
+          </a:p>
+          <a:p>
+            <a:pPr marL="914400" lvl="2" indent="0">
+              <a:buNone/>
+            </a:pPr>
+            <a:endParaRPr lang="en-US" sz="2300" dirty="0"/>
+          </a:p>
+        </p:txBody>
+      </p:sp>
+      <p:sp>
+        <p:nvSpPr>
+          <p:cNvPr id="3" name="Footer Placeholder 2"/>
+          <p:cNvSpPr>
+            <a:spLocks noGrp="1"/>
+          </p:cNvSpPr>
+          <p:nvPr>
+            <p:ph type="ftr" sz="quarter" idx="3"/>
+          </p:nvPr>
+        </p:nvSpPr>
+        <p:spPr/>
+        <p:txBody>
+          <a:bodyPr/>
+          <a:lstStyle/>
+          <a:p>
+            <a:r>
+              <a:rPr lang="en-GB" sz="1600" dirty="0"/>
+              <a:t>#</a:t>
+            </a:r>
+            <a:r>
+              <a:rPr lang="en-GB" sz="1600" dirty="0" err="1"/>
+              <a:t>DevOpsPlayground</a:t>
+            </a:r>
+            <a:endParaRPr lang="en-GB" sz="1600" dirty="0"/>
+          </a:p>
+        </p:txBody>
+      </p:sp>
+      <p:sp>
+        <p:nvSpPr>
+          <p:cNvPr id="4" name="TextBox 3"/>
+          <p:cNvSpPr txBox="1"/>
+          <p:nvPr/>
+        </p:nvSpPr>
+        <p:spPr>
+          <a:xfrm>
+            <a:off x="611560" y="692696"/>
+            <a:ext cx="7920880" cy="523220"/>
+          </a:xfrm>
+          <a:prstGeom prst="rect">
+            <a:avLst/>
+          </a:prstGeom>
+          <a:noFill/>
+        </p:spPr>
+        <p:txBody>
+          <a:bodyPr wrap="square" rtlCol="0">
+            <a:spAutoFit/>
+          </a:bodyPr>
+          <a:lstStyle/>
+          <a:p>
+            <a:r>
+              <a:rPr lang="en-GB" sz="2800" dirty="0">
+                <a:solidFill>
+                  <a:srgbClr val="0070B7"/>
+                </a:solidFill>
+                <a:latin typeface="Arial" panose="020B0604020202020204" pitchFamily="34" charset="0"/>
+                <a:cs typeface="Arial" panose="020B0604020202020204" pitchFamily="34" charset="0"/>
+              </a:rPr>
+              <a:t>Running tests on Cloud Proxy</a:t>
+            </a:r>
+          </a:p>
+        </p:txBody>
+      </p:sp>
+    </p:spTree>
+    <p:extLst>
+      <p:ext uri="{BB962C8B-B14F-4D97-AF65-F5344CB8AC3E}">
+        <p14:creationId xmlns:p14="http://schemas.microsoft.com/office/powerpoint/2010/main" val="630844028"/>
+      </p:ext>
+    </p:extLst>
+  </p:cSld>
+  <p:clrMapOvr>
+    <a:masterClrMapping/>
+  </p:clrMapOvr>
+</p:sld>
+</file>
+
+<file path=ppt/slides/slide13.xml><?xml version="1.0" encoding="utf-8"?>
+<p:sld xmlns:a="http://schemas.openxmlformats.org/drawingml/2006/main" xmlns:r="http://schemas.openxmlformats.org/officeDocument/2006/relationships" xmlns:p="http://schemas.openxmlformats.org/presentationml/2006/main">
+  <p:cSld>
+    <p:spTree>
+      <p:nvGrpSpPr>
+        <p:cNvPr id="1" name=""/>
+        <p:cNvGrpSpPr/>
+        <p:nvPr/>
+      </p:nvGrpSpPr>
+      <p:grpSpPr>
+        <a:xfrm>
+          <a:off x="0" y="0"/>
+          <a:ext cx="0" cy="0"/>
+          <a:chOff x="0" y="0"/>
+          <a:chExt cx="0" cy="0"/>
+        </a:xfrm>
+      </p:grpSpPr>
+      <p:sp>
+        <p:nvSpPr>
+          <p:cNvPr id="2" name="Content Placeholder 1"/>
+          <p:cNvSpPr>
+            <a:spLocks noGrp="1"/>
+          </p:cNvSpPr>
+          <p:nvPr>
+            <p:ph idx="1"/>
+          </p:nvPr>
+        </p:nvSpPr>
+        <p:spPr>
+          <a:xfrm>
+            <a:off x="611560" y="1600201"/>
+            <a:ext cx="7920880" cy="4525963"/>
+          </a:xfrm>
+        </p:spPr>
+        <p:txBody>
+          <a:bodyPr>
+            <a:noAutofit/>
+          </a:bodyPr>
+          <a:lstStyle/>
+          <a:p>
+            <a:r>
+              <a:rPr lang="en-US" sz="2300" dirty="0"/>
+              <a:t>Basic </a:t>
+            </a:r>
+            <a:r>
+              <a:rPr lang="en-US" sz="2300" dirty="0" err="1"/>
+              <a:t>auth</a:t>
+            </a:r>
+            <a:r>
+              <a:rPr lang="en-US" sz="2300" dirty="0"/>
+              <a:t> gird protection can be implemented for deploying </a:t>
+            </a:r>
+            <a:r>
+              <a:rPr lang="en-US" sz="2300" dirty="0" err="1"/>
+              <a:t>Zalenium</a:t>
+            </a:r>
+            <a:r>
+              <a:rPr lang="en-US" sz="2300" dirty="0"/>
+              <a:t> in the cloud.</a:t>
+            </a:r>
+          </a:p>
+          <a:p>
+            <a:endParaRPr lang="en-US" sz="2300" dirty="0"/>
+          </a:p>
+          <a:p>
+            <a:r>
+              <a:rPr lang="en-US" sz="2300" dirty="0" err="1"/>
+              <a:t>Zalenium</a:t>
+            </a:r>
+            <a:r>
+              <a:rPr lang="en-US" sz="2300" dirty="0"/>
+              <a:t> start/stop can be streamlined into one curl command </a:t>
+            </a:r>
+          </a:p>
+          <a:p>
+            <a:pPr lvl="1"/>
+            <a:r>
+              <a:rPr lang="en-GB" i="1" dirty="0"/>
+              <a:t>curl -</a:t>
+            </a:r>
+            <a:r>
+              <a:rPr lang="en-GB" i="1" dirty="0" err="1"/>
+              <a:t>sSL</a:t>
+            </a:r>
+            <a:r>
+              <a:rPr lang="en-GB" i="1" dirty="0"/>
+              <a:t> https://</a:t>
+            </a:r>
+            <a:r>
+              <a:rPr lang="en-GB" i="1" dirty="0" err="1"/>
+              <a:t>raw.githubusercontent.com</a:t>
+            </a:r>
+            <a:r>
+              <a:rPr lang="en-GB" i="1" dirty="0"/>
+              <a:t>/</a:t>
+            </a:r>
+            <a:r>
+              <a:rPr lang="en-GB" i="1" dirty="0" err="1"/>
+              <a:t>dosel</a:t>
+            </a:r>
+            <a:r>
+              <a:rPr lang="en-GB" i="1" dirty="0"/>
+              <a:t>/t/</a:t>
+            </a:r>
+            <a:r>
+              <a:rPr lang="en-GB" i="1" dirty="0" err="1"/>
+              <a:t>i</a:t>
+            </a:r>
+            <a:r>
+              <a:rPr lang="en-GB" i="1" dirty="0"/>
+              <a:t>/p | bash -s start </a:t>
+            </a:r>
+          </a:p>
+          <a:p>
+            <a:pPr lvl="1"/>
+            <a:r>
+              <a:rPr lang="en-GB" i="1" dirty="0"/>
+              <a:t>curl -</a:t>
+            </a:r>
+            <a:r>
+              <a:rPr lang="en-GB" i="1" dirty="0" err="1"/>
+              <a:t>sSL</a:t>
+            </a:r>
+            <a:r>
+              <a:rPr lang="en-GB" i="1" dirty="0"/>
+              <a:t> https://</a:t>
+            </a:r>
+            <a:r>
+              <a:rPr lang="en-GB" i="1" dirty="0" err="1"/>
+              <a:t>raw.githubusercontent.com</a:t>
+            </a:r>
+            <a:r>
+              <a:rPr lang="en-GB" i="1" dirty="0"/>
+              <a:t>/</a:t>
+            </a:r>
+            <a:r>
+              <a:rPr lang="en-GB" i="1" dirty="0" err="1"/>
+              <a:t>dosel</a:t>
+            </a:r>
+            <a:r>
+              <a:rPr lang="en-GB" i="1" dirty="0"/>
+              <a:t>/t/</a:t>
+            </a:r>
+            <a:r>
+              <a:rPr lang="en-GB" i="1" dirty="0" err="1"/>
+              <a:t>i</a:t>
+            </a:r>
+            <a:r>
+              <a:rPr lang="en-GB" i="1" dirty="0"/>
+              <a:t>/p | bash -s stop</a:t>
+            </a:r>
+            <a:endParaRPr lang="en-GB" sz="2400" i="1" dirty="0"/>
+          </a:p>
+          <a:p>
+            <a:endParaRPr lang="en-GB" sz="2400" i="1" dirty="0"/>
+          </a:p>
+          <a:p>
+            <a:r>
+              <a:rPr lang="en-GB" sz="2400" dirty="0"/>
+              <a:t>Set CPU/memory limits, output logs to JSON, set browser screen width/height and much more…</a:t>
+            </a:r>
+            <a:br>
+              <a:rPr lang="en-GB" sz="2400" dirty="0"/>
+            </a:br>
+            <a:br>
+              <a:rPr lang="en-US" sz="2300" dirty="0"/>
+            </a:br>
+            <a:br>
+              <a:rPr lang="en-US" sz="2300" dirty="0"/>
+            </a:br>
+            <a:br>
+              <a:rPr lang="en-US" sz="2300" dirty="0"/>
+            </a:br>
+            <a:endParaRPr lang="en-US" sz="2300" dirty="0"/>
+          </a:p>
+          <a:p>
+            <a:pPr marL="914400" lvl="2" indent="0">
+              <a:buNone/>
+            </a:pPr>
+            <a:endParaRPr lang="en-US" sz="2300" dirty="0"/>
+          </a:p>
+        </p:txBody>
+      </p:sp>
+      <p:sp>
+        <p:nvSpPr>
+          <p:cNvPr id="3" name="Footer Placeholder 2"/>
+          <p:cNvSpPr>
+            <a:spLocks noGrp="1"/>
+          </p:cNvSpPr>
+          <p:nvPr>
+            <p:ph type="ftr" sz="quarter" idx="3"/>
+          </p:nvPr>
+        </p:nvSpPr>
+        <p:spPr/>
+        <p:txBody>
+          <a:bodyPr/>
+          <a:lstStyle/>
+          <a:p>
+            <a:r>
+              <a:rPr lang="en-GB" sz="1600" dirty="0"/>
+              <a:t>#</a:t>
+            </a:r>
+            <a:r>
+              <a:rPr lang="en-GB" sz="1600" dirty="0" err="1"/>
+              <a:t>DevOpsPlayground</a:t>
+            </a:r>
+            <a:endParaRPr lang="en-GB" sz="1600" dirty="0"/>
+          </a:p>
+        </p:txBody>
+      </p:sp>
+      <p:sp>
+        <p:nvSpPr>
+          <p:cNvPr id="4" name="TextBox 3"/>
+          <p:cNvSpPr txBox="1"/>
+          <p:nvPr/>
+        </p:nvSpPr>
+        <p:spPr>
+          <a:xfrm>
+            <a:off x="611560" y="692696"/>
+            <a:ext cx="7920880" cy="523220"/>
+          </a:xfrm>
+          <a:prstGeom prst="rect">
+            <a:avLst/>
+          </a:prstGeom>
+          <a:noFill/>
+        </p:spPr>
+        <p:txBody>
+          <a:bodyPr wrap="square" rtlCol="0">
+            <a:spAutoFit/>
+          </a:bodyPr>
+          <a:lstStyle/>
+          <a:p>
+            <a:r>
+              <a:rPr lang="en-GB" sz="2800" dirty="0">
+                <a:solidFill>
+                  <a:srgbClr val="0070B7"/>
+                </a:solidFill>
+                <a:latin typeface="Arial" panose="020B0604020202020204" pitchFamily="34" charset="0"/>
+                <a:cs typeface="Arial" panose="020B0604020202020204" pitchFamily="34" charset="0"/>
+              </a:rPr>
+              <a:t>What else can be customised?</a:t>
+            </a:r>
+          </a:p>
+        </p:txBody>
+      </p:sp>
+    </p:spTree>
+    <p:extLst>
+      <p:ext uri="{BB962C8B-B14F-4D97-AF65-F5344CB8AC3E}">
+        <p14:creationId xmlns:p14="http://schemas.microsoft.com/office/powerpoint/2010/main" val="199186152"/>
+      </p:ext>
+    </p:extLst>
+  </p:cSld>
+  <p:clrMapOvr>
+    <a:masterClrMapping/>
+  </p:clrMapOvr>
+</p:sld>
+</file>
+
+<file path=ppt/slides/slide14.xml><?xml version="1.0" encoding="utf-8"?>
+<p:sld xmlns:a="http://schemas.openxmlformats.org/drawingml/2006/main" xmlns:r="http://schemas.openxmlformats.org/officeDocument/2006/relationships" xmlns:p="http://schemas.openxmlformats.org/presentationml/2006/main">
+  <p:cSld>
+    <p:spTree>
+      <p:nvGrpSpPr>
+        <p:cNvPr id="1" name=""/>
+        <p:cNvGrpSpPr/>
+        <p:nvPr/>
+      </p:nvGrpSpPr>
+      <p:grpSpPr>
+        <a:xfrm>
+          <a:off x="0" y="0"/>
+          <a:ext cx="0" cy="0"/>
+          <a:chOff x="0" y="0"/>
+          <a:chExt cx="0" cy="0"/>
+        </a:xfrm>
+      </p:grpSpPr>
+      <p:sp>
+        <p:nvSpPr>
           <p:cNvPr id="2" name="Footer Placeholder 1"/>
           <p:cNvSpPr>
             <a:spLocks noGrp="1"/>
@@ -4043,9 +4624,14 @@
           <a:lstStyle/>
           <a:p>
             <a:r>
-              <a:rPr lang="en-GB" dirty="0"/>
-              <a:t>Commercial In Confidence - ECS 2017  </a:t>
-            </a:r>
+              <a:rPr lang="en-GB" sz="1600" dirty="0"/>
+              <a:t>#</a:t>
+            </a:r>
+            <a:r>
+              <a:rPr lang="en-GB" sz="1600" dirty="0" err="1"/>
+              <a:t>DevOpsPlayGround</a:t>
+            </a:r>
+            <a:endParaRPr lang="en-GB" sz="1600" dirty="0"/>
           </a:p>
         </p:txBody>
       </p:sp>
@@ -4124,6 +4710,78 @@
           </a:p>
         </p:txBody>
       </p:sp>
+      <p:pic>
+        <p:nvPicPr>
+          <p:cNvPr id="6" name="Picture 5">
+            <a:extLst>
+              <a:ext uri="{FF2B5EF4-FFF2-40B4-BE49-F238E27FC236}">
+                <a16:creationId xmlns:a16="http://schemas.microsoft.com/office/drawing/2014/main" id="{AFC81AFD-59B1-1547-8B68-C03A1AA21FAD}"/>
+              </a:ext>
+            </a:extLst>
+          </p:cNvPr>
+          <p:cNvPicPr>
+            <a:picLocks noChangeAspect="1"/>
+          </p:cNvPicPr>
+          <p:nvPr/>
+        </p:nvPicPr>
+        <p:blipFill>
+          <a:blip r:embed="rId2">
+            <a:extLst>
+              <a:ext uri="{28A0092B-C50C-407E-A947-70E740481C1C}">
+                <a14:useLocalDpi xmlns:a14="http://schemas.microsoft.com/office/drawing/2010/main" val="0"/>
+              </a:ext>
+            </a:extLst>
+          </a:blip>
+          <a:stretch>
+            <a:fillRect/>
+          </a:stretch>
+        </p:blipFill>
+        <p:spPr>
+          <a:xfrm>
+            <a:off x="2801506" y="2820296"/>
+            <a:ext cx="5818698" cy="2491130"/>
+          </a:xfrm>
+          <a:prstGeom prst="rect">
+            <a:avLst/>
+          </a:prstGeom>
+        </p:spPr>
+      </p:pic>
+      <p:pic>
+        <p:nvPicPr>
+          <p:cNvPr id="8" name="Picture 7">
+            <a:extLst>
+              <a:ext uri="{FF2B5EF4-FFF2-40B4-BE49-F238E27FC236}">
+                <a16:creationId xmlns:a16="http://schemas.microsoft.com/office/drawing/2014/main" id="{ADAE0AD4-F82D-C04F-84B2-1463927F637A}"/>
+              </a:ext>
+            </a:extLst>
+          </p:cNvPr>
+          <p:cNvPicPr>
+            <a:picLocks noChangeAspect="1"/>
+          </p:cNvPicPr>
+          <p:nvPr/>
+        </p:nvPicPr>
+        <p:blipFill>
+          <a:blip r:embed="rId3">
+            <a:extLst>
+              <a:ext uri="{28A0092B-C50C-407E-A947-70E740481C1C}">
+                <a14:useLocalDpi xmlns:a14="http://schemas.microsoft.com/office/drawing/2010/main" val="0"/>
+              </a:ext>
+            </a:extLst>
+          </a:blip>
+          <a:stretch>
+            <a:fillRect/>
+          </a:stretch>
+        </p:blipFill>
+        <p:spPr>
+          <a:xfrm>
+            <a:off x="3235530" y="531786"/>
+            <a:ext cx="5244986" cy="2197816"/>
+          </a:xfrm>
+          <a:prstGeom prst="rect">
+            <a:avLst/>
+          </a:prstGeom>
+        </p:spPr>
+      </p:pic>
     </p:spTree>
     <p:extLst>
       <p:ext uri="{BB962C8B-B14F-4D97-AF65-F5344CB8AC3E}">
@@ -4167,11 +4825,13 @@
         <p:spPr>
           <a:xfrm>
             <a:off x="611560" y="2276872"/>
-            <a:ext cx="7772400" cy="1470025"/>
-          </a:xfrm>
-        </p:spPr>
-        <p:txBody>
-          <a:bodyPr/>
+            <a:ext cx="7772400" cy="2088232"/>
+          </a:xfrm>
+        </p:spPr>
+        <p:txBody>
+          <a:bodyPr>
+            <a:normAutofit fontScale="90000"/>
+          </a:bodyPr>
           <a:lstStyle/>
           <a:p>
             <a:r>
@@ -4182,7 +4842,21 @@
               <a:rPr lang="en-GB" dirty="0" err="1"/>
               <a:t>Zalenium</a:t>
             </a:r>
-            <a:endParaRPr lang="en-GB" dirty="0"/>
+            <a:br>
+              <a:rPr lang="en-GB" dirty="0"/>
+            </a:br>
+            <a:br>
+              <a:rPr lang="en-GB" dirty="0"/>
+            </a:br>
+            <a:r>
+              <a:rPr lang="en-GB" sz="2700" dirty="0"/>
+              <a:t>#</a:t>
+            </a:r>
+            <a:r>
+              <a:rPr lang="en-GB" sz="2700" dirty="0" err="1"/>
+              <a:t>DevOpsPlayground</a:t>
+            </a:r>
+            <a:endParaRPr lang="en-GB" sz="2700" dirty="0"/>
           </a:p>
         </p:txBody>
       </p:sp>
@@ -4299,15 +4973,15 @@
           <a:p>
             <a:pPr lvl="1"/>
             <a:r>
-              <a:rPr lang="en-US" sz="2300" dirty="0"/>
+              <a:rPr lang="en-US" dirty="0"/>
               <a:t>QA and Continuous Delivery Consultant (Edinburgh)</a:t>
             </a:r>
           </a:p>
           <a:p>
             <a:pPr lvl="1"/>
             <a:r>
-              <a:rPr lang="en-US" sz="2300" dirty="0"/>
-              <a:t>Twitter: @ali_hill91</a:t>
+              <a:rPr lang="en-US" dirty="0"/>
+              <a:t>Twitter: @ali_hill91 </a:t>
             </a:r>
           </a:p>
           <a:p>
@@ -4327,7 +5001,7 @@
           <a:p>
             <a:pPr lvl="1"/>
             <a:r>
-              <a:rPr lang="en-US" sz="2300" dirty="0"/>
+              <a:rPr lang="en-US" dirty="0"/>
               <a:t>QA and Continuous Delivery Consultant (London)</a:t>
             </a:r>
           </a:p>
@@ -4343,7 +5017,7 @@
           <a:p>
             <a:pPr lvl="1"/>
             <a:r>
-              <a:rPr lang="en-US" sz="2300" dirty="0"/>
+              <a:rPr lang="en-US" dirty="0"/>
               <a:t>QA and Continuous Delivery Consultant (London)</a:t>
             </a:r>
           </a:p>
@@ -4362,15 +5036,21 @@
             <p:ph type="ftr" sz="quarter" idx="3"/>
           </p:nvPr>
         </p:nvSpPr>
-        <p:spPr/>
+        <p:spPr>
+          <a:xfrm>
+            <a:off x="3124200" y="6356351"/>
+            <a:ext cx="2895600" cy="365125"/>
+          </a:xfrm>
+        </p:spPr>
         <p:txBody>
           <a:bodyPr/>
           <a:lstStyle/>
           <a:p>
             <a:r>
-              <a:rPr lang="en-GB" dirty="0"/>
-              <a:t>Commercial In Confidence - ECS 2017  </a:t>
-            </a:r>
+              <a:rPr lang="en-GB" sz="1600"/>
+              <a:t>#DevOpsPlayground</a:t>
+            </a:r>
+            <a:endParaRPr lang="en-GB" sz="1600" dirty="0"/>
           </a:p>
         </p:txBody>
       </p:sp>
@@ -4397,7 +5077,7 @@
           <a:lstStyle/>
           <a:p>
             <a:r>
-              <a:rPr lang="en-GB" sz="2800" dirty="0">
+              <a:rPr lang="en-GB" sz="2800">
                 <a:solidFill>
                   <a:srgbClr val="0070B7"/>
                 </a:solidFill>
@@ -4406,9 +5086,124 @@
               </a:rPr>
               <a:t>About Us</a:t>
             </a:r>
-          </a:p>
-        </p:txBody>
-      </p:sp>
+            <a:endParaRPr lang="en-GB" sz="2800" dirty="0">
+              <a:solidFill>
+                <a:srgbClr val="0070B7"/>
+              </a:solidFill>
+              <a:latin typeface="Arial" panose="020B0604020202020204" pitchFamily="34" charset="0"/>
+              <a:cs typeface="Arial" panose="020B0604020202020204" pitchFamily="34" charset="0"/>
+            </a:endParaRPr>
+          </a:p>
+        </p:txBody>
+      </p:sp>
+      <p:pic>
+        <p:nvPicPr>
+          <p:cNvPr id="6" name="Picture 5">
+            <a:extLst>
+              <a:ext uri="{FF2B5EF4-FFF2-40B4-BE49-F238E27FC236}">
+                <a16:creationId xmlns:a16="http://schemas.microsoft.com/office/drawing/2014/main" id="{4923CEB4-8350-6E43-9BF4-39D82C16F2CA}"/>
+              </a:ext>
+            </a:extLst>
+          </p:cNvPr>
+          <p:cNvPicPr>
+            <a:picLocks noChangeAspect="1"/>
+          </p:cNvPicPr>
+          <p:nvPr/>
+        </p:nvPicPr>
+        <p:blipFill>
+          <a:blip r:embed="rId3">
+            <a:extLst>
+              <a:ext uri="{28A0092B-C50C-407E-A947-70E740481C1C}">
+                <a14:useLocalDpi xmlns:a14="http://schemas.microsoft.com/office/drawing/2010/main" val="0"/>
+              </a:ext>
+            </a:extLst>
+          </a:blip>
+          <a:stretch>
+            <a:fillRect/>
+          </a:stretch>
+        </p:blipFill>
+        <p:spPr>
+          <a:xfrm>
+            <a:off x="7293396" y="1370014"/>
+            <a:ext cx="1707304" cy="1707304"/>
+          </a:xfrm>
+          <a:prstGeom prst="rect">
+            <a:avLst/>
+          </a:prstGeom>
+        </p:spPr>
+      </p:pic>
+      <p:pic>
+        <p:nvPicPr>
+          <p:cNvPr id="8" name="Picture 7">
+            <a:extLst>
+              <a:ext uri="{FF2B5EF4-FFF2-40B4-BE49-F238E27FC236}">
+                <a16:creationId xmlns:a16="http://schemas.microsoft.com/office/drawing/2014/main" id="{199FCAF8-314F-BC47-B6CA-AE961E8659F6}"/>
+              </a:ext>
+            </a:extLst>
+          </p:cNvPr>
+          <p:cNvPicPr>
+            <a:picLocks noChangeAspect="1"/>
+          </p:cNvPicPr>
+          <p:nvPr/>
+        </p:nvPicPr>
+        <p:blipFill>
+          <a:blip r:embed="rId4">
+            <a:extLst>
+              <a:ext uri="{28A0092B-C50C-407E-A947-70E740481C1C}">
+                <a14:useLocalDpi xmlns:a14="http://schemas.microsoft.com/office/drawing/2010/main" val="0"/>
+              </a:ext>
+            </a:extLst>
+          </a:blip>
+          <a:stretch>
+            <a:fillRect/>
+          </a:stretch>
+        </p:blipFill>
+        <p:spPr>
+          <a:xfrm>
+            <a:off x="7299726" y="3145850"/>
+            <a:ext cx="1694643" cy="1694643"/>
+          </a:xfrm>
+          <a:prstGeom prst="rect">
+            <a:avLst/>
+          </a:prstGeom>
+        </p:spPr>
+      </p:pic>
+      <p:pic>
+        <p:nvPicPr>
+          <p:cNvPr id="10" name="Picture 9">
+            <a:extLst>
+              <a:ext uri="{FF2B5EF4-FFF2-40B4-BE49-F238E27FC236}">
+                <a16:creationId xmlns:a16="http://schemas.microsoft.com/office/drawing/2014/main" id="{69C3AAA4-3A24-3047-88F7-C7516244C761}"/>
+              </a:ext>
+            </a:extLst>
+          </p:cNvPr>
+          <p:cNvPicPr>
+            <a:picLocks noChangeAspect="1"/>
+          </p:cNvPicPr>
+          <p:nvPr/>
+        </p:nvPicPr>
+        <p:blipFill>
+          <a:blip r:embed="rId5">
+            <a:extLst>
+              <a:ext uri="{28A0092B-C50C-407E-A947-70E740481C1C}">
+                <a14:useLocalDpi xmlns:a14="http://schemas.microsoft.com/office/drawing/2010/main" val="0"/>
+              </a:ext>
+            </a:extLst>
+          </a:blip>
+          <a:stretch>
+            <a:fillRect/>
+          </a:stretch>
+        </p:blipFill>
+        <p:spPr>
+          <a:xfrm>
+            <a:off x="7277670" y="4909025"/>
+            <a:ext cx="1716699" cy="1716699"/>
+          </a:xfrm>
+          <a:prstGeom prst="rect">
+            <a:avLst/>
+          </a:prstGeom>
+        </p:spPr>
+      </p:pic>
     </p:spTree>
     <p:extLst>
       <p:ext uri="{BB962C8B-B14F-4D97-AF65-F5344CB8AC3E}">
@@ -4524,8 +5319,8 @@
         </p:nvSpPr>
         <p:spPr>
           <a:xfrm>
-            <a:off x="683568" y="5427222"/>
-            <a:ext cx="7824410" cy="300082"/>
+            <a:off x="634380" y="5427222"/>
+            <a:ext cx="7824410" cy="369332"/>
           </a:xfrm>
           <a:prstGeom prst="rect">
             <a:avLst/>
@@ -4540,8 +5335,24 @@
           <a:p>
             <a:pPr algn="ctr"/>
             <a:r>
-              <a:rPr lang="en-US" sz="1350" dirty="0"/>
-              <a:t>Thursday Nov 1 – Friday Nov 2</a:t>
+              <a:rPr lang="en-US" dirty="0"/>
+              <a:t>1</a:t>
+            </a:r>
+            <a:r>
+              <a:rPr lang="en-US" baseline="30000" dirty="0"/>
+              <a:t>st</a:t>
+            </a:r>
+            <a:r>
+              <a:rPr lang="en-US" dirty="0"/>
+              <a:t>-2</a:t>
+            </a:r>
+            <a:r>
+              <a:rPr lang="en-US" baseline="30000" dirty="0"/>
+              <a:t>nd</a:t>
+            </a:r>
+            <a:r>
+              <a:rPr lang="en-US" dirty="0"/>
+              <a:t> November 2018</a:t>
             </a:r>
           </a:p>
         </p:txBody>
@@ -4560,8 +5371,8 @@
         </p:nvSpPr>
         <p:spPr>
           <a:xfrm>
-            <a:off x="2257417" y="5060867"/>
-            <a:ext cx="4726615" cy="300082"/>
+            <a:off x="1477964" y="5057890"/>
+            <a:ext cx="6235618" cy="369332"/>
           </a:xfrm>
           <a:prstGeom prst="rect">
             <a:avLst/>
@@ -4575,15 +5386,15 @@
           <a:lstStyle/>
           <a:p>
             <a:r>
-              <a:rPr lang="en-US" sz="1350" dirty="0"/>
+              <a:rPr lang="en-US" dirty="0"/>
               <a:t>https://</a:t>
             </a:r>
             <a:r>
-              <a:rPr lang="en-US" sz="1350" dirty="0" err="1"/>
+              <a:rPr lang="en-US" dirty="0" err="1"/>
               <a:t>www.devopsdays.org</a:t>
             </a:r>
             <a:r>
-              <a:rPr lang="en-US" sz="1350" dirty="0"/>
+              <a:rPr lang="en-US" dirty="0"/>
               <a:t>/events/2018-edinburgh/welcome/</a:t>
             </a:r>
           </a:p>
@@ -4643,44 +5454,64 @@
           <a:p>
             <a:r>
               <a:rPr lang="en-US" sz="2300" dirty="0"/>
-              <a:t>WebDriver</a:t>
-            </a:r>
-          </a:p>
-          <a:p>
+              <a:t>WebDriver </a:t>
+            </a:r>
+          </a:p>
+          <a:p>
+            <a:pPr lvl="1"/>
+            <a:r>
+              <a:rPr lang="en-US" sz="2300" dirty="0"/>
+              <a:t>Web browser automation library. </a:t>
+            </a:r>
+          </a:p>
+          <a:p>
+            <a:pPr lvl="1"/>
+            <a:r>
+              <a:rPr lang="en-US" sz="2300" dirty="0"/>
+              <a:t>Used for automating browser interaction.</a:t>
+            </a:r>
+          </a:p>
+          <a:p>
+            <a:pPr lvl="1"/>
+            <a:r>
+              <a:rPr lang="en-US" sz="2300" dirty="0"/>
+              <a:t>Tests can be written in language of choice.</a:t>
+            </a:r>
+          </a:p>
+          <a:p>
+            <a:pPr marL="0" indent="0">
+              <a:buNone/>
+            </a:pPr>
             <a:endParaRPr lang="en-US" sz="2300" dirty="0"/>
           </a:p>
           <a:p>
             <a:r>
-              <a:rPr lang="en-US" sz="2300"/>
-              <a:t>Docker-selenium</a:t>
-            </a:r>
+              <a:rPr lang="en-US" sz="2300" dirty="0"/>
+              <a:t>docker-selenium</a:t>
+            </a:r>
+          </a:p>
+          <a:p>
+            <a:pPr lvl="1"/>
+            <a:r>
+              <a:rPr lang="en-US" sz="2300" dirty="0"/>
+              <a:t>Docker images for Selenium Grid server.</a:t>
+            </a:r>
+          </a:p>
+          <a:p>
+            <a:pPr lvl="1"/>
+            <a:r>
+              <a:rPr lang="en-US" sz="2300" dirty="0"/>
+              <a:t>Contains hub and node configurations for Firefox and Chrome.</a:t>
+            </a:r>
+          </a:p>
+          <a:p>
+            <a:pPr lvl="1"/>
             <a:endParaRPr lang="en-US" sz="2300" dirty="0"/>
           </a:p>
           <a:p>
-            <a:endParaRPr lang="en-US" sz="2300" dirty="0"/>
-          </a:p>
-          <a:p>
-            <a:r>
-              <a:rPr lang="en-US" sz="2300" dirty="0"/>
-              <a:t>Grid</a:t>
-            </a:r>
-          </a:p>
-          <a:p>
-            <a:pPr lvl="1"/>
-            <a:r>
-              <a:rPr lang="en-US" sz="2300" dirty="0"/>
-              <a:t>Difficult to maintain to keep versions maintained. </a:t>
-            </a:r>
-          </a:p>
-          <a:p>
-            <a:pPr lvl="1"/>
-            <a:r>
-              <a:rPr lang="en-US" sz="2300" dirty="0"/>
-              <a:t>Tests can fail due to flaky Grid.</a:t>
-            </a:r>
-          </a:p>
-          <a:p>
-            <a:pPr lvl="1"/>
+            <a:pPr marL="0" indent="0">
+              <a:buNone/>
+            </a:pPr>
             <a:endParaRPr lang="en-US" sz="2300" dirty="0"/>
           </a:p>
         </p:txBody>
@@ -4695,15 +5526,21 @@
             <p:ph type="ftr" sz="quarter" idx="3"/>
           </p:nvPr>
         </p:nvSpPr>
-        <p:spPr/>
+        <p:spPr>
+          <a:xfrm>
+            <a:off x="3124200" y="6356351"/>
+            <a:ext cx="2895600" cy="365125"/>
+          </a:xfrm>
+        </p:spPr>
         <p:txBody>
           <a:bodyPr/>
           <a:lstStyle/>
           <a:p>
             <a:r>
-              <a:rPr lang="en-GB" dirty="0"/>
-              <a:t>Commercial In Confidence - ECS 2017  </a:t>
-            </a:r>
+              <a:rPr lang="en-GB" sz="1600"/>
+              <a:t>#DevOpsPlayground</a:t>
+            </a:r>
+            <a:endParaRPr lang="en-GB" sz="1600" dirty="0"/>
           </a:p>
         </p:txBody>
       </p:sp>
@@ -4742,6 +5579,78 @@
           </a:p>
         </p:txBody>
       </p:sp>
+      <p:pic>
+        <p:nvPicPr>
+          <p:cNvPr id="6" name="Picture 5">
+            <a:extLst>
+              <a:ext uri="{FF2B5EF4-FFF2-40B4-BE49-F238E27FC236}">
+                <a16:creationId xmlns:a16="http://schemas.microsoft.com/office/drawing/2014/main" id="{51C27788-2E18-824B-B70D-CBBD54D4C4E3}"/>
+              </a:ext>
+            </a:extLst>
+          </p:cNvPr>
+          <p:cNvPicPr>
+            <a:picLocks noChangeAspect="1"/>
+          </p:cNvPicPr>
+          <p:nvPr/>
+        </p:nvPicPr>
+        <p:blipFill>
+          <a:blip r:embed="rId2">
+            <a:extLst>
+              <a:ext uri="{28A0092B-C50C-407E-A947-70E740481C1C}">
+                <a14:useLocalDpi xmlns:a14="http://schemas.microsoft.com/office/drawing/2010/main" val="0"/>
+              </a:ext>
+            </a:extLst>
+          </a:blip>
+          <a:stretch>
+            <a:fillRect/>
+          </a:stretch>
+        </p:blipFill>
+        <p:spPr>
+          <a:xfrm>
+            <a:off x="6660232" y="1603639"/>
+            <a:ext cx="2095500" cy="1892300"/>
+          </a:xfrm>
+          <a:prstGeom prst="rect">
+            <a:avLst/>
+          </a:prstGeom>
+        </p:spPr>
+      </p:pic>
+      <p:pic>
+        <p:nvPicPr>
+          <p:cNvPr id="9" name="Picture 8">
+            <a:extLst>
+              <a:ext uri="{FF2B5EF4-FFF2-40B4-BE49-F238E27FC236}">
+                <a16:creationId xmlns:a16="http://schemas.microsoft.com/office/drawing/2014/main" id="{B18648BA-231B-184F-B06E-CBA46EB47214}"/>
+              </a:ext>
+            </a:extLst>
+          </p:cNvPr>
+          <p:cNvPicPr>
+            <a:picLocks noChangeAspect="1"/>
+          </p:cNvPicPr>
+          <p:nvPr/>
+        </p:nvPicPr>
+        <p:blipFill>
+          <a:blip r:embed="rId3">
+            <a:extLst>
+              <a:ext uri="{28A0092B-C50C-407E-A947-70E740481C1C}">
+                <a14:useLocalDpi xmlns:a14="http://schemas.microsoft.com/office/drawing/2010/main" val="0"/>
+              </a:ext>
+            </a:extLst>
+          </a:blip>
+          <a:stretch>
+            <a:fillRect/>
+          </a:stretch>
+        </p:blipFill>
+        <p:spPr>
+          <a:xfrm>
+            <a:off x="6622132" y="4901948"/>
+            <a:ext cx="2133600" cy="1816100"/>
+          </a:xfrm>
+          <a:prstGeom prst="rect">
+            <a:avLst/>
+          </a:prstGeom>
+        </p:spPr>
+      </p:pic>
     </p:spTree>
     <p:extLst>
       <p:ext uri="{BB962C8B-B14F-4D97-AF65-F5344CB8AC3E}">
@@ -4796,25 +5705,51 @@
           <a:p>
             <a:r>
               <a:rPr lang="en-US" sz="2300" dirty="0"/>
-              <a:t>Dynamic, on-demand Selenium Grid.</a:t>
-            </a:r>
-          </a:p>
-          <a:p>
+              <a:t>Open-source tool created by </a:t>
+            </a:r>
+            <a:r>
+              <a:rPr lang="en-US" sz="2300" dirty="0" err="1"/>
+              <a:t>Zalando</a:t>
+            </a:r>
             <a:r>
               <a:rPr lang="en-US" sz="2300" dirty="0"/>
-              <a:t>Auto-scales during run-time – including deleting nodes after tests are finished.</a:t>
+              <a:t>. </a:t>
             </a:r>
           </a:p>
           <a:p>
             <a:r>
               <a:rPr lang="en-US" sz="2300" dirty="0"/>
-              <a:t>Based on docker-selenium.</a:t>
+              <a:t>Allows you to create a dynamic, on-demand Selenium Grid within seconds.</a:t>
+            </a:r>
+          </a:p>
+          <a:p>
+            <a:r>
+              <a:rPr lang="en-US" sz="2300" dirty="0"/>
+              <a:t>Can be run out of the box using Docker and Kubernetes.</a:t>
+            </a:r>
+          </a:p>
+          <a:p>
+            <a:r>
+              <a:rPr lang="en-US" sz="2300" dirty="0"/>
+              <a:t>Based on ‘docker-selenium’ so tests can be run in Firefox and Chrome.</a:t>
+            </a:r>
+          </a:p>
+          <a:p>
+            <a:r>
+              <a:rPr lang="en-US" sz="2300" dirty="0"/>
+              <a:t>Auto-scales during run-time and deletes nodes after tests are finished.</a:t>
             </a:r>
           </a:p>
           <a:p>
             <a:r>
               <a:rPr lang="en-US" sz="2300" dirty="0"/>
               <a:t>Simple to set up and run.</a:t>
+            </a:r>
+          </a:p>
+          <a:p>
+            <a:r>
+              <a:rPr lang="en-US" sz="2300" dirty="0"/>
+              <a:t>Tests can be run on other cloud testing providers - Sauce Labs, Testing Bot and Browser Stack</a:t>
             </a:r>
           </a:p>
           <a:p>
@@ -4841,9 +5776,14 @@
           <a:lstStyle/>
           <a:p>
             <a:r>
-              <a:rPr lang="en-GB" dirty="0"/>
-              <a:t>Commercial In Confidence - ECS 2017  </a:t>
-            </a:r>
+              <a:rPr lang="en-GB" sz="1600" dirty="0"/>
+              <a:t>#</a:t>
+            </a:r>
+            <a:r>
+              <a:rPr lang="en-GB" sz="1600" dirty="0" err="1"/>
+              <a:t>DevOpsPlayground</a:t>
+            </a:r>
+            <a:endParaRPr lang="en-GB" sz="1600" dirty="0"/>
           </a:p>
         </p:txBody>
       </p:sp>
@@ -4902,6 +5842,42 @@
           </a:p>
         </p:txBody>
       </p:sp>
+      <p:pic>
+        <p:nvPicPr>
+          <p:cNvPr id="6" name="Picture 5">
+            <a:extLst>
+              <a:ext uri="{FF2B5EF4-FFF2-40B4-BE49-F238E27FC236}">
+                <a16:creationId xmlns:a16="http://schemas.microsoft.com/office/drawing/2014/main" id="{77370321-58F0-1544-9EDF-BF6AB3D64224}"/>
+              </a:ext>
+            </a:extLst>
+          </p:cNvPr>
+          <p:cNvPicPr>
+            <a:picLocks noChangeAspect="1"/>
+          </p:cNvPicPr>
+          <p:nvPr/>
+        </p:nvPicPr>
+        <p:blipFill>
+          <a:blip r:embed="rId2">
+            <a:extLst>
+              <a:ext uri="{28A0092B-C50C-407E-A947-70E740481C1C}">
+                <a14:useLocalDpi xmlns:a14="http://schemas.microsoft.com/office/drawing/2010/main" val="0"/>
+              </a:ext>
+            </a:extLst>
+          </a:blip>
+          <a:stretch>
+            <a:fillRect/>
+          </a:stretch>
+        </p:blipFill>
+        <p:spPr>
+          <a:xfrm>
+            <a:off x="3779912" y="95855"/>
+            <a:ext cx="2616200" cy="1120061"/>
+          </a:xfrm>
+          <a:prstGeom prst="rect">
+            <a:avLst/>
+          </a:prstGeom>
+        </p:spPr>
+      </p:pic>
     </p:spTree>
     <p:extLst>
       <p:ext uri="{BB962C8B-B14F-4D97-AF65-F5344CB8AC3E}">
@@ -4956,37 +5932,54 @@
           <a:p>
             <a:r>
               <a:rPr lang="en-US" sz="2300" dirty="0"/>
-              <a:t>Hard to maintain stable Selenium Grid.</a:t>
-            </a:r>
-          </a:p>
-          <a:p>
+              <a:t>Hard to maintain your own hosted stable Selenium Grid.</a:t>
+            </a:r>
+          </a:p>
+          <a:p>
+            <a:r>
+              <a:rPr lang="en-US" sz="2300" dirty="0" err="1"/>
+              <a:t>Zalenium</a:t>
+            </a:r>
             <a:r>
               <a:rPr lang="en-US" sz="2300" dirty="0"/>
-              <a:t>Difficult to maintain all requirements in Grid (e.g. different browsers).</a:t>
+              <a:t> auto-scales.</a:t>
             </a:r>
           </a:p>
           <a:p>
             <a:r>
               <a:rPr lang="en-US" sz="2300" dirty="0"/>
-              <a:t>Allows anyone in your team to have flexible and disposable Grid infrastructure.</a:t>
-            </a:r>
-          </a:p>
-          <a:p>
+              <a:t>Selenium Grid scales but consumes a lot of resource. </a:t>
+            </a:r>
+            <a:r>
+              <a:rPr lang="en-US" sz="2300" dirty="0" err="1"/>
+              <a:t>Zalenium</a:t>
+            </a:r>
             <a:r>
               <a:rPr lang="en-US" sz="2300" dirty="0"/>
-              <a:t>Compliments providers like </a:t>
-            </a:r>
-            <a:r>
-              <a:rPr lang="en-US" sz="2300" dirty="0" err="1"/>
-              <a:t>SauceLabs</a:t>
-            </a:r>
+              <a:t> creates more nodes across different containers.</a:t>
+            </a:r>
+          </a:p>
+          <a:p>
             <a:r>
               <a:rPr lang="en-US" sz="2300" dirty="0"/>
-              <a:t>. Provides a local alternative.</a:t>
-            </a:r>
-          </a:p>
-          <a:p>
-            <a:endParaRPr lang="en-US" sz="2300" dirty="0"/>
+              <a:t>Difficult to maintain all requirements in Grid (e.g. keeping browsers up to date, maintaining Selenium drivers).</a:t>
+            </a:r>
+          </a:p>
+          <a:p>
+            <a:r>
+              <a:rPr lang="en-US" sz="2300" dirty="0"/>
+              <a:t>Allows anyone in your team to have </a:t>
+            </a:r>
+            <a:r>
+              <a:rPr lang="en-US" sz="2300" b="1" dirty="0"/>
+              <a:t>flexible and disposable Selenium Grid infrastructure created within seconds.</a:t>
+            </a:r>
+          </a:p>
+          <a:p>
+            <a:r>
+              <a:rPr lang="en-US" sz="2300" dirty="0"/>
+              <a:t>Compliments external cloud testing providers which can run tests on browsers other than Firefox and Chrome.</a:t>
+            </a:r>
           </a:p>
         </p:txBody>
       </p:sp>
@@ -5006,9 +5999,14 @@
           <a:lstStyle/>
           <a:p>
             <a:r>
-              <a:rPr lang="en-GB" dirty="0"/>
-              <a:t>Commercial In Confidence - ECS 2017  </a:t>
-            </a:r>
+              <a:rPr lang="en-GB" sz="1600" dirty="0"/>
+              <a:t>#</a:t>
+            </a:r>
+            <a:r>
+              <a:rPr lang="en-GB" sz="1600" dirty="0" err="1"/>
+              <a:t>DevOpsPlayground</a:t>
+            </a:r>
+            <a:endParaRPr lang="en-GB" sz="1600" dirty="0"/>
           </a:p>
         </p:txBody>
       </p:sp>
@@ -5121,7 +6119,15 @@
           <a:p>
             <a:r>
               <a:rPr lang="en-US" sz="2300" dirty="0"/>
-              <a:t>A Selenium Grid Hub starts</a:t>
+              <a:t>Upon running the </a:t>
+            </a:r>
+            <a:r>
+              <a:rPr lang="en-US" sz="2300" dirty="0" err="1"/>
+              <a:t>Zalenium</a:t>
+            </a:r>
+            <a:r>
+              <a:rPr lang="en-US" sz="2300" dirty="0"/>
+              <a:t> start Docker command a Selenium Grid Hub is started.</a:t>
             </a:r>
           </a:p>
           <a:p>
@@ -5133,20 +6139,26 @@
           <a:p>
             <a:r>
               <a:rPr lang="en-US" sz="2300" dirty="0"/>
-              <a:t>Cloud Proxy (e.g. Sauce Labs)</a:t>
-            </a:r>
-          </a:p>
-          <a:p>
-            <a:endParaRPr lang="en-US" sz="2300" dirty="0"/>
+              <a:t>A test request is sent to the Hub from the host machine.</a:t>
+            </a:r>
           </a:p>
           <a:p>
             <a:r>
               <a:rPr lang="en-US" sz="2300" dirty="0"/>
-              <a:t>Test request is sent to Hub from local machine. Docker-selenium then analyses the test and creates a new docker-selenium container which registers itself to the Hub. Hub then assigns new test to the container. Then test is executed on the selenium container. Once it is complete the node shuts down, after taking video recording and saving file locally to users’ machine.</a:t>
-            </a:r>
-          </a:p>
-          <a:p>
-            <a:endParaRPr lang="en-US" sz="2300" dirty="0"/>
+              <a:t>docker-selenium proxy analyses the test and creates a new docker-selenium container which registers itself to the Hub.</a:t>
+            </a:r>
+          </a:p>
+          <a:p>
+            <a:r>
+              <a:rPr lang="en-US" sz="2300" dirty="0"/>
+              <a:t>The Hub then assigns a new test to the container where it is executed.</a:t>
+            </a:r>
+          </a:p>
+          <a:p>
+            <a:r>
+              <a:rPr lang="en-US" sz="2300" dirty="0"/>
+              <a:t>Once the test is complete, the node shuts down, and saves video files to a temporary location on the users’ machine.</a:t>
+            </a:r>
           </a:p>
           <a:p>
             <a:pPr marL="0" indent="0">
@@ -5172,9 +6184,14 @@
           <a:lstStyle/>
           <a:p>
             <a:r>
-              <a:rPr lang="en-GB" dirty="0"/>
-              <a:t>Commercial In Confidence - ECS 2017  </a:t>
-            </a:r>
+              <a:rPr lang="en-GB" sz="1600" dirty="0"/>
+              <a:t>#</a:t>
+            </a:r>
+            <a:r>
+              <a:rPr lang="en-GB" sz="1600" dirty="0" err="1"/>
+              <a:t>DevOpsPlayground</a:t>
+            </a:r>
+            <a:endParaRPr lang="en-GB" sz="1600" dirty="0"/>
           </a:p>
         </p:txBody>
       </p:sp>
@@ -5267,22 +6284,8 @@
           <a:p>
             <a:r>
               <a:rPr lang="en-US" sz="2300" dirty="0"/>
-              <a:t>If the Hub receives a test that docker-selenium is not compatible with e.g. Safari, IE. Hub will ask docker-selenium proxy if it can run it. If it can’t then it will talk to Cloud Proxy and run test on Cloud Proxy (e.g. </a:t>
-            </a:r>
-            <a:r>
-              <a:rPr lang="en-US" sz="2300" dirty="0" err="1"/>
-              <a:t>SauceLabs</a:t>
-            </a:r>
-            <a:r>
-              <a:rPr lang="en-US" sz="2300" dirty="0"/>
-              <a:t>) if available. </a:t>
-            </a:r>
-          </a:p>
-          <a:p>
-            <a:pPr marL="0" indent="0">
-              <a:buNone/>
-            </a:pPr>
-            <a:endParaRPr lang="en-US" sz="2300" dirty="0"/>
+              <a:t>If the Hub receives a test that docker-selenium is not compatible with (e.g. Safari, IE) then it will check for the availability of a cloud testing provider, where it will run the tests.</a:t>
+            </a:r>
           </a:p>
         </p:txBody>
       </p:sp>
@@ -5302,9 +6305,14 @@
           <a:lstStyle/>
           <a:p>
             <a:r>
-              <a:rPr lang="en-GB" dirty="0"/>
-              <a:t>Commercial In Confidence - ECS 2017  </a:t>
-            </a:r>
+              <a:rPr lang="en-GB" sz="1600" dirty="0"/>
+              <a:t>#</a:t>
+            </a:r>
+            <a:r>
+              <a:rPr lang="en-GB" sz="1600" dirty="0" err="1"/>
+              <a:t>DevOpsPlayground</a:t>
+            </a:r>
+            <a:endParaRPr lang="en-GB" sz="1600" dirty="0"/>
           </a:p>
         </p:txBody>
       </p:sp>

</xml_diff>